<commit_message>
Add css and js resources
</commit_message>
<xml_diff>
--- a/presentation/Http2 - Kotlin.pptx
+++ b/presentation/Http2 - Kotlin.pptx
@@ -5,7 +5,7 @@
     <p:sldMasterId id="2147483677" r:id="rId1"/>
   </p:sldMasterIdLst>
   <p:notesMasterIdLst>
-    <p:notesMasterId r:id="rId64"/>
+    <p:notesMasterId r:id="rId66"/>
   </p:notesMasterIdLst>
   <p:sldIdLst>
     <p:sldId id="256" r:id="rId2"/>
@@ -58,18 +58,20 @@
     <p:sldId id="326" r:id="rId49"/>
     <p:sldId id="329" r:id="rId50"/>
     <p:sldId id="306" r:id="rId51"/>
-    <p:sldId id="361" r:id="rId52"/>
-    <p:sldId id="260" r:id="rId53"/>
-    <p:sldId id="288" r:id="rId54"/>
-    <p:sldId id="274" r:id="rId55"/>
-    <p:sldId id="291" r:id="rId56"/>
-    <p:sldId id="293" r:id="rId57"/>
-    <p:sldId id="276" r:id="rId58"/>
-    <p:sldId id="278" r:id="rId59"/>
-    <p:sldId id="292" r:id="rId60"/>
-    <p:sldId id="334" r:id="rId61"/>
-    <p:sldId id="294" r:id="rId62"/>
-    <p:sldId id="359" r:id="rId63"/>
+    <p:sldId id="362" r:id="rId52"/>
+    <p:sldId id="361" r:id="rId53"/>
+    <p:sldId id="260" r:id="rId54"/>
+    <p:sldId id="288" r:id="rId55"/>
+    <p:sldId id="274" r:id="rId56"/>
+    <p:sldId id="291" r:id="rId57"/>
+    <p:sldId id="293" r:id="rId58"/>
+    <p:sldId id="276" r:id="rId59"/>
+    <p:sldId id="278" r:id="rId60"/>
+    <p:sldId id="363" r:id="rId61"/>
+    <p:sldId id="292" r:id="rId62"/>
+    <p:sldId id="334" r:id="rId63"/>
+    <p:sldId id="294" r:id="rId64"/>
+    <p:sldId id="359" r:id="rId65"/>
   </p:sldIdLst>
   <p:sldSz cx="12192000" cy="6858000"/>
   <p:notesSz cx="6858000" cy="9144000"/>
@@ -273,7 +275,7 @@
           <a:p>
             <a:fld id="{3816D03D-CC09-4CE8-A9AB-5E69370D03E9}" type="datetimeFigureOut">
               <a:rPr lang="en-US" smtClean="0"/>
-              <a:t>1/22/2018</a:t>
+              <a:t>1/24/2018</a:t>
             </a:fld>
             <a:endParaRPr lang="en-US"/>
           </a:p>
@@ -943,7 +945,7 @@
           <a:p>
             <a:fld id="{4A863280-A538-437E-862E-C9DAE2D060E5}" type="datetimeFigureOut">
               <a:rPr lang="en-US" smtClean="0"/>
-              <a:t>1/22/2018</a:t>
+              <a:t>1/24/2018</a:t>
             </a:fld>
             <a:endParaRPr lang="en-US"/>
           </a:p>
@@ -1122,7 +1124,7 @@
           <a:p>
             <a:fld id="{4A863280-A538-437E-862E-C9DAE2D060E5}" type="datetimeFigureOut">
               <a:rPr lang="en-US" smtClean="0"/>
-              <a:t>1/22/2018</a:t>
+              <a:t>1/24/2018</a:t>
             </a:fld>
             <a:endParaRPr lang="en-US"/>
           </a:p>
@@ -1302,7 +1304,7 @@
           <a:p>
             <a:fld id="{4A863280-A538-437E-862E-C9DAE2D060E5}" type="datetimeFigureOut">
               <a:rPr lang="en-US" smtClean="0"/>
-              <a:t>1/22/2018</a:t>
+              <a:t>1/24/2018</a:t>
             </a:fld>
             <a:endParaRPr lang="en-US"/>
           </a:p>
@@ -1472,7 +1474,7 @@
           <a:p>
             <a:fld id="{4A863280-A538-437E-862E-C9DAE2D060E5}" type="datetimeFigureOut">
               <a:rPr lang="en-US" smtClean="0"/>
-              <a:t>1/22/2018</a:t>
+              <a:t>1/24/2018</a:t>
             </a:fld>
             <a:endParaRPr lang="en-US"/>
           </a:p>
@@ -1785,7 +1787,7 @@
           <a:p>
             <a:fld id="{4A863280-A538-437E-862E-C9DAE2D060E5}" type="datetimeFigureOut">
               <a:rPr lang="en-US" smtClean="0"/>
-              <a:t>1/22/2018</a:t>
+              <a:t>1/24/2018</a:t>
             </a:fld>
             <a:endParaRPr lang="en-US"/>
           </a:p>
@@ -2171,7 +2173,7 @@
           <a:p>
             <a:fld id="{4A863280-A538-437E-862E-C9DAE2D060E5}" type="datetimeFigureOut">
               <a:rPr lang="en-US" smtClean="0"/>
-              <a:t>1/22/2018</a:t>
+              <a:t>1/24/2018</a:t>
             </a:fld>
             <a:endParaRPr lang="en-US"/>
           </a:p>
@@ -2605,7 +2607,7 @@
           <a:p>
             <a:fld id="{4A863280-A538-437E-862E-C9DAE2D060E5}" type="datetimeFigureOut">
               <a:rPr lang="en-US" smtClean="0"/>
-              <a:t>1/22/2018</a:t>
+              <a:t>1/24/2018</a:t>
             </a:fld>
             <a:endParaRPr lang="en-US"/>
           </a:p>
@@ -2723,7 +2725,7 @@
           <a:p>
             <a:fld id="{4A863280-A538-437E-862E-C9DAE2D060E5}" type="datetimeFigureOut">
               <a:rPr lang="en-US" smtClean="0"/>
-              <a:t>1/22/2018</a:t>
+              <a:t>1/24/2018</a:t>
             </a:fld>
             <a:endParaRPr lang="en-US"/>
           </a:p>
@@ -2818,7 +2820,7 @@
           <a:p>
             <a:fld id="{4A863280-A538-437E-862E-C9DAE2D060E5}" type="datetimeFigureOut">
               <a:rPr lang="en-US" smtClean="0"/>
-              <a:t>1/22/2018</a:t>
+              <a:t>1/24/2018</a:t>
             </a:fld>
             <a:endParaRPr lang="en-US"/>
           </a:p>
@@ -3168,7 +3170,7 @@
           <a:p>
             <a:fld id="{4A863280-A538-437E-862E-C9DAE2D060E5}" type="datetimeFigureOut">
               <a:rPr lang="en-US" smtClean="0"/>
-              <a:t>1/22/2018</a:t>
+              <a:t>1/24/2018</a:t>
             </a:fld>
             <a:endParaRPr lang="en-US"/>
           </a:p>
@@ -3593,7 +3595,7 @@
           <a:p>
             <a:fld id="{4A863280-A538-437E-862E-C9DAE2D060E5}" type="datetimeFigureOut">
               <a:rPr lang="en-US" smtClean="0"/>
-              <a:t>1/22/2018</a:t>
+              <a:t>1/24/2018</a:t>
             </a:fld>
             <a:endParaRPr lang="en-US"/>
           </a:p>
@@ -3874,7 +3876,7 @@
           <a:p>
             <a:fld id="{4A863280-A538-437E-862E-C9DAE2D060E5}" type="datetimeFigureOut">
               <a:rPr lang="en-US" smtClean="0"/>
-              <a:t>1/22/2018</a:t>
+              <a:t>1/24/2018</a:t>
             </a:fld>
             <a:endParaRPr lang="en-US"/>
           </a:p>
@@ -23485,6 +23487,843 @@
 </file>
 
 <file path=ppt/slides/slide51.xml><?xml version="1.0" encoding="utf-8"?>
+<p:sld xmlns:a="http://schemas.openxmlformats.org/drawingml/2006/main" xmlns:r="http://schemas.openxmlformats.org/officeDocument/2006/relationships" xmlns:p="http://schemas.openxmlformats.org/presentationml/2006/main">
+  <p:cSld>
+    <p:spTree>
+      <p:nvGrpSpPr>
+        <p:cNvPr id="1" name=""/>
+        <p:cNvGrpSpPr/>
+        <p:nvPr/>
+      </p:nvGrpSpPr>
+      <p:grpSpPr>
+        <a:xfrm>
+          <a:off x="0" y="0"/>
+          <a:ext cx="0" cy="0"/>
+          <a:chOff x="0" y="0"/>
+          <a:chExt cx="0" cy="0"/>
+        </a:xfrm>
+      </p:grpSpPr>
+      <p:graphicFrame>
+        <p:nvGraphicFramePr>
+          <p:cNvPr id="2" name="Table 1">
+            <a:extLst>
+              <a:ext uri="{FF2B5EF4-FFF2-40B4-BE49-F238E27FC236}">
+                <a16:creationId xmlns:a16="http://schemas.microsoft.com/office/drawing/2014/main" id="{8731A96C-AC28-4A65-B7A5-DDFEA26086CE}"/>
+              </a:ext>
+            </a:extLst>
+          </p:cNvPr>
+          <p:cNvGraphicFramePr>
+            <a:graphicFrameLocks noGrp="1"/>
+          </p:cNvGraphicFramePr>
+          <p:nvPr>
+            <p:extLst>
+              <p:ext uri="{D42A27DB-BD31-4B8C-83A1-F6EECF244321}">
+                <p14:modId xmlns:p14="http://schemas.microsoft.com/office/powerpoint/2010/main" val="3503452714"/>
+              </p:ext>
+            </p:extLst>
+          </p:nvPr>
+        </p:nvGraphicFramePr>
+        <p:xfrm>
+          <a:off x="807902" y="1342534"/>
+          <a:ext cx="10440003" cy="4126683"/>
+        </p:xfrm>
+        <a:graphic>
+          <a:graphicData uri="http://schemas.openxmlformats.org/drawingml/2006/table">
+            <a:tbl>
+              <a:tblPr>
+                <a:tableStyleId>{69CF1AB2-1976-4502-BF36-3FF5EA218861}</a:tableStyleId>
+              </a:tblPr>
+              <a:tblGrid>
+                <a:gridCol w="1491429">
+                  <a:extLst>
+                    <a:ext uri="{9D8B030D-6E8A-4147-A177-3AD203B41FA5}">
+                      <a16:colId xmlns:a16="http://schemas.microsoft.com/office/drawing/2014/main" val="1822215166"/>
+                    </a:ext>
+                  </a:extLst>
+                </a:gridCol>
+                <a:gridCol w="1491429">
+                  <a:extLst>
+                    <a:ext uri="{9D8B030D-6E8A-4147-A177-3AD203B41FA5}">
+                      <a16:colId xmlns:a16="http://schemas.microsoft.com/office/drawing/2014/main" val="3000479313"/>
+                    </a:ext>
+                  </a:extLst>
+                </a:gridCol>
+                <a:gridCol w="1491429">
+                  <a:extLst>
+                    <a:ext uri="{9D8B030D-6E8A-4147-A177-3AD203B41FA5}">
+                      <a16:colId xmlns:a16="http://schemas.microsoft.com/office/drawing/2014/main" val="2053977802"/>
+                    </a:ext>
+                  </a:extLst>
+                </a:gridCol>
+                <a:gridCol w="1491429">
+                  <a:extLst>
+                    <a:ext uri="{9D8B030D-6E8A-4147-A177-3AD203B41FA5}">
+                      <a16:colId xmlns:a16="http://schemas.microsoft.com/office/drawing/2014/main" val="649303497"/>
+                    </a:ext>
+                  </a:extLst>
+                </a:gridCol>
+                <a:gridCol w="1491429">
+                  <a:extLst>
+                    <a:ext uri="{9D8B030D-6E8A-4147-A177-3AD203B41FA5}">
+                      <a16:colId xmlns:a16="http://schemas.microsoft.com/office/drawing/2014/main" val="2576267354"/>
+                    </a:ext>
+                  </a:extLst>
+                </a:gridCol>
+                <a:gridCol w="1491429">
+                  <a:extLst>
+                    <a:ext uri="{9D8B030D-6E8A-4147-A177-3AD203B41FA5}">
+                      <a16:colId xmlns:a16="http://schemas.microsoft.com/office/drawing/2014/main" val="544945452"/>
+                    </a:ext>
+                  </a:extLst>
+                </a:gridCol>
+                <a:gridCol w="1491429">
+                  <a:extLst>
+                    <a:ext uri="{9D8B030D-6E8A-4147-A177-3AD203B41FA5}">
+                      <a16:colId xmlns:a16="http://schemas.microsoft.com/office/drawing/2014/main" val="3235529628"/>
+                    </a:ext>
+                  </a:extLst>
+                </a:gridCol>
+              </a:tblGrid>
+              <a:tr h="1426683">
+                <a:tc>
+                  <a:txBody>
+                    <a:bodyPr/>
+                    <a:lstStyle/>
+                    <a:p>
+                      <a:pPr algn="ctr" fontAlgn="ctr"/>
+                      <a:endParaRPr lang="en-US" sz="2800" b="0" i="1" u="none" strike="noStrike" noProof="1">
+                        <a:solidFill>
+                          <a:srgbClr val="40BA00"/>
+                        </a:solidFill>
+                        <a:effectLst/>
+                        <a:latin typeface="Open Sans" panose="020B0606030504020204" pitchFamily="34" charset="0"/>
+                        <a:ea typeface="Open Sans" panose="020B0606030504020204" pitchFamily="34" charset="0"/>
+                        <a:cs typeface="Open Sans" panose="020B0606030504020204" pitchFamily="34" charset="0"/>
+                      </a:endParaRPr>
+                    </a:p>
+                  </a:txBody>
+                  <a:tcPr marL="24584" marR="24584" marT="24584" marB="0" anchor="ctr"/>
+                </a:tc>
+                <a:tc>
+                  <a:txBody>
+                    <a:bodyPr/>
+                    <a:lstStyle/>
+                    <a:p>
+                      <a:pPr algn="ctr" fontAlgn="ctr"/>
+                      <a:r>
+                        <a:rPr lang="en-US" sz="2800" u="none" strike="noStrike" noProof="1">
+                          <a:effectLst/>
+                        </a:rPr>
+                        <a:t>41 req 172 kb</a:t>
+                      </a:r>
+                      <a:endParaRPr lang="en-US" sz="2800" b="0" i="1" u="none" strike="noStrike" noProof="1">
+                        <a:solidFill>
+                          <a:srgbClr val="40BA00"/>
+                        </a:solidFill>
+                        <a:effectLst/>
+                        <a:latin typeface="Open Sans" panose="020B0606030504020204" pitchFamily="34" charset="0"/>
+                        <a:ea typeface="Open Sans" panose="020B0606030504020204" pitchFamily="34" charset="0"/>
+                        <a:cs typeface="Open Sans" panose="020B0606030504020204" pitchFamily="34" charset="0"/>
+                      </a:endParaRPr>
+                    </a:p>
+                  </a:txBody>
+                  <a:tcPr marL="24584" marR="24584" marT="24584" marB="0" anchor="ctr"/>
+                </a:tc>
+                <a:tc>
+                  <a:txBody>
+                    <a:bodyPr/>
+                    <a:lstStyle/>
+                    <a:p>
+                      <a:pPr algn="ctr" fontAlgn="ctr"/>
+                      <a:r>
+                        <a:rPr lang="en-US" sz="2800" u="none" strike="noStrike" noProof="1">
+                          <a:effectLst/>
+                        </a:rPr>
+                        <a:t>66 req 215 kb</a:t>
+                      </a:r>
+                      <a:endParaRPr lang="en-US" sz="2800" b="0" i="1" u="none" strike="noStrike" noProof="1">
+                        <a:solidFill>
+                          <a:srgbClr val="40BA00"/>
+                        </a:solidFill>
+                        <a:effectLst/>
+                        <a:latin typeface="Open Sans" panose="020B0606030504020204" pitchFamily="34" charset="0"/>
+                        <a:ea typeface="Open Sans" panose="020B0606030504020204" pitchFamily="34" charset="0"/>
+                        <a:cs typeface="Open Sans" panose="020B0606030504020204" pitchFamily="34" charset="0"/>
+                      </a:endParaRPr>
+                    </a:p>
+                  </a:txBody>
+                  <a:tcPr marL="24584" marR="24584" marT="24584" marB="0" anchor="ctr"/>
+                </a:tc>
+                <a:tc>
+                  <a:txBody>
+                    <a:bodyPr/>
+                    <a:lstStyle/>
+                    <a:p>
+                      <a:pPr algn="ctr" fontAlgn="ctr"/>
+                      <a:r>
+                        <a:rPr lang="en-US" sz="2800" u="none" strike="noStrike" noProof="1">
+                          <a:effectLst/>
+                        </a:rPr>
+                        <a:t>130 req 427 kb</a:t>
+                      </a:r>
+                      <a:endParaRPr lang="en-US" sz="2800" b="0" i="1" u="none" strike="noStrike" noProof="1">
+                        <a:solidFill>
+                          <a:srgbClr val="40BA00"/>
+                        </a:solidFill>
+                        <a:effectLst/>
+                        <a:latin typeface="Open Sans" panose="020B0606030504020204" pitchFamily="34" charset="0"/>
+                        <a:ea typeface="Open Sans" panose="020B0606030504020204" pitchFamily="34" charset="0"/>
+                        <a:cs typeface="Open Sans" panose="020B0606030504020204" pitchFamily="34" charset="0"/>
+                      </a:endParaRPr>
+                    </a:p>
+                  </a:txBody>
+                  <a:tcPr marL="24584" marR="24584" marT="24584" marB="0" anchor="ctr"/>
+                </a:tc>
+                <a:tc>
+                  <a:txBody>
+                    <a:bodyPr/>
+                    <a:lstStyle/>
+                    <a:p>
+                      <a:pPr algn="ctr" fontAlgn="ctr"/>
+                      <a:r>
+                        <a:rPr lang="en-US" sz="2800" u="none" strike="noStrike" noProof="1">
+                          <a:effectLst/>
+                        </a:rPr>
+                        <a:t>230 req 2.0 mb</a:t>
+                      </a:r>
+                      <a:endParaRPr lang="en-US" sz="2800" b="0" i="1" u="none" strike="noStrike" noProof="1">
+                        <a:solidFill>
+                          <a:srgbClr val="40BA00"/>
+                        </a:solidFill>
+                        <a:effectLst/>
+                        <a:latin typeface="Open Sans" panose="020B0606030504020204" pitchFamily="34" charset="0"/>
+                        <a:ea typeface="Open Sans" panose="020B0606030504020204" pitchFamily="34" charset="0"/>
+                        <a:cs typeface="Open Sans" panose="020B0606030504020204" pitchFamily="34" charset="0"/>
+                      </a:endParaRPr>
+                    </a:p>
+                  </a:txBody>
+                  <a:tcPr marL="24584" marR="24584" marT="24584" marB="0" anchor="ctr"/>
+                </a:tc>
+                <a:tc>
+                  <a:txBody>
+                    <a:bodyPr/>
+                    <a:lstStyle/>
+                    <a:p>
+                      <a:pPr algn="ctr" fontAlgn="ctr"/>
+                      <a:r>
+                        <a:rPr lang="en-US" sz="2800" u="none" strike="noStrike" noProof="1">
+                          <a:effectLst/>
+                        </a:rPr>
+                        <a:t>330 req 4.2 mb</a:t>
+                      </a:r>
+                      <a:endParaRPr lang="en-US" sz="2800" b="0" i="1" u="none" strike="noStrike" noProof="1">
+                        <a:solidFill>
+                          <a:srgbClr val="40BA00"/>
+                        </a:solidFill>
+                        <a:effectLst/>
+                        <a:latin typeface="Open Sans" panose="020B0606030504020204" pitchFamily="34" charset="0"/>
+                        <a:ea typeface="Open Sans" panose="020B0606030504020204" pitchFamily="34" charset="0"/>
+                        <a:cs typeface="Open Sans" panose="020B0606030504020204" pitchFamily="34" charset="0"/>
+                      </a:endParaRPr>
+                    </a:p>
+                  </a:txBody>
+                  <a:tcPr marL="24584" marR="24584" marT="24584" marB="0" anchor="ctr"/>
+                </a:tc>
+                <a:tc>
+                  <a:txBody>
+                    <a:bodyPr/>
+                    <a:lstStyle/>
+                    <a:p>
+                      <a:pPr algn="ctr" fontAlgn="ctr"/>
+                      <a:r>
+                        <a:rPr lang="en-US" sz="2800" u="none" strike="noStrike" noProof="1">
+                          <a:effectLst/>
+                        </a:rPr>
+                        <a:t>430 req 5.4 mb</a:t>
+                      </a:r>
+                      <a:endParaRPr lang="en-US" sz="2800" b="0" i="1" u="none" strike="noStrike" noProof="1">
+                        <a:solidFill>
+                          <a:srgbClr val="40BA00"/>
+                        </a:solidFill>
+                        <a:effectLst/>
+                        <a:latin typeface="Open Sans" panose="020B0606030504020204" pitchFamily="34" charset="0"/>
+                        <a:ea typeface="Open Sans" panose="020B0606030504020204" pitchFamily="34" charset="0"/>
+                        <a:cs typeface="Open Sans" panose="020B0606030504020204" pitchFamily="34" charset="0"/>
+                      </a:endParaRPr>
+                    </a:p>
+                  </a:txBody>
+                  <a:tcPr marL="24584" marR="24584" marT="24584" marB="0" anchor="ctr"/>
+                </a:tc>
+                <a:extLst>
+                  <a:ext uri="{0D108BD9-81ED-4DB2-BD59-A6C34878D82A}">
+                    <a16:rowId xmlns:a16="http://schemas.microsoft.com/office/drawing/2014/main" val="3871757961"/>
+                  </a:ext>
+                </a:extLst>
+              </a:tr>
+              <a:tr h="900000">
+                <a:tc>
+                  <a:txBody>
+                    <a:bodyPr/>
+                    <a:lstStyle/>
+                    <a:p>
+                      <a:pPr algn="ctr" fontAlgn="ctr"/>
+                      <a:r>
+                        <a:rPr lang="en-US" sz="2800" u="none" strike="noStrike" noProof="1">
+                          <a:effectLst/>
+                        </a:rPr>
+                        <a:t>HTTP/2</a:t>
+                      </a:r>
+                      <a:endParaRPr lang="en-US" sz="2800" b="0" i="0" u="none" strike="noStrike" noProof="1">
+                        <a:solidFill>
+                          <a:srgbClr val="000000"/>
+                        </a:solidFill>
+                        <a:effectLst/>
+                        <a:latin typeface="Open Sans" panose="020B0606030504020204" pitchFamily="34" charset="0"/>
+                        <a:ea typeface="Open Sans" panose="020B0606030504020204" pitchFamily="34" charset="0"/>
+                        <a:cs typeface="Open Sans" panose="020B0606030504020204" pitchFamily="34" charset="0"/>
+                      </a:endParaRPr>
+                    </a:p>
+                  </a:txBody>
+                  <a:tcPr marL="24584" marR="24584" marT="24584" marB="0" anchor="ctr"/>
+                </a:tc>
+                <a:tc>
+                  <a:txBody>
+                    <a:bodyPr/>
+                    <a:lstStyle/>
+                    <a:p>
+                      <a:pPr algn="ctr" fontAlgn="ctr"/>
+                      <a:r>
+                        <a:rPr lang="en-US" sz="2800" u="none" strike="noStrike" noProof="1">
+                          <a:effectLst/>
+                        </a:rPr>
+                        <a:t>332.37</a:t>
+                      </a:r>
+                      <a:endParaRPr lang="en-US" sz="2800" b="0" i="0" u="none" strike="noStrike" noProof="1">
+                        <a:solidFill>
+                          <a:srgbClr val="000000"/>
+                        </a:solidFill>
+                        <a:effectLst/>
+                        <a:latin typeface="Open Sans" panose="020B0606030504020204" pitchFamily="34" charset="0"/>
+                        <a:ea typeface="Open Sans" panose="020B0606030504020204" pitchFamily="34" charset="0"/>
+                        <a:cs typeface="Open Sans" panose="020B0606030504020204" pitchFamily="34" charset="0"/>
+                      </a:endParaRPr>
+                    </a:p>
+                  </a:txBody>
+                  <a:tcPr marL="24584" marR="24584" marT="24584" marB="0" anchor="ctr"/>
+                </a:tc>
+                <a:tc>
+                  <a:txBody>
+                    <a:bodyPr/>
+                    <a:lstStyle/>
+                    <a:p>
+                      <a:pPr algn="ctr" fontAlgn="ctr"/>
+                      <a:r>
+                        <a:rPr lang="en-US" sz="2800" u="none" strike="noStrike" noProof="1">
+                          <a:effectLst/>
+                        </a:rPr>
+                        <a:t>415.33</a:t>
+                      </a:r>
+                      <a:endParaRPr lang="en-US" sz="2800" b="0" i="0" u="none" strike="noStrike" noProof="1">
+                        <a:solidFill>
+                          <a:srgbClr val="000000"/>
+                        </a:solidFill>
+                        <a:effectLst/>
+                        <a:latin typeface="Open Sans" panose="020B0606030504020204" pitchFamily="34" charset="0"/>
+                        <a:ea typeface="Open Sans" panose="020B0606030504020204" pitchFamily="34" charset="0"/>
+                        <a:cs typeface="Open Sans" panose="020B0606030504020204" pitchFamily="34" charset="0"/>
+                      </a:endParaRPr>
+                    </a:p>
+                  </a:txBody>
+                  <a:tcPr marL="24584" marR="24584" marT="24584" marB="0" anchor="ctr"/>
+                </a:tc>
+                <a:tc>
+                  <a:txBody>
+                    <a:bodyPr/>
+                    <a:lstStyle/>
+                    <a:p>
+                      <a:pPr algn="ctr" fontAlgn="ctr"/>
+                      <a:r>
+                        <a:rPr lang="en-US" sz="2800" u="none" strike="noStrike" noProof="1">
+                          <a:effectLst/>
+                        </a:rPr>
+                        <a:t>774.13</a:t>
+                      </a:r>
+                      <a:endParaRPr lang="en-US" sz="2800" b="0" i="0" u="none" strike="noStrike" noProof="1">
+                        <a:solidFill>
+                          <a:srgbClr val="000000"/>
+                        </a:solidFill>
+                        <a:effectLst/>
+                        <a:latin typeface="Open Sans" panose="020B0606030504020204" pitchFamily="34" charset="0"/>
+                        <a:ea typeface="Open Sans" panose="020B0606030504020204" pitchFamily="34" charset="0"/>
+                        <a:cs typeface="Open Sans" panose="020B0606030504020204" pitchFamily="34" charset="0"/>
+                      </a:endParaRPr>
+                    </a:p>
+                  </a:txBody>
+                  <a:tcPr marL="24584" marR="24584" marT="24584" marB="0" anchor="ctr"/>
+                </a:tc>
+                <a:tc>
+                  <a:txBody>
+                    <a:bodyPr/>
+                    <a:lstStyle/>
+                    <a:p>
+                      <a:pPr algn="ctr" fontAlgn="ctr"/>
+                      <a:r>
+                        <a:rPr lang="en-US" sz="2800" u="none" strike="noStrike" noProof="1">
+                          <a:effectLst/>
+                        </a:rPr>
+                        <a:t>1.26</a:t>
+                      </a:r>
+                      <a:endParaRPr lang="en-US" sz="2800" b="0" i="0" u="none" strike="noStrike" noProof="1">
+                        <a:solidFill>
+                          <a:srgbClr val="000000"/>
+                        </a:solidFill>
+                        <a:effectLst/>
+                        <a:latin typeface="Open Sans" panose="020B0606030504020204" pitchFamily="34" charset="0"/>
+                        <a:ea typeface="Open Sans" panose="020B0606030504020204" pitchFamily="34" charset="0"/>
+                        <a:cs typeface="Open Sans" panose="020B0606030504020204" pitchFamily="34" charset="0"/>
+                      </a:endParaRPr>
+                    </a:p>
+                  </a:txBody>
+                  <a:tcPr marL="24584" marR="24584" marT="24584" marB="0" anchor="ctr"/>
+                </a:tc>
+                <a:tc>
+                  <a:txBody>
+                    <a:bodyPr/>
+                    <a:lstStyle/>
+                    <a:p>
+                      <a:pPr algn="ctr" fontAlgn="ctr"/>
+                      <a:r>
+                        <a:rPr lang="en-US" sz="2800" u="none" strike="noStrike" noProof="1">
+                          <a:effectLst/>
+                        </a:rPr>
+                        <a:t>1.83</a:t>
+                      </a:r>
+                      <a:endParaRPr lang="en-US" sz="2800" b="0" i="0" u="none" strike="noStrike" noProof="1">
+                        <a:solidFill>
+                          <a:srgbClr val="000000"/>
+                        </a:solidFill>
+                        <a:effectLst/>
+                        <a:latin typeface="Open Sans" panose="020B0606030504020204" pitchFamily="34" charset="0"/>
+                        <a:ea typeface="Open Sans" panose="020B0606030504020204" pitchFamily="34" charset="0"/>
+                        <a:cs typeface="Open Sans" panose="020B0606030504020204" pitchFamily="34" charset="0"/>
+                      </a:endParaRPr>
+                    </a:p>
+                  </a:txBody>
+                  <a:tcPr marL="24584" marR="24584" marT="24584" marB="0" anchor="ctr"/>
+                </a:tc>
+                <a:tc>
+                  <a:txBody>
+                    <a:bodyPr/>
+                    <a:lstStyle/>
+                    <a:p>
+                      <a:pPr algn="ctr" fontAlgn="ctr"/>
+                      <a:r>
+                        <a:rPr lang="en-US" sz="2800" u="none" strike="noStrike" noProof="1">
+                          <a:effectLst/>
+                        </a:rPr>
+                        <a:t>2.31</a:t>
+                      </a:r>
+                      <a:endParaRPr lang="en-US" sz="2800" b="0" i="0" u="none" strike="noStrike" noProof="1">
+                        <a:solidFill>
+                          <a:srgbClr val="000000"/>
+                        </a:solidFill>
+                        <a:effectLst/>
+                        <a:latin typeface="Open Sans" panose="020B0606030504020204" pitchFamily="34" charset="0"/>
+                        <a:ea typeface="Open Sans" panose="020B0606030504020204" pitchFamily="34" charset="0"/>
+                        <a:cs typeface="Open Sans" panose="020B0606030504020204" pitchFamily="34" charset="0"/>
+                      </a:endParaRPr>
+                    </a:p>
+                  </a:txBody>
+                  <a:tcPr marL="24584" marR="24584" marT="24584" marB="0" anchor="ctr"/>
+                </a:tc>
+                <a:extLst>
+                  <a:ext uri="{0D108BD9-81ED-4DB2-BD59-A6C34878D82A}">
+                    <a16:rowId xmlns:a16="http://schemas.microsoft.com/office/drawing/2014/main" val="599292250"/>
+                  </a:ext>
+                </a:extLst>
+              </a:tr>
+              <a:tr h="900000">
+                <a:tc>
+                  <a:txBody>
+                    <a:bodyPr/>
+                    <a:lstStyle/>
+                    <a:p>
+                      <a:pPr algn="ctr" fontAlgn="ctr"/>
+                      <a:r>
+                        <a:rPr lang="en-US" sz="2800" u="none" strike="noStrike" noProof="1">
+                          <a:effectLst/>
+                        </a:rPr>
+                        <a:t>HTTP 1.1</a:t>
+                      </a:r>
+                      <a:endParaRPr lang="en-US" sz="2800" b="0" i="0" u="none" strike="noStrike" noProof="1">
+                        <a:solidFill>
+                          <a:srgbClr val="000000"/>
+                        </a:solidFill>
+                        <a:effectLst/>
+                        <a:latin typeface="Open Sans" panose="020B0606030504020204" pitchFamily="34" charset="0"/>
+                        <a:ea typeface="Open Sans" panose="020B0606030504020204" pitchFamily="34" charset="0"/>
+                        <a:cs typeface="Open Sans" panose="020B0606030504020204" pitchFamily="34" charset="0"/>
+                      </a:endParaRPr>
+                    </a:p>
+                  </a:txBody>
+                  <a:tcPr marL="24584" marR="24584" marT="24584" marB="0" anchor="ctr"/>
+                </a:tc>
+                <a:tc>
+                  <a:txBody>
+                    <a:bodyPr/>
+                    <a:lstStyle/>
+                    <a:p>
+                      <a:pPr algn="ctr" fontAlgn="ctr"/>
+                      <a:r>
+                        <a:rPr lang="en-US" sz="2800" u="none" strike="noStrike" noProof="1">
+                          <a:effectLst/>
+                        </a:rPr>
+                        <a:t>545.67</a:t>
+                      </a:r>
+                      <a:endParaRPr lang="en-US" sz="2800" b="0" i="0" u="none" strike="noStrike" noProof="1">
+                        <a:solidFill>
+                          <a:srgbClr val="000000"/>
+                        </a:solidFill>
+                        <a:effectLst/>
+                        <a:latin typeface="Open Sans" panose="020B0606030504020204" pitchFamily="34" charset="0"/>
+                        <a:ea typeface="Open Sans" panose="020B0606030504020204" pitchFamily="34" charset="0"/>
+                        <a:cs typeface="Open Sans" panose="020B0606030504020204" pitchFamily="34" charset="0"/>
+                      </a:endParaRPr>
+                    </a:p>
+                  </a:txBody>
+                  <a:tcPr marL="24584" marR="24584" marT="24584" marB="0" anchor="ctr"/>
+                </a:tc>
+                <a:tc>
+                  <a:txBody>
+                    <a:bodyPr/>
+                    <a:lstStyle/>
+                    <a:p>
+                      <a:pPr algn="ctr" fontAlgn="ctr"/>
+                      <a:r>
+                        <a:rPr lang="en-US" sz="2800" u="none" strike="noStrike" noProof="1">
+                          <a:effectLst/>
+                        </a:rPr>
+                        <a:t>629.30</a:t>
+                      </a:r>
+                      <a:endParaRPr lang="en-US" sz="2800" b="0" i="0" u="none" strike="noStrike" noProof="1">
+                        <a:solidFill>
+                          <a:srgbClr val="000000"/>
+                        </a:solidFill>
+                        <a:effectLst/>
+                        <a:latin typeface="Open Sans" panose="020B0606030504020204" pitchFamily="34" charset="0"/>
+                        <a:ea typeface="Open Sans" panose="020B0606030504020204" pitchFamily="34" charset="0"/>
+                        <a:cs typeface="Open Sans" panose="020B0606030504020204" pitchFamily="34" charset="0"/>
+                      </a:endParaRPr>
+                    </a:p>
+                  </a:txBody>
+                  <a:tcPr marL="24584" marR="24584" marT="24584" marB="0" anchor="ctr"/>
+                </a:tc>
+                <a:tc>
+                  <a:txBody>
+                    <a:bodyPr/>
+                    <a:lstStyle/>
+                    <a:p>
+                      <a:pPr algn="ctr" fontAlgn="ctr"/>
+                      <a:r>
+                        <a:rPr lang="en-US" sz="2800" u="none" strike="noStrike" noProof="1">
+                          <a:effectLst/>
+                        </a:rPr>
+                        <a:t>877.77</a:t>
+                      </a:r>
+                      <a:endParaRPr lang="en-US" sz="2800" b="0" i="0" u="none" strike="noStrike" noProof="1">
+                        <a:solidFill>
+                          <a:srgbClr val="000000"/>
+                        </a:solidFill>
+                        <a:effectLst/>
+                        <a:latin typeface="Open Sans" panose="020B0606030504020204" pitchFamily="34" charset="0"/>
+                        <a:ea typeface="Open Sans" panose="020B0606030504020204" pitchFamily="34" charset="0"/>
+                        <a:cs typeface="Open Sans" panose="020B0606030504020204" pitchFamily="34" charset="0"/>
+                      </a:endParaRPr>
+                    </a:p>
+                  </a:txBody>
+                  <a:tcPr marL="24584" marR="24584" marT="24584" marB="0" anchor="ctr"/>
+                </a:tc>
+                <a:tc>
+                  <a:txBody>
+                    <a:bodyPr/>
+                    <a:lstStyle/>
+                    <a:p>
+                      <a:pPr algn="ctr" fontAlgn="ctr"/>
+                      <a:r>
+                        <a:rPr lang="en-US" sz="2800" u="none" strike="noStrike" noProof="1">
+                          <a:effectLst/>
+                        </a:rPr>
+                        <a:t>1.40</a:t>
+                      </a:r>
+                      <a:endParaRPr lang="en-US" sz="2800" b="0" i="0" u="none" strike="noStrike" noProof="1">
+                        <a:solidFill>
+                          <a:srgbClr val="000000"/>
+                        </a:solidFill>
+                        <a:effectLst/>
+                        <a:latin typeface="Open Sans" panose="020B0606030504020204" pitchFamily="34" charset="0"/>
+                        <a:ea typeface="Open Sans" panose="020B0606030504020204" pitchFamily="34" charset="0"/>
+                        <a:cs typeface="Open Sans" panose="020B0606030504020204" pitchFamily="34" charset="0"/>
+                      </a:endParaRPr>
+                    </a:p>
+                  </a:txBody>
+                  <a:tcPr marL="24584" marR="24584" marT="24584" marB="0" anchor="ctr"/>
+                </a:tc>
+                <a:tc>
+                  <a:txBody>
+                    <a:bodyPr/>
+                    <a:lstStyle/>
+                    <a:p>
+                      <a:pPr algn="ctr" fontAlgn="ctr"/>
+                      <a:r>
+                        <a:rPr lang="en-US" sz="2800" u="none" strike="noStrike" noProof="1">
+                          <a:effectLst/>
+                        </a:rPr>
+                        <a:t>1.94</a:t>
+                      </a:r>
+                      <a:endParaRPr lang="en-US" sz="2800" b="0" i="0" u="none" strike="noStrike" noProof="1">
+                        <a:solidFill>
+                          <a:srgbClr val="000000"/>
+                        </a:solidFill>
+                        <a:effectLst/>
+                        <a:latin typeface="Open Sans" panose="020B0606030504020204" pitchFamily="34" charset="0"/>
+                        <a:ea typeface="Open Sans" panose="020B0606030504020204" pitchFamily="34" charset="0"/>
+                        <a:cs typeface="Open Sans" panose="020B0606030504020204" pitchFamily="34" charset="0"/>
+                      </a:endParaRPr>
+                    </a:p>
+                  </a:txBody>
+                  <a:tcPr marL="24584" marR="24584" marT="24584" marB="0" anchor="ctr"/>
+                </a:tc>
+                <a:tc>
+                  <a:txBody>
+                    <a:bodyPr/>
+                    <a:lstStyle/>
+                    <a:p>
+                      <a:pPr algn="ctr" fontAlgn="ctr"/>
+                      <a:r>
+                        <a:rPr lang="en-US" sz="2800" u="none" strike="noStrike" noProof="1">
+                          <a:effectLst/>
+                        </a:rPr>
+                        <a:t>2.46</a:t>
+                      </a:r>
+                      <a:endParaRPr lang="en-US" sz="2800" b="0" i="0" u="none" strike="noStrike" noProof="1">
+                        <a:solidFill>
+                          <a:srgbClr val="000000"/>
+                        </a:solidFill>
+                        <a:effectLst/>
+                        <a:latin typeface="Open Sans" panose="020B0606030504020204" pitchFamily="34" charset="0"/>
+                        <a:ea typeface="Open Sans" panose="020B0606030504020204" pitchFamily="34" charset="0"/>
+                        <a:cs typeface="Open Sans" panose="020B0606030504020204" pitchFamily="34" charset="0"/>
+                      </a:endParaRPr>
+                    </a:p>
+                  </a:txBody>
+                  <a:tcPr marL="24584" marR="24584" marT="24584" marB="0" anchor="ctr"/>
+                </a:tc>
+                <a:extLst>
+                  <a:ext uri="{0D108BD9-81ED-4DB2-BD59-A6C34878D82A}">
+                    <a16:rowId xmlns:a16="http://schemas.microsoft.com/office/drawing/2014/main" val="377368655"/>
+                  </a:ext>
+                </a:extLst>
+              </a:tr>
+              <a:tr h="900000">
+                <a:tc>
+                  <a:txBody>
+                    <a:bodyPr/>
+                    <a:lstStyle/>
+                    <a:p>
+                      <a:pPr algn="ctr" fontAlgn="ctr"/>
+                      <a:r>
+                        <a:rPr lang="en-US" sz="2800" u="none" strike="noStrike" noProof="1">
+                          <a:effectLst/>
+                        </a:rPr>
+                        <a:t>%</a:t>
+                      </a:r>
+                      <a:endParaRPr lang="en-US" sz="2800" b="0" i="0" u="none" strike="noStrike" noProof="1">
+                        <a:solidFill>
+                          <a:srgbClr val="000000"/>
+                        </a:solidFill>
+                        <a:effectLst/>
+                        <a:latin typeface="Open Sans" panose="020B0606030504020204" pitchFamily="34" charset="0"/>
+                        <a:ea typeface="Open Sans" panose="020B0606030504020204" pitchFamily="34" charset="0"/>
+                        <a:cs typeface="Open Sans" panose="020B0606030504020204" pitchFamily="34" charset="0"/>
+                      </a:endParaRPr>
+                    </a:p>
+                  </a:txBody>
+                  <a:tcPr marL="24584" marR="24584" marT="24584" marB="0" anchor="ctr"/>
+                </a:tc>
+                <a:tc>
+                  <a:txBody>
+                    <a:bodyPr/>
+                    <a:lstStyle/>
+                    <a:p>
+                      <a:pPr algn="ctr" fontAlgn="ctr"/>
+                      <a:r>
+                        <a:rPr lang="en-US" sz="2800" u="none" strike="noStrike" noProof="1">
+                          <a:effectLst/>
+                        </a:rPr>
+                        <a:t>64.18</a:t>
+                      </a:r>
+                      <a:endParaRPr lang="en-US" sz="2800" b="0" i="0" u="none" strike="noStrike" noProof="1">
+                        <a:solidFill>
+                          <a:srgbClr val="000000"/>
+                        </a:solidFill>
+                        <a:effectLst/>
+                        <a:latin typeface="Open Sans" panose="020B0606030504020204" pitchFamily="34" charset="0"/>
+                        <a:ea typeface="Open Sans" panose="020B0606030504020204" pitchFamily="34" charset="0"/>
+                        <a:cs typeface="Open Sans" panose="020B0606030504020204" pitchFamily="34" charset="0"/>
+                      </a:endParaRPr>
+                    </a:p>
+                  </a:txBody>
+                  <a:tcPr marL="24584" marR="24584" marT="24584" marB="0" anchor="ctr"/>
+                </a:tc>
+                <a:tc>
+                  <a:txBody>
+                    <a:bodyPr/>
+                    <a:lstStyle/>
+                    <a:p>
+                      <a:pPr algn="ctr" fontAlgn="ctr"/>
+                      <a:r>
+                        <a:rPr lang="en-US" sz="2800" u="none" strike="noStrike" noProof="1">
+                          <a:effectLst/>
+                        </a:rPr>
+                        <a:t>51.52</a:t>
+                      </a:r>
+                      <a:endParaRPr lang="en-US" sz="2800" b="0" i="0" u="none" strike="noStrike" noProof="1">
+                        <a:solidFill>
+                          <a:srgbClr val="000000"/>
+                        </a:solidFill>
+                        <a:effectLst/>
+                        <a:latin typeface="Open Sans" panose="020B0606030504020204" pitchFamily="34" charset="0"/>
+                        <a:ea typeface="Open Sans" panose="020B0606030504020204" pitchFamily="34" charset="0"/>
+                        <a:cs typeface="Open Sans" panose="020B0606030504020204" pitchFamily="34" charset="0"/>
+                      </a:endParaRPr>
+                    </a:p>
+                  </a:txBody>
+                  <a:tcPr marL="24584" marR="24584" marT="24584" marB="0" anchor="ctr"/>
+                </a:tc>
+                <a:tc>
+                  <a:txBody>
+                    <a:bodyPr/>
+                    <a:lstStyle/>
+                    <a:p>
+                      <a:pPr algn="ctr" fontAlgn="ctr"/>
+                      <a:r>
+                        <a:rPr lang="en-US" sz="2800" u="none" strike="noStrike" noProof="1">
+                          <a:effectLst/>
+                        </a:rPr>
+                        <a:t>13.39</a:t>
+                      </a:r>
+                      <a:endParaRPr lang="en-US" sz="2800" b="0" i="0" u="none" strike="noStrike" noProof="1">
+                        <a:solidFill>
+                          <a:srgbClr val="000000"/>
+                        </a:solidFill>
+                        <a:effectLst/>
+                        <a:latin typeface="Open Sans" panose="020B0606030504020204" pitchFamily="34" charset="0"/>
+                        <a:ea typeface="Open Sans" panose="020B0606030504020204" pitchFamily="34" charset="0"/>
+                        <a:cs typeface="Open Sans" panose="020B0606030504020204" pitchFamily="34" charset="0"/>
+                      </a:endParaRPr>
+                    </a:p>
+                  </a:txBody>
+                  <a:tcPr marL="24584" marR="24584" marT="24584" marB="0" anchor="ctr"/>
+                </a:tc>
+                <a:tc>
+                  <a:txBody>
+                    <a:bodyPr/>
+                    <a:lstStyle/>
+                    <a:p>
+                      <a:pPr algn="ctr" fontAlgn="ctr"/>
+                      <a:r>
+                        <a:rPr lang="en-US" sz="2800" u="none" strike="noStrike" noProof="1">
+                          <a:effectLst/>
+                        </a:rPr>
+                        <a:t>11.61</a:t>
+                      </a:r>
+                      <a:endParaRPr lang="en-US" sz="2800" b="0" i="0" u="none" strike="noStrike" noProof="1">
+                        <a:solidFill>
+                          <a:srgbClr val="000000"/>
+                        </a:solidFill>
+                        <a:effectLst/>
+                        <a:latin typeface="Open Sans" panose="020B0606030504020204" pitchFamily="34" charset="0"/>
+                        <a:ea typeface="Open Sans" panose="020B0606030504020204" pitchFamily="34" charset="0"/>
+                        <a:cs typeface="Open Sans" panose="020B0606030504020204" pitchFamily="34" charset="0"/>
+                      </a:endParaRPr>
+                    </a:p>
+                  </a:txBody>
+                  <a:tcPr marL="24584" marR="24584" marT="24584" marB="0" anchor="ctr"/>
+                </a:tc>
+                <a:tc>
+                  <a:txBody>
+                    <a:bodyPr/>
+                    <a:lstStyle/>
+                    <a:p>
+                      <a:pPr algn="ctr" fontAlgn="ctr"/>
+                      <a:r>
+                        <a:rPr lang="en-US" sz="2800" u="none" strike="noStrike" noProof="1">
+                          <a:effectLst/>
+                        </a:rPr>
+                        <a:t>5.73</a:t>
+                      </a:r>
+                      <a:endParaRPr lang="en-US" sz="2800" b="0" i="0" u="none" strike="noStrike" noProof="1">
+                        <a:solidFill>
+                          <a:srgbClr val="000000"/>
+                        </a:solidFill>
+                        <a:effectLst/>
+                        <a:latin typeface="Open Sans" panose="020B0606030504020204" pitchFamily="34" charset="0"/>
+                        <a:ea typeface="Open Sans" panose="020B0606030504020204" pitchFamily="34" charset="0"/>
+                        <a:cs typeface="Open Sans" panose="020B0606030504020204" pitchFamily="34" charset="0"/>
+                      </a:endParaRPr>
+                    </a:p>
+                  </a:txBody>
+                  <a:tcPr marL="24584" marR="24584" marT="24584" marB="0" anchor="ctr"/>
+                </a:tc>
+                <a:tc>
+                  <a:txBody>
+                    <a:bodyPr/>
+                    <a:lstStyle/>
+                    <a:p>
+                      <a:pPr algn="ctr" fontAlgn="ctr"/>
+                      <a:r>
+                        <a:rPr lang="en-US" sz="2800" u="none" strike="noStrike" noProof="1">
+                          <a:effectLst/>
+                        </a:rPr>
+                        <a:t>6.52</a:t>
+                      </a:r>
+                      <a:endParaRPr lang="en-US" sz="2800" b="0" i="0" u="none" strike="noStrike" noProof="1">
+                        <a:solidFill>
+                          <a:srgbClr val="000000"/>
+                        </a:solidFill>
+                        <a:effectLst/>
+                        <a:latin typeface="Open Sans" panose="020B0606030504020204" pitchFamily="34" charset="0"/>
+                        <a:ea typeface="Open Sans" panose="020B0606030504020204" pitchFamily="34" charset="0"/>
+                        <a:cs typeface="Open Sans" panose="020B0606030504020204" pitchFamily="34" charset="0"/>
+                      </a:endParaRPr>
+                    </a:p>
+                  </a:txBody>
+                  <a:tcPr marL="24584" marR="24584" marT="24584" marB="0" anchor="ctr"/>
+                </a:tc>
+                <a:extLst>
+                  <a:ext uri="{0D108BD9-81ED-4DB2-BD59-A6C34878D82A}">
+                    <a16:rowId xmlns:a16="http://schemas.microsoft.com/office/drawing/2014/main" val="489575130"/>
+                  </a:ext>
+                </a:extLst>
+              </a:tr>
+            </a:tbl>
+          </a:graphicData>
+        </a:graphic>
+      </p:graphicFrame>
+    </p:spTree>
+    <p:extLst>
+      <p:ext uri="{BB962C8B-B14F-4D97-AF65-F5344CB8AC3E}">
+        <p14:creationId xmlns:p14="http://schemas.microsoft.com/office/powerpoint/2010/main" val="3769724397"/>
+      </p:ext>
+    </p:extLst>
+  </p:cSld>
+  <p:clrMapOvr>
+    <a:masterClrMapping/>
+  </p:clrMapOvr>
+</p:sld>
+</file>
+
+<file path=ppt/slides/slide52.xml><?xml version="1.0" encoding="utf-8"?>
 <p:sld xmlns:a="http://schemas.openxmlformats.org/drawingml/2006/main" xmlns:r="http://schemas.openxmlformats.org/officeDocument/2006/relationships" xmlns:p="http://schemas.openxmlformats.org/presentationml/2006/main" showMasterSp="0">
   <p:cSld>
     <p:spTree>
@@ -23561,7 +24400,7 @@
 </p:sld>
 </file>
 
-<file path=ppt/slides/slide52.xml><?xml version="1.0" encoding="utf-8"?>
+<file path=ppt/slides/slide53.xml><?xml version="1.0" encoding="utf-8"?>
 <p:sld xmlns:a="http://schemas.openxmlformats.org/drawingml/2006/main" xmlns:r="http://schemas.openxmlformats.org/officeDocument/2006/relationships" xmlns:p="http://schemas.openxmlformats.org/presentationml/2006/main">
   <p:cSld>
     <p:spTree>
@@ -23812,7 +24651,7 @@
 </p:sld>
 </file>
 
-<file path=ppt/slides/slide53.xml><?xml version="1.0" encoding="utf-8"?>
+<file path=ppt/slides/slide54.xml><?xml version="1.0" encoding="utf-8"?>
 <p:sld xmlns:a="http://schemas.openxmlformats.org/drawingml/2006/main" xmlns:r="http://schemas.openxmlformats.org/officeDocument/2006/relationships" xmlns:p="http://schemas.openxmlformats.org/presentationml/2006/main">
   <p:cSld>
     <p:spTree>
@@ -24049,7 +24888,7 @@
 </p:sld>
 </file>
 
-<file path=ppt/slides/slide54.xml><?xml version="1.0" encoding="utf-8"?>
+<file path=ppt/slides/slide55.xml><?xml version="1.0" encoding="utf-8"?>
 <p:sld xmlns:a="http://schemas.openxmlformats.org/drawingml/2006/main" xmlns:r="http://schemas.openxmlformats.org/officeDocument/2006/relationships" xmlns:p="http://schemas.openxmlformats.org/presentationml/2006/main">
   <p:cSld>
     <p:spTree>
@@ -24293,7 +25132,7 @@
 </p:sld>
 </file>
 
-<file path=ppt/slides/slide55.xml><?xml version="1.0" encoding="utf-8"?>
+<file path=ppt/slides/slide56.xml><?xml version="1.0" encoding="utf-8"?>
 <p:sld xmlns:a="http://schemas.openxmlformats.org/drawingml/2006/main" xmlns:r="http://schemas.openxmlformats.org/officeDocument/2006/relationships" xmlns:p="http://schemas.openxmlformats.org/presentationml/2006/main">
   <p:cSld>
     <p:spTree>
@@ -24549,7 +25388,7 @@
 </p:sld>
 </file>
 
-<file path=ppt/slides/slide56.xml><?xml version="1.0" encoding="utf-8"?>
+<file path=ppt/slides/slide57.xml><?xml version="1.0" encoding="utf-8"?>
 <p:sld xmlns:a="http://schemas.openxmlformats.org/drawingml/2006/main" xmlns:r="http://schemas.openxmlformats.org/officeDocument/2006/relationships" xmlns:p="http://schemas.openxmlformats.org/presentationml/2006/main">
   <p:cSld>
     <p:spTree>
@@ -24781,7 +25620,7 @@
 </p:sld>
 </file>
 
-<file path=ppt/slides/slide57.xml><?xml version="1.0" encoding="utf-8"?>
+<file path=ppt/slides/slide58.xml><?xml version="1.0" encoding="utf-8"?>
 <p:sld xmlns:a="http://schemas.openxmlformats.org/drawingml/2006/main" xmlns:r="http://schemas.openxmlformats.org/officeDocument/2006/relationships" xmlns:p="http://schemas.openxmlformats.org/presentationml/2006/main">
   <p:cSld>
     <p:spTree>
@@ -24812,8 +25651,8 @@
         </p:nvSpPr>
         <p:spPr>
           <a:xfrm>
-            <a:off x="-1175583" y="139900"/>
-            <a:ext cx="6921500" cy="646331"/>
+            <a:off x="5976757" y="90745"/>
+            <a:ext cx="6921500" cy="584775"/>
           </a:xfrm>
           <a:prstGeom prst="rect">
             <a:avLst/>
@@ -24828,259 +25667,1307 @@
           <a:p>
             <a:pPr algn="ctr"/>
             <a:r>
-              <a:rPr lang="en-US" sz="3600" b="1" dirty="0">
+              <a:rPr lang="en-US" sz="3200" b="1" noProof="1">
                 <a:latin typeface="Open Sans Semibold" panose="020B0706030804020204" pitchFamily="34" charset="0"/>
                 <a:ea typeface="Open Sans Semibold" panose="020B0706030804020204" pitchFamily="34" charset="0"/>
                 <a:cs typeface="Open Sans Semibold" panose="020B0706030804020204" pitchFamily="34" charset="0"/>
               </a:rPr>
               <a:t>Typical Journey</a:t>
             </a:r>
-            <a:endParaRPr lang="ru-RU" sz="3600" b="1" dirty="0">
-              <a:latin typeface="Open Sans Semibold" panose="020B0706030804020204" pitchFamily="34" charset="0"/>
-              <a:ea typeface="Open Sans Semibold" panose="020B0706030804020204" pitchFamily="34" charset="0"/>
-              <a:cs typeface="Open Sans Semibold" panose="020B0706030804020204" pitchFamily="34" charset="0"/>
-            </a:endParaRPr>
           </a:p>
         </p:txBody>
       </p:sp>
-      <p:sp>
-        <p:nvSpPr>
-          <p:cNvPr id="4" name="TextBox 3">
+      <p:grpSp>
+        <p:nvGrpSpPr>
+          <p:cNvPr id="82" name="Group 81">
             <a:extLst>
               <a:ext uri="{FF2B5EF4-FFF2-40B4-BE49-F238E27FC236}">
-                <a16:creationId xmlns:a16="http://schemas.microsoft.com/office/drawing/2014/main" id="{1229D219-A08D-4E1C-93E4-BEFD0EE05799}"/>
+                <a16:creationId xmlns:a16="http://schemas.microsoft.com/office/drawing/2014/main" id="{9A6CE2AB-7F2C-49FA-88C7-1A76806C6895}"/>
               </a:ext>
             </a:extLst>
           </p:cNvPr>
-          <p:cNvSpPr txBox="1"/>
+          <p:cNvGrpSpPr/>
           <p:nvPr/>
-        </p:nvSpPr>
-        <p:spPr>
+        </p:nvGrpSpPr>
+        <p:grpSpPr>
           <a:xfrm>
-            <a:off x="271850" y="1421942"/>
-            <a:ext cx="5197458" cy="4893647"/>
+            <a:off x="852045" y="500468"/>
+            <a:ext cx="10470876" cy="6098970"/>
+            <a:chOff x="1662148" y="512660"/>
+            <a:chExt cx="7436864" cy="6098970"/>
           </a:xfrm>
-          <a:prstGeom prst="rect">
-            <a:avLst/>
-          </a:prstGeom>
-          <a:noFill/>
-        </p:spPr>
-        <p:txBody>
-          <a:bodyPr wrap="square" rtlCol="0">
-            <a:spAutoFit/>
-          </a:bodyPr>
-          <a:lstStyle/>
-          <a:p>
-            <a:r>
-              <a:rPr lang="en-US" sz="2400" noProof="1">
-                <a:latin typeface="HelveticaNeue" panose="00000400000000000000" pitchFamily="2" charset="0"/>
-              </a:rPr>
-              <a:t>Browser requests:</a:t>
-            </a:r>
-          </a:p>
-          <a:p>
-            <a:pPr marL="461963" indent="-171450">
-              <a:buFontTx/>
-              <a:buChar char="-"/>
-            </a:pPr>
-            <a:r>
-              <a:rPr lang="en-US" sz="2400" noProof="1">
+        </p:grpSpPr>
+        <p:cxnSp>
+          <p:nvCxnSpPr>
+            <p:cNvPr id="32" name="Straight Arrow Connector 31">
+              <a:extLst>
+                <a:ext uri="{FF2B5EF4-FFF2-40B4-BE49-F238E27FC236}">
+                  <a16:creationId xmlns:a16="http://schemas.microsoft.com/office/drawing/2014/main" id="{FC4FFBD6-B6B3-46DD-87AA-69150A6929F9}"/>
+                </a:ext>
+              </a:extLst>
+            </p:cNvPr>
+            <p:cNvCxnSpPr>
+              <a:cxnSpLocks/>
+              <a:stCxn id="33" idx="3"/>
+            </p:cNvCxnSpPr>
+            <p:nvPr/>
+          </p:nvCxnSpPr>
+          <p:spPr>
+            <a:xfrm flipV="1">
+              <a:off x="6530200" y="1684036"/>
+              <a:ext cx="1765992" cy="33798"/>
+            </a:xfrm>
+            <a:prstGeom prst="straightConnector1">
+              <a:avLst/>
+            </a:prstGeom>
+            <a:ln w="38100">
+              <a:solidFill>
+                <a:srgbClr val="FF0000"/>
+              </a:solidFill>
+              <a:tailEnd type="triangle"/>
+            </a:ln>
+          </p:spPr>
+          <p:style>
+            <a:lnRef idx="1">
+              <a:schemeClr val="accent1"/>
+            </a:lnRef>
+            <a:fillRef idx="0">
+              <a:schemeClr val="accent1"/>
+            </a:fillRef>
+            <a:effectRef idx="0">
+              <a:schemeClr val="accent1"/>
+            </a:effectRef>
+            <a:fontRef idx="minor">
+              <a:schemeClr val="tx1"/>
+            </a:fontRef>
+          </p:style>
+        </p:cxnSp>
+        <p:grpSp>
+          <p:nvGrpSpPr>
+            <p:cNvPr id="49" name="Group 48">
+              <a:extLst>
+                <a:ext uri="{FF2B5EF4-FFF2-40B4-BE49-F238E27FC236}">
+                  <a16:creationId xmlns:a16="http://schemas.microsoft.com/office/drawing/2014/main" id="{B9627B89-2122-4E8A-AD4A-9D3C5CCBAC95}"/>
+                </a:ext>
+              </a:extLst>
+            </p:cNvPr>
+            <p:cNvGrpSpPr/>
+            <p:nvPr/>
+          </p:nvGrpSpPr>
+          <p:grpSpPr>
+            <a:xfrm>
+              <a:off x="1662148" y="512660"/>
+              <a:ext cx="7436864" cy="6098970"/>
+              <a:chOff x="1662148" y="512660"/>
+              <a:chExt cx="7436864" cy="6098970"/>
+            </a:xfrm>
+          </p:grpSpPr>
+          <p:cxnSp>
+            <p:nvCxnSpPr>
+              <p:cNvPr id="34" name="Straight Arrow Connector 33">
+                <a:extLst>
+                  <a:ext uri="{FF2B5EF4-FFF2-40B4-BE49-F238E27FC236}">
+                    <a16:creationId xmlns:a16="http://schemas.microsoft.com/office/drawing/2014/main" id="{AB1C693E-DB6C-427A-8D99-8F6011E0C500}"/>
+                  </a:ext>
+                </a:extLst>
+              </p:cNvPr>
+              <p:cNvCxnSpPr>
+                <a:cxnSpLocks/>
+              </p:cNvCxnSpPr>
+              <p:nvPr/>
+            </p:nvCxnSpPr>
+            <p:spPr>
+              <a:xfrm>
+                <a:off x="5353488" y="2606893"/>
+                <a:ext cx="2942702" cy="0"/>
+              </a:xfrm>
+              <a:prstGeom prst="straightConnector1">
+                <a:avLst/>
+              </a:prstGeom>
+              <a:ln w="38100">
                 <a:solidFill>
-                  <a:schemeClr val="accent2"/>
+                  <a:srgbClr val="0DA31B"/>
                 </a:solidFill>
-                <a:latin typeface="HelveticaNeue" panose="00000400000000000000" pitchFamily="2" charset="0"/>
-              </a:rPr>
-              <a:t>index.html</a:t>
-            </a:r>
-          </a:p>
-          <a:p>
-            <a:r>
-              <a:rPr lang="en-US" sz="2400" noProof="1">
-                <a:latin typeface="HelveticaNeue" panose="00000400000000000000" pitchFamily="2" charset="0"/>
-              </a:rPr>
-              <a:t>Server will notice that it need: </a:t>
-            </a:r>
-          </a:p>
-          <a:p>
-            <a:pPr marL="461963" indent="-171450">
-              <a:buFontTx/>
-              <a:buChar char="-"/>
-            </a:pPr>
-            <a:r>
-              <a:rPr lang="en-US" sz="2400" noProof="1">
+                <a:tailEnd type="triangle"/>
+              </a:ln>
+            </p:spPr>
+            <p:style>
+              <a:lnRef idx="1">
+                <a:schemeClr val="accent1"/>
+              </a:lnRef>
+              <a:fillRef idx="0">
+                <a:schemeClr val="accent1"/>
+              </a:fillRef>
+              <a:effectRef idx="0">
+                <a:schemeClr val="accent1"/>
+              </a:effectRef>
+              <a:fontRef idx="minor">
+                <a:schemeClr val="tx1"/>
+              </a:fontRef>
+            </p:style>
+          </p:cxnSp>
+          <p:sp>
+            <p:nvSpPr>
+              <p:cNvPr id="35" name="TextBox 34">
+                <a:extLst>
+                  <a:ext uri="{FF2B5EF4-FFF2-40B4-BE49-F238E27FC236}">
+                    <a16:creationId xmlns:a16="http://schemas.microsoft.com/office/drawing/2014/main" id="{0AACA85E-A654-44F9-9774-31F4C71109ED}"/>
+                  </a:ext>
+                </a:extLst>
+              </p:cNvPr>
+              <p:cNvSpPr txBox="1"/>
+              <p:nvPr/>
+            </p:nvSpPr>
+            <p:spPr>
+              <a:xfrm>
+                <a:off x="5903748" y="2437616"/>
+                <a:ext cx="1692070" cy="369332"/>
+              </a:xfrm>
+              <a:prstGeom prst="rect">
+                <a:avLst/>
+              </a:prstGeom>
+              <a:solidFill>
+                <a:srgbClr val="C7E6A4"/>
+              </a:solidFill>
+            </p:spPr>
+            <p:txBody>
+              <a:bodyPr wrap="none" rtlCol="0">
+                <a:spAutoFit/>
+              </a:bodyPr>
+              <a:lstStyle/>
+              <a:p>
+                <a:pPr algn="ctr"/>
+                <a:r>
+                  <a:rPr lang="en-US" noProof="1">
+                    <a:latin typeface="Open Sans Semibold" panose="020B0706030804020204" pitchFamily="34" charset="0"/>
+                    <a:ea typeface="Open Sans Semibold" panose="020B0706030804020204" pitchFamily="34" charset="0"/>
+                    <a:cs typeface="Open Sans Semibold" panose="020B0706030804020204" pitchFamily="34" charset="0"/>
+                  </a:rPr>
+                  <a:t>setPath(“/style.css”)</a:t>
+                </a:r>
+              </a:p>
+            </p:txBody>
+          </p:sp>
+          <p:cxnSp>
+            <p:nvCxnSpPr>
+              <p:cNvPr id="36" name="Straight Arrow Connector 35">
+                <a:extLst>
+                  <a:ext uri="{FF2B5EF4-FFF2-40B4-BE49-F238E27FC236}">
+                    <a16:creationId xmlns:a16="http://schemas.microsoft.com/office/drawing/2014/main" id="{4B99988E-C454-4FAE-911F-D857D691009A}"/>
+                  </a:ext>
+                </a:extLst>
+              </p:cNvPr>
+              <p:cNvCxnSpPr>
+                <a:cxnSpLocks/>
+              </p:cNvCxnSpPr>
+              <p:nvPr/>
+            </p:nvCxnSpPr>
+            <p:spPr>
+              <a:xfrm>
+                <a:off x="5353488" y="3276290"/>
+                <a:ext cx="2942702" cy="0"/>
+              </a:xfrm>
+              <a:prstGeom prst="straightConnector1">
+                <a:avLst/>
+              </a:prstGeom>
+              <a:ln w="38100">
                 <a:solidFill>
-                  <a:schemeClr val="accent2"/>
+                  <a:srgbClr val="0DA31B"/>
                 </a:solidFill>
-                <a:latin typeface="HelveticaNeue" panose="00000400000000000000" pitchFamily="2" charset="0"/>
-              </a:rPr>
-              <a:t>style_1.css</a:t>
-            </a:r>
-          </a:p>
-          <a:p>
-            <a:pPr marL="461963" indent="-171450">
-              <a:buFontTx/>
-              <a:buChar char="-"/>
-            </a:pPr>
-            <a:r>
-              <a:rPr lang="en-US" sz="2400" noProof="1">
+                <a:tailEnd type="triangle"/>
+              </a:ln>
+            </p:spPr>
+            <p:style>
+              <a:lnRef idx="1">
+                <a:schemeClr val="accent1"/>
+              </a:lnRef>
+              <a:fillRef idx="0">
+                <a:schemeClr val="accent1"/>
+              </a:fillRef>
+              <a:effectRef idx="0">
+                <a:schemeClr val="accent1"/>
+              </a:effectRef>
+              <a:fontRef idx="minor">
+                <a:schemeClr val="tx1"/>
+              </a:fontRef>
+            </p:style>
+          </p:cxnSp>
+          <p:sp>
+            <p:nvSpPr>
+              <p:cNvPr id="37" name="TextBox 36">
+                <a:extLst>
+                  <a:ext uri="{FF2B5EF4-FFF2-40B4-BE49-F238E27FC236}">
+                    <a16:creationId xmlns:a16="http://schemas.microsoft.com/office/drawing/2014/main" id="{4C73C506-2394-4D9A-AAE9-B30B41350548}"/>
+                  </a:ext>
+                </a:extLst>
+              </p:cNvPr>
+              <p:cNvSpPr txBox="1"/>
+              <p:nvPr/>
+            </p:nvSpPr>
+            <p:spPr>
+              <a:xfrm>
+                <a:off x="6434050" y="3107013"/>
+                <a:ext cx="667402" cy="369332"/>
+              </a:xfrm>
+              <a:prstGeom prst="rect">
+                <a:avLst/>
+              </a:prstGeom>
+              <a:solidFill>
+                <a:srgbClr val="C7E6A4"/>
+              </a:solidFill>
+            </p:spPr>
+            <p:txBody>
+              <a:bodyPr wrap="none" rtlCol="0">
+                <a:spAutoFit/>
+              </a:bodyPr>
+              <a:lstStyle/>
+              <a:p>
+                <a:pPr algn="ctr"/>
+                <a:r>
+                  <a:rPr lang="en-US" noProof="1">
+                    <a:latin typeface="Open Sans Semibold" panose="020B0706030804020204" pitchFamily="34" charset="0"/>
+                    <a:ea typeface="Open Sans Semibold" panose="020B0706030804020204" pitchFamily="34" charset="0"/>
+                    <a:cs typeface="Open Sans Semibold" panose="020B0706030804020204" pitchFamily="34" charset="0"/>
+                  </a:rPr>
+                  <a:t>push( )</a:t>
+                </a:r>
+              </a:p>
+            </p:txBody>
+          </p:sp>
+          <p:cxnSp>
+            <p:nvCxnSpPr>
+              <p:cNvPr id="38" name="Straight Arrow Connector 37">
+                <a:extLst>
+                  <a:ext uri="{FF2B5EF4-FFF2-40B4-BE49-F238E27FC236}">
+                    <a16:creationId xmlns:a16="http://schemas.microsoft.com/office/drawing/2014/main" id="{A80B9595-3CFF-4CDA-B2E0-31AB76818C84}"/>
+                  </a:ext>
+                </a:extLst>
+              </p:cNvPr>
+              <p:cNvCxnSpPr>
+                <a:cxnSpLocks/>
+              </p:cNvCxnSpPr>
+              <p:nvPr/>
+            </p:nvCxnSpPr>
+            <p:spPr>
+              <a:xfrm>
+                <a:off x="5353488" y="3879494"/>
+                <a:ext cx="2942702" cy="0"/>
+              </a:xfrm>
+              <a:prstGeom prst="straightConnector1">
+                <a:avLst/>
+              </a:prstGeom>
+              <a:ln w="38100">
                 <a:solidFill>
-                  <a:schemeClr val="accent2"/>
+                  <a:srgbClr val="0DA31B"/>
                 </a:solidFill>
-                <a:latin typeface="HelveticaNeue" panose="00000400000000000000" pitchFamily="2" charset="0"/>
-              </a:rPr>
-              <a:t>javaScript_1.js </a:t>
-            </a:r>
-          </a:p>
-          <a:p>
-            <a:pPr marL="342900" indent="-342900">
-              <a:buFontTx/>
-              <a:buChar char="-"/>
-            </a:pPr>
-            <a:endParaRPr lang="en-US" sz="2400" noProof="1">
-              <a:latin typeface="HelveticaNeue" panose="00000400000000000000" pitchFamily="2" charset="0"/>
-            </a:endParaRPr>
-          </a:p>
-          <a:p>
-            <a:r>
-              <a:rPr lang="en-US" sz="2400" noProof="1">
-                <a:latin typeface="HelveticaNeue" panose="00000400000000000000" pitchFamily="2" charset="0"/>
-              </a:rPr>
-              <a:t>We get a </a:t>
-            </a:r>
-            <a:r>
-              <a:rPr lang="en-US" sz="2400" noProof="1">
+                <a:tailEnd type="triangle"/>
+              </a:ln>
+            </p:spPr>
+            <p:style>
+              <a:lnRef idx="1">
+                <a:schemeClr val="accent1"/>
+              </a:lnRef>
+              <a:fillRef idx="0">
+                <a:schemeClr val="accent1"/>
+              </a:fillRef>
+              <a:effectRef idx="0">
+                <a:schemeClr val="accent1"/>
+              </a:effectRef>
+              <a:fontRef idx="minor">
+                <a:schemeClr val="tx1"/>
+              </a:fontRef>
+            </p:style>
+          </p:cxnSp>
+          <p:sp>
+            <p:nvSpPr>
+              <p:cNvPr id="39" name="TextBox 38">
+                <a:extLst>
+                  <a:ext uri="{FF2B5EF4-FFF2-40B4-BE49-F238E27FC236}">
+                    <a16:creationId xmlns:a16="http://schemas.microsoft.com/office/drawing/2014/main" id="{8A598FD0-DD6F-4146-9FCC-6C80ACE01DBB}"/>
+                  </a:ext>
+                </a:extLst>
+              </p:cNvPr>
+              <p:cNvSpPr txBox="1"/>
+              <p:nvPr/>
+            </p:nvSpPr>
+            <p:spPr>
+              <a:xfrm>
+                <a:off x="5906407" y="3710217"/>
+                <a:ext cx="1702591" cy="369332"/>
+              </a:xfrm>
+              <a:prstGeom prst="rect">
+                <a:avLst/>
+              </a:prstGeom>
+              <a:solidFill>
+                <a:srgbClr val="C7E6A4"/>
+              </a:solidFill>
+            </p:spPr>
+            <p:txBody>
+              <a:bodyPr wrap="none" rtlCol="0">
+                <a:spAutoFit/>
+              </a:bodyPr>
+              <a:lstStyle/>
+              <a:p>
+                <a:pPr algn="ctr"/>
+                <a:r>
+                  <a:rPr lang="en-US" noProof="1">
+                    <a:latin typeface="Open Sans Semibold" panose="020B0706030804020204" pitchFamily="34" charset="0"/>
+                    <a:ea typeface="Open Sans Semibold" panose="020B0706030804020204" pitchFamily="34" charset="0"/>
+                    <a:cs typeface="Open Sans Semibold" panose="020B0706030804020204" pitchFamily="34" charset="0"/>
+                  </a:rPr>
+                  <a:t>setPath(“/jquery.js”)</a:t>
+                </a:r>
+              </a:p>
+            </p:txBody>
+          </p:sp>
+          <p:cxnSp>
+            <p:nvCxnSpPr>
+              <p:cNvPr id="40" name="Straight Arrow Connector 39">
+                <a:extLst>
+                  <a:ext uri="{FF2B5EF4-FFF2-40B4-BE49-F238E27FC236}">
+                    <a16:creationId xmlns:a16="http://schemas.microsoft.com/office/drawing/2014/main" id="{12366110-78F5-45ED-A0AF-319967CE4737}"/>
+                  </a:ext>
+                </a:extLst>
+              </p:cNvPr>
+              <p:cNvCxnSpPr>
+                <a:cxnSpLocks/>
+              </p:cNvCxnSpPr>
+              <p:nvPr/>
+            </p:nvCxnSpPr>
+            <p:spPr>
+              <a:xfrm>
+                <a:off x="5353488" y="4548891"/>
+                <a:ext cx="2942702" cy="0"/>
+              </a:xfrm>
+              <a:prstGeom prst="straightConnector1">
+                <a:avLst/>
+              </a:prstGeom>
+              <a:ln w="38100">
                 <a:solidFill>
-                  <a:schemeClr val="accent2"/>
+                  <a:srgbClr val="0DA31B"/>
                 </a:solidFill>
-                <a:latin typeface="HelveticaNeue" panose="00000400000000000000" pitchFamily="2" charset="0"/>
-              </a:rPr>
-              <a:t>PushBuilder</a:t>
-            </a:r>
-            <a:r>
-              <a:rPr lang="en-US" sz="2400" noProof="1">
-                <a:latin typeface="HelveticaNeue" panose="00000400000000000000" pitchFamily="2" charset="0"/>
-              </a:rPr>
-              <a:t> </a:t>
-            </a:r>
-          </a:p>
-          <a:p>
-            <a:r>
-              <a:rPr lang="en-US" sz="2400" noProof="1">
-                <a:latin typeface="HelveticaNeue" panose="00000400000000000000" pitchFamily="2" charset="0"/>
-              </a:rPr>
-              <a:t>from the HTTP request</a:t>
-            </a:r>
-          </a:p>
-          <a:p>
-            <a:endParaRPr lang="en-US" sz="2400" noProof="1">
-              <a:latin typeface="HelveticaNeue" panose="00000400000000000000" pitchFamily="2" charset="0"/>
-            </a:endParaRPr>
-          </a:p>
-          <a:p>
-            <a:r>
-              <a:rPr lang="en-US" sz="2400" noProof="1">
-                <a:latin typeface="HelveticaNeue" panose="00000400000000000000" pitchFamily="2" charset="0"/>
-              </a:rPr>
-              <a:t>Set the path to the </a:t>
-            </a:r>
-            <a:r>
-              <a:rPr lang="en-US" sz="2400" noProof="1">
+                <a:tailEnd type="triangle"/>
+              </a:ln>
+            </p:spPr>
+            <p:style>
+              <a:lnRef idx="1">
+                <a:schemeClr val="accent1"/>
+              </a:lnRef>
+              <a:fillRef idx="0">
+                <a:schemeClr val="accent1"/>
+              </a:fillRef>
+              <a:effectRef idx="0">
+                <a:schemeClr val="accent1"/>
+              </a:effectRef>
+              <a:fontRef idx="minor">
+                <a:schemeClr val="tx1"/>
+              </a:fontRef>
+            </p:style>
+          </p:cxnSp>
+          <p:sp>
+            <p:nvSpPr>
+              <p:cNvPr id="41" name="TextBox 40">
+                <a:extLst>
+                  <a:ext uri="{FF2B5EF4-FFF2-40B4-BE49-F238E27FC236}">
+                    <a16:creationId xmlns:a16="http://schemas.microsoft.com/office/drawing/2014/main" id="{CCC1A30A-9F26-4B39-9EDE-4CE4A1CB67C5}"/>
+                  </a:ext>
+                </a:extLst>
+              </p:cNvPr>
+              <p:cNvSpPr txBox="1"/>
+              <p:nvPr/>
+            </p:nvSpPr>
+            <p:spPr>
+              <a:xfrm>
+                <a:off x="6434050" y="4379614"/>
+                <a:ext cx="667402" cy="369332"/>
+              </a:xfrm>
+              <a:prstGeom prst="rect">
+                <a:avLst/>
+              </a:prstGeom>
+              <a:solidFill>
+                <a:srgbClr val="C7E6A4"/>
+              </a:solidFill>
+            </p:spPr>
+            <p:txBody>
+              <a:bodyPr wrap="none" rtlCol="0">
+                <a:spAutoFit/>
+              </a:bodyPr>
+              <a:lstStyle/>
+              <a:p>
+                <a:pPr algn="ctr"/>
+                <a:r>
+                  <a:rPr lang="en-US" noProof="1">
+                    <a:latin typeface="Open Sans Semibold" panose="020B0706030804020204" pitchFamily="34" charset="0"/>
+                    <a:ea typeface="Open Sans Semibold" panose="020B0706030804020204" pitchFamily="34" charset="0"/>
+                    <a:cs typeface="Open Sans Semibold" panose="020B0706030804020204" pitchFamily="34" charset="0"/>
+                  </a:rPr>
+                  <a:t>push( )</a:t>
+                </a:r>
+              </a:p>
+            </p:txBody>
+          </p:sp>
+          <p:cxnSp>
+            <p:nvCxnSpPr>
+              <p:cNvPr id="42" name="Straight Arrow Connector 41">
+                <a:extLst>
+                  <a:ext uri="{FF2B5EF4-FFF2-40B4-BE49-F238E27FC236}">
+                    <a16:creationId xmlns:a16="http://schemas.microsoft.com/office/drawing/2014/main" id="{1171E215-E063-4C41-8468-EA175AAFA161}"/>
+                  </a:ext>
+                </a:extLst>
+              </p:cNvPr>
+              <p:cNvCxnSpPr>
+                <a:cxnSpLocks/>
+              </p:cNvCxnSpPr>
+              <p:nvPr/>
+            </p:nvCxnSpPr>
+            <p:spPr>
+              <a:xfrm flipH="1">
+                <a:off x="2284703" y="5206147"/>
+                <a:ext cx="6011488" cy="0"/>
+              </a:xfrm>
+              <a:prstGeom prst="straightConnector1">
+                <a:avLst/>
+              </a:prstGeom>
+              <a:ln w="38100">
                 <a:solidFill>
-                  <a:schemeClr val="accent2"/>
+                  <a:srgbClr val="0070C0"/>
                 </a:solidFill>
-                <a:latin typeface="HelveticaNeue" panose="00000400000000000000" pitchFamily="2" charset="0"/>
-              </a:rPr>
-              <a:t>style_1.css</a:t>
-            </a:r>
-            <a:r>
-              <a:rPr lang="en-US" sz="2400" noProof="1">
-                <a:latin typeface="HelveticaNeue" panose="00000400000000000000" pitchFamily="2" charset="0"/>
-              </a:rPr>
-              <a:t> </a:t>
-            </a:r>
-          </a:p>
-          <a:p>
-            <a:r>
-              <a:rPr lang="en-US" sz="2400" noProof="1">
-                <a:latin typeface="HelveticaNeue" panose="00000400000000000000" pitchFamily="2" charset="0"/>
-              </a:rPr>
-              <a:t>and invoke push, then </a:t>
-            </a:r>
-          </a:p>
-          <a:p>
-            <a:r>
-              <a:rPr lang="en-US" sz="2400" noProof="1">
-                <a:latin typeface="HelveticaNeue" panose="00000400000000000000" pitchFamily="2" charset="0"/>
-              </a:rPr>
-              <a:t>set the path to the </a:t>
-            </a:r>
-            <a:r>
-              <a:rPr lang="en-US" sz="2400" noProof="1">
+                <a:tailEnd type="triangle"/>
+              </a:ln>
+            </p:spPr>
+            <p:style>
+              <a:lnRef idx="1">
+                <a:schemeClr val="accent1"/>
+              </a:lnRef>
+              <a:fillRef idx="0">
+                <a:schemeClr val="accent1"/>
+              </a:fillRef>
+              <a:effectRef idx="0">
+                <a:schemeClr val="accent1"/>
+              </a:effectRef>
+              <a:fontRef idx="minor">
+                <a:schemeClr val="tx1"/>
+              </a:fontRef>
+            </p:style>
+          </p:cxnSp>
+          <p:sp>
+            <p:nvSpPr>
+              <p:cNvPr id="45" name="TextBox 44">
+                <a:extLst>
+                  <a:ext uri="{FF2B5EF4-FFF2-40B4-BE49-F238E27FC236}">
+                    <a16:creationId xmlns:a16="http://schemas.microsoft.com/office/drawing/2014/main" id="{6D73CABB-A769-4F8D-9968-51AAC2C57F7F}"/>
+                  </a:ext>
+                </a:extLst>
+              </p:cNvPr>
+              <p:cNvSpPr txBox="1"/>
+              <p:nvPr/>
+            </p:nvSpPr>
+            <p:spPr>
+              <a:xfrm>
+                <a:off x="3218271" y="5036870"/>
+                <a:ext cx="789224" cy="369332"/>
+              </a:xfrm>
+              <a:prstGeom prst="rect">
+                <a:avLst/>
+              </a:prstGeom>
+              <a:solidFill>
+                <a:srgbClr val="A0DCE8"/>
+              </a:solidFill>
+            </p:spPr>
+            <p:txBody>
+              <a:bodyPr wrap="none" rtlCol="0">
+                <a:spAutoFit/>
+              </a:bodyPr>
+              <a:lstStyle/>
+              <a:p>
+                <a:pPr algn="ctr"/>
+                <a:r>
+                  <a:rPr lang="en-US" noProof="1">
+                    <a:latin typeface="Open Sans Semibold" panose="020B0706030804020204" pitchFamily="34" charset="0"/>
+                    <a:ea typeface="Open Sans Semibold" panose="020B0706030804020204" pitchFamily="34" charset="0"/>
+                    <a:cs typeface="Open Sans Semibold" panose="020B0706030804020204" pitchFamily="34" charset="0"/>
+                  </a:rPr>
+                  <a:t>style.css</a:t>
+                </a:r>
+              </a:p>
+            </p:txBody>
+          </p:sp>
+          <p:cxnSp>
+            <p:nvCxnSpPr>
+              <p:cNvPr id="46" name="Straight Arrow Connector 45">
+                <a:extLst>
+                  <a:ext uri="{FF2B5EF4-FFF2-40B4-BE49-F238E27FC236}">
+                    <a16:creationId xmlns:a16="http://schemas.microsoft.com/office/drawing/2014/main" id="{A6A88868-E953-401A-B672-45B1A09700C0}"/>
+                  </a:ext>
+                </a:extLst>
+              </p:cNvPr>
+              <p:cNvCxnSpPr>
+                <a:cxnSpLocks/>
+              </p:cNvCxnSpPr>
+              <p:nvPr/>
+            </p:nvCxnSpPr>
+            <p:spPr>
+              <a:xfrm flipH="1">
+                <a:off x="2284703" y="5799668"/>
+                <a:ext cx="6011488" cy="0"/>
+              </a:xfrm>
+              <a:prstGeom prst="straightConnector1">
+                <a:avLst/>
+              </a:prstGeom>
+              <a:ln w="38100">
                 <a:solidFill>
-                  <a:schemeClr val="accent2"/>
+                  <a:srgbClr val="0070C0"/>
                 </a:solidFill>
-                <a:latin typeface="HelveticaNeue" panose="00000400000000000000" pitchFamily="2" charset="0"/>
-              </a:rPr>
-              <a:t>javaScript_1.js </a:t>
-            </a:r>
-          </a:p>
-          <a:p>
-            <a:r>
-              <a:rPr lang="en-US" sz="2400" noProof="1">
-                <a:latin typeface="HelveticaNeue" panose="00000400000000000000" pitchFamily="2" charset="0"/>
-              </a:rPr>
-              <a:t>and invoke a push again.</a:t>
-            </a:r>
-          </a:p>
-        </p:txBody>
-      </p:sp>
-      <p:pic>
-        <p:nvPicPr>
-          <p:cNvPr id="1026" name="Picture 2" descr="typical_journey cropped">
-            <a:extLst>
-              <a:ext uri="{FF2B5EF4-FFF2-40B4-BE49-F238E27FC236}">
-                <a16:creationId xmlns:a16="http://schemas.microsoft.com/office/drawing/2014/main" id="{EB1A8C25-334C-4234-BF03-C4EF6BAD093C}"/>
-              </a:ext>
-            </a:extLst>
-          </p:cNvPr>
-          <p:cNvPicPr>
-            <a:picLocks noChangeAspect="1" noChangeArrowheads="1"/>
-          </p:cNvPicPr>
-          <p:nvPr/>
-        </p:nvPicPr>
-        <p:blipFill>
-          <a:blip r:embed="rId2">
-            <a:extLst>
-              <a:ext uri="{28A0092B-C50C-407E-A947-70E740481C1C}">
-                <a14:useLocalDpi xmlns:a14="http://schemas.microsoft.com/office/drawing/2010/main" val="0"/>
-              </a:ext>
-            </a:extLst>
-          </a:blip>
-          <a:srcRect/>
-          <a:stretch>
-            <a:fillRect/>
-          </a:stretch>
-        </p:blipFill>
-        <p:spPr bwMode="auto">
-          <a:xfrm>
-            <a:off x="5361107" y="150521"/>
-            <a:ext cx="6024888" cy="6572261"/>
-          </a:xfrm>
-          <a:prstGeom prst="rect">
-            <a:avLst/>
-          </a:prstGeom>
-          <a:noFill/>
-          <a:extLst>
-            <a:ext uri="{909E8E84-426E-40DD-AFC4-6F175D3DCCD1}">
-              <a14:hiddenFill xmlns:a14="http://schemas.microsoft.com/office/drawing/2010/main">
-                <a:solidFill>
-                  <a:srgbClr val="FFFFFF"/>
-                </a:solidFill>
-              </a14:hiddenFill>
-            </a:ext>
-          </a:extLst>
-        </p:spPr>
-      </p:pic>
+                <a:tailEnd type="triangle"/>
+              </a:ln>
+            </p:spPr>
+            <p:style>
+              <a:lnRef idx="1">
+                <a:schemeClr val="accent1"/>
+              </a:lnRef>
+              <a:fillRef idx="0">
+                <a:schemeClr val="accent1"/>
+              </a:fillRef>
+              <a:effectRef idx="0">
+                <a:schemeClr val="accent1"/>
+              </a:effectRef>
+              <a:fontRef idx="minor">
+                <a:schemeClr val="tx1"/>
+              </a:fontRef>
+            </p:style>
+          </p:cxnSp>
+          <p:sp>
+            <p:nvSpPr>
+              <p:cNvPr id="47" name="TextBox 46">
+                <a:extLst>
+                  <a:ext uri="{FF2B5EF4-FFF2-40B4-BE49-F238E27FC236}">
+                    <a16:creationId xmlns:a16="http://schemas.microsoft.com/office/drawing/2014/main" id="{7AAC55F1-2B2E-4CE0-8FAA-1F3464D6CC37}"/>
+                  </a:ext>
+                </a:extLst>
+              </p:cNvPr>
+              <p:cNvSpPr txBox="1"/>
+              <p:nvPr/>
+            </p:nvSpPr>
+            <p:spPr>
+              <a:xfrm>
+                <a:off x="3220931" y="5630391"/>
+                <a:ext cx="799743" cy="369332"/>
+              </a:xfrm>
+              <a:prstGeom prst="rect">
+                <a:avLst/>
+              </a:prstGeom>
+              <a:solidFill>
+                <a:srgbClr val="A0DCE8"/>
+              </a:solidFill>
+            </p:spPr>
+            <p:txBody>
+              <a:bodyPr wrap="none" rtlCol="0">
+                <a:spAutoFit/>
+              </a:bodyPr>
+              <a:lstStyle/>
+              <a:p>
+                <a:pPr algn="ctr"/>
+                <a:r>
+                  <a:rPr lang="en-US" noProof="1">
+                    <a:latin typeface="Open Sans Semibold" panose="020B0706030804020204" pitchFamily="34" charset="0"/>
+                    <a:ea typeface="Open Sans Semibold" panose="020B0706030804020204" pitchFamily="34" charset="0"/>
+                    <a:cs typeface="Open Sans Semibold" panose="020B0706030804020204" pitchFamily="34" charset="0"/>
+                  </a:rPr>
+                  <a:t>jquery.js</a:t>
+                </a:r>
+              </a:p>
+            </p:txBody>
+          </p:sp>
+          <p:grpSp>
+            <p:nvGrpSpPr>
+              <p:cNvPr id="44" name="Group 43">
+                <a:extLst>
+                  <a:ext uri="{FF2B5EF4-FFF2-40B4-BE49-F238E27FC236}">
+                    <a16:creationId xmlns:a16="http://schemas.microsoft.com/office/drawing/2014/main" id="{733FD18F-2DAC-4184-A498-60D73F42E691}"/>
+                  </a:ext>
+                </a:extLst>
+              </p:cNvPr>
+              <p:cNvGrpSpPr/>
+              <p:nvPr/>
+            </p:nvGrpSpPr>
+            <p:grpSpPr>
+              <a:xfrm>
+                <a:off x="1662148" y="512660"/>
+                <a:ext cx="7436864" cy="6098970"/>
+                <a:chOff x="1662148" y="512660"/>
+                <a:chExt cx="7436864" cy="6098970"/>
+              </a:xfrm>
+            </p:grpSpPr>
+            <p:grpSp>
+              <p:nvGrpSpPr>
+                <p:cNvPr id="23" name="Group 22">
+                  <a:extLst>
+                    <a:ext uri="{FF2B5EF4-FFF2-40B4-BE49-F238E27FC236}">
+                      <a16:creationId xmlns:a16="http://schemas.microsoft.com/office/drawing/2014/main" id="{60C7EBF2-D078-4B89-B0E8-522200572640}"/>
+                    </a:ext>
+                  </a:extLst>
+                </p:cNvPr>
+                <p:cNvGrpSpPr/>
+                <p:nvPr/>
+              </p:nvGrpSpPr>
+              <p:grpSpPr>
+                <a:xfrm>
+                  <a:off x="1662148" y="512660"/>
+                  <a:ext cx="4004231" cy="6098970"/>
+                  <a:chOff x="1662148" y="512660"/>
+                  <a:chExt cx="4004231" cy="6098970"/>
+                </a:xfrm>
+              </p:grpSpPr>
+              <p:grpSp>
+                <p:nvGrpSpPr>
+                  <p:cNvPr id="13" name="Group 12">
+                    <a:extLst>
+                      <a:ext uri="{FF2B5EF4-FFF2-40B4-BE49-F238E27FC236}">
+                        <a16:creationId xmlns:a16="http://schemas.microsoft.com/office/drawing/2014/main" id="{F9E75581-6A3E-4D09-B743-82787EF1ABFB}"/>
+                      </a:ext>
+                    </a:extLst>
+                  </p:cNvPr>
+                  <p:cNvGrpSpPr/>
+                  <p:nvPr/>
+                </p:nvGrpSpPr>
+                <p:grpSpPr>
+                  <a:xfrm>
+                    <a:off x="2153554" y="990384"/>
+                    <a:ext cx="2942702" cy="369332"/>
+                    <a:chOff x="2153554" y="990384"/>
+                    <a:chExt cx="2942702" cy="369332"/>
+                  </a:xfrm>
+                </p:grpSpPr>
+                <p:cxnSp>
+                  <p:nvCxnSpPr>
+                    <p:cNvPr id="9" name="Straight Arrow Connector 8">
+                      <a:extLst>
+                        <a:ext uri="{FF2B5EF4-FFF2-40B4-BE49-F238E27FC236}">
+                          <a16:creationId xmlns:a16="http://schemas.microsoft.com/office/drawing/2014/main" id="{D86DC8B3-6540-42E5-BD8D-12BA1D82FDDA}"/>
+                        </a:ext>
+                      </a:extLst>
+                    </p:cNvPr>
+                    <p:cNvCxnSpPr>
+                      <a:cxnSpLocks/>
+                    </p:cNvCxnSpPr>
+                    <p:nvPr/>
+                  </p:nvCxnSpPr>
+                  <p:spPr>
+                    <a:xfrm>
+                      <a:off x="2153554" y="1159661"/>
+                      <a:ext cx="2942702" cy="0"/>
+                    </a:xfrm>
+                    <a:prstGeom prst="straightConnector1">
+                      <a:avLst/>
+                    </a:prstGeom>
+                    <a:ln w="38100">
+                      <a:tailEnd type="triangle"/>
+                    </a:ln>
+                  </p:spPr>
+                  <p:style>
+                    <a:lnRef idx="1">
+                      <a:schemeClr val="accent1"/>
+                    </a:lnRef>
+                    <a:fillRef idx="0">
+                      <a:schemeClr val="accent1"/>
+                    </a:fillRef>
+                    <a:effectRef idx="0">
+                      <a:schemeClr val="accent1"/>
+                    </a:effectRef>
+                    <a:fontRef idx="minor">
+                      <a:schemeClr val="tx1"/>
+                    </a:fontRef>
+                  </p:style>
+                </p:cxnSp>
+                <p:sp>
+                  <p:nvSpPr>
+                    <p:cNvPr id="11" name="TextBox 10">
+                      <a:extLst>
+                        <a:ext uri="{FF2B5EF4-FFF2-40B4-BE49-F238E27FC236}">
+                          <a16:creationId xmlns:a16="http://schemas.microsoft.com/office/drawing/2014/main" id="{404E7FB1-EBBA-4630-BF9E-93F5B87936F4}"/>
+                        </a:ext>
+                      </a:extLst>
+                    </p:cNvPr>
+                    <p:cNvSpPr txBox="1"/>
+                    <p:nvPr/>
+                  </p:nvSpPr>
+                  <p:spPr>
+                    <a:xfrm>
+                      <a:off x="2898816" y="990384"/>
+                      <a:ext cx="1389361" cy="369332"/>
+                    </a:xfrm>
+                    <a:prstGeom prst="rect">
+                      <a:avLst/>
+                    </a:prstGeom>
+                    <a:solidFill>
+                      <a:schemeClr val="accent1">
+                        <a:lumMod val="20000"/>
+                        <a:lumOff val="80000"/>
+                      </a:schemeClr>
+                    </a:solidFill>
+                  </p:spPr>
+                  <p:txBody>
+                    <a:bodyPr wrap="none" rtlCol="0">
+                      <a:spAutoFit/>
+                    </a:bodyPr>
+                    <a:lstStyle/>
+                    <a:p>
+                      <a:pPr algn="ctr"/>
+                      <a:r>
+                        <a:rPr lang="en-US" noProof="1">
+                          <a:latin typeface="Open Sans Semibold" panose="020B0706030804020204" pitchFamily="34" charset="0"/>
+                          <a:ea typeface="Open Sans Semibold" panose="020B0706030804020204" pitchFamily="34" charset="0"/>
+                          <a:cs typeface="Open Sans Semibold" panose="020B0706030804020204" pitchFamily="34" charset="0"/>
+                        </a:rPr>
+                        <a:t>GET /index.html</a:t>
+                      </a:r>
+                    </a:p>
+                  </p:txBody>
+                </p:sp>
+              </p:grpSp>
+              <p:grpSp>
+                <p:nvGrpSpPr>
+                  <p:cNvPr id="22" name="Group 21">
+                    <a:extLst>
+                      <a:ext uri="{FF2B5EF4-FFF2-40B4-BE49-F238E27FC236}">
+                        <a16:creationId xmlns:a16="http://schemas.microsoft.com/office/drawing/2014/main" id="{E5229FFE-E652-48EC-BD64-FE43B7B6C2E0}"/>
+                      </a:ext>
+                    </a:extLst>
+                  </p:cNvPr>
+                  <p:cNvGrpSpPr/>
+                  <p:nvPr/>
+                </p:nvGrpSpPr>
+                <p:grpSpPr>
+                  <a:xfrm>
+                    <a:off x="1662148" y="512660"/>
+                    <a:ext cx="4004231" cy="6098970"/>
+                    <a:chOff x="1662148" y="512660"/>
+                    <a:chExt cx="4004231" cy="6098970"/>
+                  </a:xfrm>
+                </p:grpSpPr>
+                <p:grpSp>
+                  <p:nvGrpSpPr>
+                    <p:cNvPr id="15" name="Group 14">
+                      <a:extLst>
+                        <a:ext uri="{FF2B5EF4-FFF2-40B4-BE49-F238E27FC236}">
+                          <a16:creationId xmlns:a16="http://schemas.microsoft.com/office/drawing/2014/main" id="{927C618D-BAFA-4716-BC5B-8C798524F4E5}"/>
+                        </a:ext>
+                      </a:extLst>
+                    </p:cNvPr>
+                    <p:cNvGrpSpPr/>
+                    <p:nvPr/>
+                  </p:nvGrpSpPr>
+                  <p:grpSpPr>
+                    <a:xfrm>
+                      <a:off x="2292321" y="6206861"/>
+                      <a:ext cx="2803932" cy="369332"/>
+                      <a:chOff x="2292323" y="935792"/>
+                      <a:chExt cx="2803932" cy="369332"/>
+                    </a:xfrm>
+                  </p:grpSpPr>
+                  <p:cxnSp>
+                    <p:nvCxnSpPr>
+                      <p:cNvPr id="16" name="Straight Arrow Connector 15">
+                        <a:extLst>
+                          <a:ext uri="{FF2B5EF4-FFF2-40B4-BE49-F238E27FC236}">
+                            <a16:creationId xmlns:a16="http://schemas.microsoft.com/office/drawing/2014/main" id="{5306AA66-598D-4B1A-A225-AE88ADD43FB4}"/>
+                          </a:ext>
+                        </a:extLst>
+                      </p:cNvPr>
+                      <p:cNvCxnSpPr>
+                        <a:cxnSpLocks/>
+                      </p:cNvCxnSpPr>
+                      <p:nvPr/>
+                    </p:nvCxnSpPr>
+                    <p:spPr>
+                      <a:xfrm flipH="1" flipV="1">
+                        <a:off x="2292323" y="1095126"/>
+                        <a:ext cx="2803932" cy="1"/>
+                      </a:xfrm>
+                      <a:prstGeom prst="straightConnector1">
+                        <a:avLst/>
+                      </a:prstGeom>
+                      <a:ln w="38100">
+                        <a:solidFill>
+                          <a:srgbClr val="0070C0"/>
+                        </a:solidFill>
+                        <a:tailEnd type="triangle"/>
+                      </a:ln>
+                    </p:spPr>
+                    <p:style>
+                      <a:lnRef idx="1">
+                        <a:schemeClr val="accent1"/>
+                      </a:lnRef>
+                      <a:fillRef idx="0">
+                        <a:schemeClr val="accent1"/>
+                      </a:fillRef>
+                      <a:effectRef idx="0">
+                        <a:schemeClr val="accent1"/>
+                      </a:effectRef>
+                      <a:fontRef idx="minor">
+                        <a:schemeClr val="tx1"/>
+                      </a:fontRef>
+                    </p:style>
+                  </p:cxnSp>
+                  <p:sp>
+                    <p:nvSpPr>
+                      <p:cNvPr id="17" name="TextBox 16">
+                        <a:extLst>
+                          <a:ext uri="{FF2B5EF4-FFF2-40B4-BE49-F238E27FC236}">
+                            <a16:creationId xmlns:a16="http://schemas.microsoft.com/office/drawing/2014/main" id="{0413307F-7A4E-4E72-98F7-89B596C78365}"/>
+                          </a:ext>
+                        </a:extLst>
+                      </p:cNvPr>
+                      <p:cNvSpPr txBox="1"/>
+                      <p:nvPr/>
+                    </p:nvSpPr>
+                    <p:spPr>
+                      <a:xfrm>
+                        <a:off x="3139758" y="935792"/>
+                        <a:ext cx="980631" cy="369332"/>
+                      </a:xfrm>
+                      <a:prstGeom prst="rect">
+                        <a:avLst/>
+                      </a:prstGeom>
+                      <a:solidFill>
+                        <a:srgbClr val="A0DCE8"/>
+                      </a:solidFill>
+                    </p:spPr>
+                    <p:txBody>
+                      <a:bodyPr wrap="none" rtlCol="0">
+                        <a:spAutoFit/>
+                      </a:bodyPr>
+                      <a:lstStyle/>
+                      <a:p>
+                        <a:pPr algn="ctr"/>
+                        <a:r>
+                          <a:rPr lang="en-US" noProof="1">
+                            <a:latin typeface="Open Sans Semibold" panose="020B0706030804020204" pitchFamily="34" charset="0"/>
+                            <a:ea typeface="Open Sans Semibold" panose="020B0706030804020204" pitchFamily="34" charset="0"/>
+                            <a:cs typeface="Open Sans Semibold" panose="020B0706030804020204" pitchFamily="34" charset="0"/>
+                          </a:rPr>
+                          <a:t>index.html</a:t>
+                        </a:r>
+                      </a:p>
+                    </p:txBody>
+                  </p:sp>
+                </p:grpSp>
+                <p:grpSp>
+                  <p:nvGrpSpPr>
+                    <p:cNvPr id="20" name="Group 19">
+                      <a:extLst>
+                        <a:ext uri="{FF2B5EF4-FFF2-40B4-BE49-F238E27FC236}">
+                          <a16:creationId xmlns:a16="http://schemas.microsoft.com/office/drawing/2014/main" id="{15EFD835-332A-418C-920C-F5FA9DFC8E4F}"/>
+                        </a:ext>
+                      </a:extLst>
+                    </p:cNvPr>
+                    <p:cNvGrpSpPr/>
+                    <p:nvPr/>
+                  </p:nvGrpSpPr>
+                  <p:grpSpPr>
+                    <a:xfrm>
+                      <a:off x="1662148" y="512660"/>
+                      <a:ext cx="4004231" cy="6098970"/>
+                      <a:chOff x="1662148" y="512660"/>
+                      <a:chExt cx="4004231" cy="6098970"/>
+                    </a:xfrm>
+                  </p:grpSpPr>
+                  <p:grpSp>
+                    <p:nvGrpSpPr>
+                      <p:cNvPr id="5" name="Group 4">
+                        <a:extLst>
+                          <a:ext uri="{FF2B5EF4-FFF2-40B4-BE49-F238E27FC236}">
+                            <a16:creationId xmlns:a16="http://schemas.microsoft.com/office/drawing/2014/main" id="{FC814866-357C-4F3D-94DF-C2186EFB7E43}"/>
+                          </a:ext>
+                        </a:extLst>
+                      </p:cNvPr>
+                      <p:cNvGrpSpPr/>
+                      <p:nvPr/>
+                    </p:nvGrpSpPr>
+                    <p:grpSpPr>
+                      <a:xfrm>
+                        <a:off x="1888703" y="1031630"/>
+                        <a:ext cx="3603553" cy="5580000"/>
+                        <a:chOff x="1888704" y="1031630"/>
+                        <a:chExt cx="3603553" cy="5580000"/>
+                      </a:xfrm>
+                    </p:grpSpPr>
+                    <p:sp>
+                      <p:nvSpPr>
+                        <p:cNvPr id="3" name="Rectangle 2">
+                          <a:extLst>
+                            <a:ext uri="{FF2B5EF4-FFF2-40B4-BE49-F238E27FC236}">
+                              <a16:creationId xmlns:a16="http://schemas.microsoft.com/office/drawing/2014/main" id="{303EBBC2-AA5B-432F-BE81-4A7659A49238}"/>
+                            </a:ext>
+                          </a:extLst>
+                        </p:cNvPr>
+                        <p:cNvSpPr/>
+                        <p:nvPr/>
+                      </p:nvSpPr>
+                      <p:spPr>
+                        <a:xfrm>
+                          <a:off x="5096257" y="1031630"/>
+                          <a:ext cx="396000" cy="5580000"/>
+                        </a:xfrm>
+                        <a:prstGeom prst="rect">
+                          <a:avLst/>
+                        </a:prstGeom>
+                        <a:gradFill flip="none" rotWithShape="1">
+                          <a:gsLst>
+                            <a:gs pos="0">
+                              <a:srgbClr val="92D050">
+                                <a:shade val="30000"/>
+                                <a:satMod val="115000"/>
+                              </a:srgbClr>
+                            </a:gs>
+                            <a:gs pos="50000">
+                              <a:srgbClr val="92D050">
+                                <a:shade val="67500"/>
+                                <a:satMod val="115000"/>
+                              </a:srgbClr>
+                            </a:gs>
+                            <a:gs pos="100000">
+                              <a:srgbClr val="92D050">
+                                <a:shade val="100000"/>
+                                <a:satMod val="115000"/>
+                              </a:srgbClr>
+                            </a:gs>
+                          </a:gsLst>
+                          <a:lin ang="10800000" scaled="1"/>
+                          <a:tileRect/>
+                        </a:gradFill>
+                      </p:spPr>
+                      <p:style>
+                        <a:lnRef idx="2">
+                          <a:schemeClr val="accent1">
+                            <a:shade val="50000"/>
+                          </a:schemeClr>
+                        </a:lnRef>
+                        <a:fillRef idx="1">
+                          <a:schemeClr val="accent1"/>
+                        </a:fillRef>
+                        <a:effectRef idx="0">
+                          <a:schemeClr val="accent1"/>
+                        </a:effectRef>
+                        <a:fontRef idx="minor">
+                          <a:schemeClr val="lt1"/>
+                        </a:fontRef>
+                      </p:style>
+                      <p:txBody>
+                        <a:bodyPr rtlCol="0" anchor="ctr"/>
+                        <a:lstStyle/>
+                        <a:p>
+                          <a:pPr algn="ctr"/>
+                          <a:endParaRPr lang="en-US" noProof="1"/>
+                        </a:p>
+                      </p:txBody>
+                    </p:sp>
+                    <p:sp>
+                      <p:nvSpPr>
+                        <p:cNvPr id="6" name="Rectangle 5">
+                          <a:extLst>
+                            <a:ext uri="{FF2B5EF4-FFF2-40B4-BE49-F238E27FC236}">
+                              <a16:creationId xmlns:a16="http://schemas.microsoft.com/office/drawing/2014/main" id="{F34E2BB2-0D74-45A9-8144-F99F63439506}"/>
+                            </a:ext>
+                          </a:extLst>
+                        </p:cNvPr>
+                        <p:cNvSpPr/>
+                        <p:nvPr/>
+                      </p:nvSpPr>
+                      <p:spPr>
+                        <a:xfrm>
+                          <a:off x="1888704" y="1031630"/>
+                          <a:ext cx="396000" cy="5580000"/>
+                        </a:xfrm>
+                        <a:prstGeom prst="rect">
+                          <a:avLst/>
+                        </a:prstGeom>
+                        <a:gradFill flip="none" rotWithShape="1">
+                          <a:gsLst>
+                            <a:gs pos="0">
+                              <a:schemeClr val="accent1">
+                                <a:shade val="30000"/>
+                                <a:satMod val="115000"/>
+                              </a:schemeClr>
+                            </a:gs>
+                            <a:gs pos="50000">
+                              <a:schemeClr val="accent1">
+                                <a:shade val="67500"/>
+                                <a:satMod val="115000"/>
+                              </a:schemeClr>
+                            </a:gs>
+                            <a:gs pos="100000">
+                              <a:schemeClr val="accent1">
+                                <a:shade val="100000"/>
+                                <a:satMod val="115000"/>
+                              </a:schemeClr>
+                            </a:gs>
+                          </a:gsLst>
+                          <a:lin ang="0" scaled="1"/>
+                          <a:tileRect/>
+                        </a:gradFill>
+                      </p:spPr>
+                      <p:style>
+                        <a:lnRef idx="2">
+                          <a:schemeClr val="accent1">
+                            <a:shade val="50000"/>
+                          </a:schemeClr>
+                        </a:lnRef>
+                        <a:fillRef idx="1">
+                          <a:schemeClr val="accent1"/>
+                        </a:fillRef>
+                        <a:effectRef idx="0">
+                          <a:schemeClr val="accent1"/>
+                        </a:effectRef>
+                        <a:fontRef idx="minor">
+                          <a:schemeClr val="lt1"/>
+                        </a:fontRef>
+                      </p:style>
+                      <p:txBody>
+                        <a:bodyPr rtlCol="0" anchor="ctr"/>
+                        <a:lstStyle/>
+                        <a:p>
+                          <a:pPr algn="ctr"/>
+                          <a:endParaRPr lang="en-US" noProof="1"/>
+                        </a:p>
+                      </p:txBody>
+                    </p:sp>
+                  </p:grpSp>
+                  <p:sp>
+                    <p:nvSpPr>
+                      <p:cNvPr id="7" name="TextBox 6">
+                        <a:extLst>
+                          <a:ext uri="{FF2B5EF4-FFF2-40B4-BE49-F238E27FC236}">
+                            <a16:creationId xmlns:a16="http://schemas.microsoft.com/office/drawing/2014/main" id="{EE9A7E1F-4EFB-40B5-AE38-E0B52FFFB7D4}"/>
+                          </a:ext>
+                        </a:extLst>
+                      </p:cNvPr>
+                      <p:cNvSpPr txBox="1"/>
+                      <p:nvPr/>
+                    </p:nvSpPr>
+                    <p:spPr>
+                      <a:xfrm>
+                        <a:off x="1662148" y="512660"/>
+                        <a:ext cx="849109" cy="400110"/>
+                      </a:xfrm>
+                      <a:prstGeom prst="rect">
+                        <a:avLst/>
+                      </a:prstGeom>
+                      <a:noFill/>
+                    </p:spPr>
+                    <p:txBody>
+                      <a:bodyPr wrap="none" rtlCol="0">
+                        <a:spAutoFit/>
+                      </a:bodyPr>
+                      <a:lstStyle/>
+                      <a:p>
+                        <a:r>
+                          <a:rPr lang="en-US" sz="2000" noProof="1">
+                            <a:latin typeface="Open Sans Semibold" panose="020B0706030804020204" pitchFamily="34" charset="0"/>
+                            <a:ea typeface="Open Sans Semibold" panose="020B0706030804020204" pitchFamily="34" charset="0"/>
+                            <a:cs typeface="Open Sans Semibold" panose="020B0706030804020204" pitchFamily="34" charset="0"/>
+                          </a:rPr>
+                          <a:t>browser</a:t>
+                        </a:r>
+                      </a:p>
+                    </p:txBody>
+                  </p:sp>
+                  <p:sp>
+                    <p:nvSpPr>
+                      <p:cNvPr id="21" name="TextBox 20">
+                        <a:extLst>
+                          <a:ext uri="{FF2B5EF4-FFF2-40B4-BE49-F238E27FC236}">
+                            <a16:creationId xmlns:a16="http://schemas.microsoft.com/office/drawing/2014/main" id="{3B43AA55-13D8-48A2-9C07-F359B517EACF}"/>
+                          </a:ext>
+                        </a:extLst>
+                      </p:cNvPr>
+                      <p:cNvSpPr txBox="1"/>
+                      <p:nvPr/>
+                    </p:nvSpPr>
+                    <p:spPr>
+                      <a:xfrm>
+                        <a:off x="4937497" y="516668"/>
+                        <a:ext cx="728882" cy="400110"/>
+                      </a:xfrm>
+                      <a:prstGeom prst="rect">
+                        <a:avLst/>
+                      </a:prstGeom>
+                      <a:noFill/>
+                    </p:spPr>
+                    <p:txBody>
+                      <a:bodyPr wrap="none" rtlCol="0">
+                        <a:spAutoFit/>
+                      </a:bodyPr>
+                      <a:lstStyle/>
+                      <a:p>
+                        <a:r>
+                          <a:rPr lang="en-US" sz="2000" noProof="1">
+                            <a:latin typeface="Open Sans Semibold" panose="020B0706030804020204" pitchFamily="34" charset="0"/>
+                            <a:ea typeface="Open Sans Semibold" panose="020B0706030804020204" pitchFamily="34" charset="0"/>
+                            <a:cs typeface="Open Sans Semibold" panose="020B0706030804020204" pitchFamily="34" charset="0"/>
+                          </a:rPr>
+                          <a:t>servlet</a:t>
+                        </a:r>
+                      </a:p>
+                    </p:txBody>
+                  </p:sp>
+                </p:grpSp>
+              </p:grpSp>
+            </p:grpSp>
+            <p:sp>
+              <p:nvSpPr>
+                <p:cNvPr id="26" name="Rectangle 25">
+                  <a:extLst>
+                    <a:ext uri="{FF2B5EF4-FFF2-40B4-BE49-F238E27FC236}">
+                      <a16:creationId xmlns:a16="http://schemas.microsoft.com/office/drawing/2014/main" id="{AE673A0D-5330-4086-BDAA-54A1B1EB4F6D}"/>
+                    </a:ext>
+                  </a:extLst>
+                </p:cNvPr>
+                <p:cNvSpPr/>
+                <p:nvPr/>
+              </p:nvSpPr>
+              <p:spPr>
+                <a:xfrm>
+                  <a:off x="8300898" y="1569017"/>
+                  <a:ext cx="396000" cy="4599496"/>
+                </a:xfrm>
+                <a:prstGeom prst="rect">
+                  <a:avLst/>
+                </a:prstGeom>
+                <a:gradFill flip="none" rotWithShape="1">
+                  <a:gsLst>
+                    <a:gs pos="0">
+                      <a:srgbClr val="0070C0">
+                        <a:shade val="30000"/>
+                        <a:satMod val="115000"/>
+                      </a:srgbClr>
+                    </a:gs>
+                    <a:gs pos="50000">
+                      <a:srgbClr val="0070C0">
+                        <a:shade val="67500"/>
+                        <a:satMod val="115000"/>
+                      </a:srgbClr>
+                    </a:gs>
+                    <a:gs pos="100000">
+                      <a:srgbClr val="0070C0">
+                        <a:shade val="100000"/>
+                        <a:satMod val="115000"/>
+                      </a:srgbClr>
+                    </a:gs>
+                  </a:gsLst>
+                  <a:lin ang="10800000" scaled="1"/>
+                  <a:tileRect/>
+                </a:gradFill>
+              </p:spPr>
+              <p:style>
+                <a:lnRef idx="2">
+                  <a:schemeClr val="accent1">
+                    <a:shade val="50000"/>
+                  </a:schemeClr>
+                </a:lnRef>
+                <a:fillRef idx="1">
+                  <a:schemeClr val="accent1"/>
+                </a:fillRef>
+                <a:effectRef idx="0">
+                  <a:schemeClr val="accent1"/>
+                </a:effectRef>
+                <a:fontRef idx="minor">
+                  <a:schemeClr val="lt1"/>
+                </a:fontRef>
+              </p:style>
+              <p:txBody>
+                <a:bodyPr rtlCol="0" anchor="ctr"/>
+                <a:lstStyle/>
+                <a:p>
+                  <a:pPr algn="ctr"/>
+                  <a:endParaRPr lang="en-US" noProof="1"/>
+                </a:p>
+              </p:txBody>
+            </p:sp>
+            <p:sp>
+              <p:nvSpPr>
+                <p:cNvPr id="48" name="TextBox 47">
+                  <a:extLst>
+                    <a:ext uri="{FF2B5EF4-FFF2-40B4-BE49-F238E27FC236}">
+                      <a16:creationId xmlns:a16="http://schemas.microsoft.com/office/drawing/2014/main" id="{01825A29-F176-4E06-B4B3-CA4866D9FE1B}"/>
+                    </a:ext>
+                  </a:extLst>
+                </p:cNvPr>
+                <p:cNvSpPr txBox="1"/>
+                <p:nvPr/>
+              </p:nvSpPr>
+              <p:spPr>
+                <a:xfrm>
+                  <a:off x="7898783" y="985819"/>
+                  <a:ext cx="1200229" cy="400110"/>
+                </a:xfrm>
+                <a:prstGeom prst="rect">
+                  <a:avLst/>
+                </a:prstGeom>
+                <a:noFill/>
+              </p:spPr>
+              <p:txBody>
+                <a:bodyPr wrap="none" rtlCol="0">
+                  <a:spAutoFit/>
+                </a:bodyPr>
+                <a:lstStyle/>
+                <a:p>
+                  <a:r>
+                    <a:rPr lang="en-US" sz="2000" noProof="1">
+                      <a:latin typeface="Open Sans Semibold" panose="020B0706030804020204" pitchFamily="34" charset="0"/>
+                      <a:ea typeface="Open Sans Semibold" panose="020B0706030804020204" pitchFamily="34" charset="0"/>
+                      <a:cs typeface="Open Sans Semibold" panose="020B0706030804020204" pitchFamily="34" charset="0"/>
+                    </a:rPr>
+                    <a:t>PushBuilder</a:t>
+                  </a:r>
+                </a:p>
+              </p:txBody>
+            </p:sp>
+          </p:grpSp>
+          <p:sp>
+            <p:nvSpPr>
+              <p:cNvPr id="33" name="TextBox 32">
+                <a:extLst>
+                  <a:ext uri="{FF2B5EF4-FFF2-40B4-BE49-F238E27FC236}">
+                    <a16:creationId xmlns:a16="http://schemas.microsoft.com/office/drawing/2014/main" id="{1513C5DC-976D-4259-974C-3C6820DA35D4}"/>
+                  </a:ext>
+                </a:extLst>
+              </p:cNvPr>
+              <p:cNvSpPr txBox="1"/>
+              <p:nvPr/>
+            </p:nvSpPr>
+            <p:spPr>
+              <a:xfrm>
+                <a:off x="4074637" y="1483834"/>
+                <a:ext cx="2455563" cy="468000"/>
+              </a:xfrm>
+              <a:prstGeom prst="rect">
+                <a:avLst/>
+              </a:prstGeom>
+              <a:solidFill>
+                <a:srgbClr val="FFC000"/>
+              </a:solidFill>
+            </p:spPr>
+            <p:txBody>
+              <a:bodyPr wrap="none" rtlCol="0" anchor="ctr">
+                <a:spAutoFit/>
+              </a:bodyPr>
+              <a:lstStyle/>
+              <a:p>
+                <a:pPr algn="ctr"/>
+                <a:r>
+                  <a:rPr lang="en-US" sz="2000" noProof="1">
+                    <a:latin typeface="Open Sans Semibold" panose="020B0706030804020204" pitchFamily="34" charset="0"/>
+                    <a:ea typeface="Open Sans Semibold" panose="020B0706030804020204" pitchFamily="34" charset="0"/>
+                    <a:cs typeface="Open Sans Semibold" panose="020B0706030804020204" pitchFamily="34" charset="0"/>
+                  </a:rPr>
+                  <a:t>request.newPushBuilder( )</a:t>
+                </a:r>
+              </a:p>
+            </p:txBody>
+          </p:sp>
+        </p:grpSp>
+      </p:grpSp>
     </p:spTree>
     <p:extLst>
       <p:ext uri="{BB962C8B-B14F-4D97-AF65-F5344CB8AC3E}">
@@ -25094,7 +26981,7 @@
 </p:sld>
 </file>
 
-<file path=ppt/slides/slide58.xml><?xml version="1.0" encoding="utf-8"?>
+<file path=ppt/slides/slide59.xml><?xml version="1.0" encoding="utf-8"?>
 <p:sld xmlns:a="http://schemas.openxmlformats.org/drawingml/2006/main" xmlns:r="http://schemas.openxmlformats.org/officeDocument/2006/relationships" xmlns:p="http://schemas.openxmlformats.org/presentationml/2006/main">
   <p:cSld>
     <p:spTree>
@@ -26330,472 +28217,6 @@
 </p:sld>
 </file>
 
-<file path=ppt/slides/slide59.xml><?xml version="1.0" encoding="utf-8"?>
-<p:sld xmlns:a="http://schemas.openxmlformats.org/drawingml/2006/main" xmlns:r="http://schemas.openxmlformats.org/officeDocument/2006/relationships" xmlns:p="http://schemas.openxmlformats.org/presentationml/2006/main">
-  <p:cSld>
-    <p:spTree>
-      <p:nvGrpSpPr>
-        <p:cNvPr id="1" name=""/>
-        <p:cNvGrpSpPr/>
-        <p:nvPr/>
-      </p:nvGrpSpPr>
-      <p:grpSpPr>
-        <a:xfrm>
-          <a:off x="0" y="0"/>
-          <a:ext cx="0" cy="0"/>
-          <a:chOff x="0" y="0"/>
-          <a:chExt cx="0" cy="0"/>
-        </a:xfrm>
-      </p:grpSpPr>
-      <p:sp>
-        <p:nvSpPr>
-          <p:cNvPr id="2" name="TextBox 1">
-            <a:extLst>
-              <a:ext uri="{FF2B5EF4-FFF2-40B4-BE49-F238E27FC236}">
-                <a16:creationId xmlns:a16="http://schemas.microsoft.com/office/drawing/2014/main" id="{5CD3E77F-07E3-45F7-A3C8-76B1D24DC37E}"/>
-              </a:ext>
-            </a:extLst>
-          </p:cNvPr>
-          <p:cNvSpPr txBox="1"/>
-          <p:nvPr/>
-        </p:nvSpPr>
-        <p:spPr>
-          <a:xfrm>
-            <a:off x="2620910" y="213815"/>
-            <a:ext cx="6921500" cy="646331"/>
-          </a:xfrm>
-          <a:prstGeom prst="rect">
-            <a:avLst/>
-          </a:prstGeom>
-          <a:noFill/>
-        </p:spPr>
-        <p:txBody>
-          <a:bodyPr wrap="square" rtlCol="0">
-            <a:spAutoFit/>
-          </a:bodyPr>
-          <a:lstStyle/>
-          <a:p>
-            <a:pPr algn="ctr"/>
-            <a:r>
-              <a:rPr lang="en-US" sz="3600" b="1" dirty="0">
-                <a:latin typeface="Open Sans Semibold" panose="020B0706030804020204" pitchFamily="34" charset="0"/>
-                <a:ea typeface="Open Sans Semibold" panose="020B0706030804020204" pitchFamily="34" charset="0"/>
-                <a:cs typeface="Open Sans Semibold" panose="020B0706030804020204" pitchFamily="34" charset="0"/>
-              </a:rPr>
-              <a:t>Filter and Server Push feature</a:t>
-            </a:r>
-          </a:p>
-        </p:txBody>
-      </p:sp>
-      <p:sp>
-        <p:nvSpPr>
-          <p:cNvPr id="5" name="Rectangle 4">
-            <a:extLst>
-              <a:ext uri="{FF2B5EF4-FFF2-40B4-BE49-F238E27FC236}">
-                <a16:creationId xmlns:a16="http://schemas.microsoft.com/office/drawing/2014/main" id="{94CE6F4F-3371-412C-8A2C-A1EBBC5E1EB7}"/>
-              </a:ext>
-            </a:extLst>
-          </p:cNvPr>
-          <p:cNvSpPr/>
-          <p:nvPr/>
-        </p:nvSpPr>
-        <p:spPr>
-          <a:xfrm>
-            <a:off x="294579" y="1041212"/>
-            <a:ext cx="11574162" cy="5632311"/>
-          </a:xfrm>
-          <a:prstGeom prst="rect">
-            <a:avLst/>
-          </a:prstGeom>
-        </p:spPr>
-        <p:txBody>
-          <a:bodyPr wrap="square">
-            <a:spAutoFit/>
-          </a:bodyPr>
-          <a:lstStyle/>
-          <a:p>
-            <a:r>
-              <a:rPr lang="en-US" sz="2000" noProof="1">
-                <a:solidFill>
-                  <a:schemeClr val="accent2"/>
-                </a:solidFill>
-                <a:latin typeface="HelveticaNeue" panose="00000400000000000000" pitchFamily="2" charset="0"/>
-              </a:rPr>
-              <a:t>@WebFilter(urlPatterns = ["/*"])</a:t>
-            </a:r>
-          </a:p>
-          <a:p>
-            <a:r>
-              <a:rPr lang="en-US" sz="2000" noProof="1">
-                <a:solidFill>
-                  <a:srgbClr val="002060"/>
-                </a:solidFill>
-                <a:latin typeface="HelveticaNeue" panose="00000400000000000000" pitchFamily="2" charset="0"/>
-              </a:rPr>
-              <a:t>class PushFilter : Filter {</a:t>
-            </a:r>
-          </a:p>
-          <a:p>
-            <a:endParaRPr lang="en-US" sz="2000" noProof="1">
-              <a:latin typeface="HelveticaNeue" panose="00000400000000000000" pitchFamily="2" charset="0"/>
-            </a:endParaRPr>
-          </a:p>
-          <a:p>
-            <a:r>
-              <a:rPr lang="en-US" sz="2000" noProof="1">
-                <a:latin typeface="HelveticaNeue" panose="00000400000000000000" pitchFamily="2" charset="0"/>
-              </a:rPr>
-              <a:t>    </a:t>
-            </a:r>
-            <a:r>
-              <a:rPr lang="en-US" sz="2000" noProof="1">
-                <a:solidFill>
-                  <a:srgbClr val="0070C0"/>
-                </a:solidFill>
-                <a:latin typeface="HelveticaNeue" panose="00000400000000000000" pitchFamily="2" charset="0"/>
-              </a:rPr>
-              <a:t>override fun </a:t>
-            </a:r>
-            <a:r>
-              <a:rPr lang="en-US" sz="2000" noProof="1">
-                <a:solidFill>
-                  <a:schemeClr val="accent2"/>
-                </a:solidFill>
-                <a:latin typeface="HelveticaNeue" panose="00000400000000000000" pitchFamily="2" charset="0"/>
-              </a:rPr>
-              <a:t>doFilter</a:t>
-            </a:r>
-            <a:r>
-              <a:rPr lang="en-US" sz="2000" noProof="1">
-                <a:solidFill>
-                  <a:srgbClr val="002060"/>
-                </a:solidFill>
-                <a:latin typeface="HelveticaNeue" panose="00000400000000000000" pitchFamily="2" charset="0"/>
-              </a:rPr>
-              <a:t>(req: ServletRequest?, resp: ServletResponse?, chain: FilterChain?) </a:t>
-            </a:r>
-            <a:r>
-              <a:rPr lang="en-US" sz="2000" noProof="1">
-                <a:solidFill>
-                  <a:srgbClr val="0070C0"/>
-                </a:solidFill>
-                <a:latin typeface="HelveticaNeue" panose="00000400000000000000" pitchFamily="2" charset="0"/>
-              </a:rPr>
-              <a:t> </a:t>
-            </a:r>
-            <a:r>
-              <a:rPr lang="en-US" sz="2000" noProof="1">
-                <a:latin typeface="HelveticaNeue" panose="00000400000000000000" pitchFamily="2" charset="0"/>
-              </a:rPr>
-              <a:t>{</a:t>
-            </a:r>
-          </a:p>
-          <a:p>
-            <a:r>
-              <a:rPr lang="en-US" sz="2000" noProof="1">
-                <a:latin typeface="HelveticaNeue" panose="00000400000000000000" pitchFamily="2" charset="0"/>
-              </a:rPr>
-              <a:t>        </a:t>
-            </a:r>
-            <a:r>
-              <a:rPr lang="en-US" sz="2000" noProof="1">
-                <a:solidFill>
-                  <a:schemeClr val="accent2"/>
-                </a:solidFill>
-                <a:latin typeface="HelveticaNeue" panose="00000400000000000000" pitchFamily="2" charset="0"/>
-              </a:rPr>
-              <a:t>val</a:t>
-            </a:r>
-            <a:r>
-              <a:rPr lang="en-US" sz="2000" noProof="1">
-                <a:latin typeface="HelveticaNeue" panose="00000400000000000000" pitchFamily="2" charset="0"/>
-              </a:rPr>
-              <a:t> httpRequest: HttpServletRequest? = req </a:t>
-            </a:r>
-            <a:r>
-              <a:rPr lang="en-US" sz="2000" noProof="1">
-                <a:solidFill>
-                  <a:schemeClr val="accent2"/>
-                </a:solidFill>
-                <a:latin typeface="HelveticaNeue" panose="00000400000000000000" pitchFamily="2" charset="0"/>
-              </a:rPr>
-              <a:t>as?</a:t>
-            </a:r>
-            <a:r>
-              <a:rPr lang="en-US" sz="2000" noProof="1">
-                <a:latin typeface="HelveticaNeue" panose="00000400000000000000" pitchFamily="2" charset="0"/>
-              </a:rPr>
-              <a:t> HttpServletRequest</a:t>
-            </a:r>
-          </a:p>
-          <a:p>
-            <a:r>
-              <a:rPr lang="en-US" sz="2000" noProof="1">
-                <a:latin typeface="HelveticaNeue" panose="00000400000000000000" pitchFamily="2" charset="0"/>
-              </a:rPr>
-              <a:t>       </a:t>
-            </a:r>
-            <a:r>
-              <a:rPr lang="en-US" sz="2000" noProof="1">
-                <a:solidFill>
-                  <a:schemeClr val="accent1"/>
-                </a:solidFill>
-                <a:latin typeface="HelveticaNeue" panose="00000400000000000000" pitchFamily="2" charset="0"/>
-              </a:rPr>
-              <a:t> </a:t>
-            </a:r>
-            <a:r>
-              <a:rPr lang="en-US" sz="2000" noProof="1">
-                <a:solidFill>
-                  <a:schemeClr val="accent2"/>
-                </a:solidFill>
-                <a:latin typeface="HelveticaNeue" panose="00000400000000000000" pitchFamily="2" charset="0"/>
-              </a:rPr>
-              <a:t>val</a:t>
-            </a:r>
-            <a:r>
-              <a:rPr lang="en-US" sz="2000" noProof="1">
-                <a:solidFill>
-                  <a:schemeClr val="accent1"/>
-                </a:solidFill>
-                <a:latin typeface="HelveticaNeue" panose="00000400000000000000" pitchFamily="2" charset="0"/>
-              </a:rPr>
-              <a:t> </a:t>
-            </a:r>
-            <a:r>
-              <a:rPr lang="en-US" sz="2000" noProof="1">
-                <a:latin typeface="HelveticaNeue" panose="00000400000000000000" pitchFamily="2" charset="0"/>
-              </a:rPr>
-              <a:t>requestURI = httpRequest?.requestURI</a:t>
-            </a:r>
-          </a:p>
-          <a:p>
-            <a:r>
-              <a:rPr lang="en-US" sz="2000" noProof="1">
-                <a:latin typeface="HelveticaNeue" panose="00000400000000000000" pitchFamily="2" charset="0"/>
-              </a:rPr>
-              <a:t>        </a:t>
-            </a:r>
-            <a:r>
-              <a:rPr lang="en-US" sz="2000" noProof="1">
-                <a:solidFill>
-                  <a:schemeClr val="accent2"/>
-                </a:solidFill>
-                <a:latin typeface="HelveticaNeue" panose="00000400000000000000" pitchFamily="2" charset="0"/>
-              </a:rPr>
-              <a:t>val</a:t>
-            </a:r>
-            <a:r>
-              <a:rPr lang="en-US" sz="2000" noProof="1">
-                <a:latin typeface="HelveticaNeue" panose="00000400000000000000" pitchFamily="2" charset="0"/>
-              </a:rPr>
-              <a:t> pushBuilder = httpRequest?.newPushBuilder()</a:t>
-            </a:r>
-          </a:p>
-          <a:p>
-            <a:endParaRPr lang="en-US" sz="2000" noProof="1">
-              <a:latin typeface="HelveticaNeue" panose="00000400000000000000" pitchFamily="2" charset="0"/>
-            </a:endParaRPr>
-          </a:p>
-          <a:p>
-            <a:r>
-              <a:rPr lang="en-US" sz="2000" noProof="1">
-                <a:latin typeface="HelveticaNeue" panose="00000400000000000000" pitchFamily="2" charset="0"/>
-              </a:rPr>
-              <a:t>        </a:t>
-            </a:r>
-            <a:r>
-              <a:rPr lang="en-US" sz="2000" noProof="1">
-                <a:solidFill>
-                  <a:schemeClr val="accent2"/>
-                </a:solidFill>
-                <a:latin typeface="HelveticaNeue" panose="00000400000000000000" pitchFamily="2" charset="0"/>
-              </a:rPr>
-              <a:t>when</a:t>
-            </a:r>
-            <a:r>
-              <a:rPr lang="en-US" sz="2000" noProof="1">
-                <a:latin typeface="HelveticaNeue" panose="00000400000000000000" pitchFamily="2" charset="0"/>
-              </a:rPr>
-              <a:t> (requestURI) {</a:t>
-            </a:r>
-          </a:p>
-          <a:p>
-            <a:r>
-              <a:rPr lang="en-US" sz="2000" noProof="1">
-                <a:solidFill>
-                  <a:srgbClr val="00B050"/>
-                </a:solidFill>
-                <a:latin typeface="HelveticaNeue" panose="00000400000000000000" pitchFamily="2" charset="0"/>
-              </a:rPr>
-              <a:t>            </a:t>
-            </a:r>
-            <a:r>
-              <a:rPr lang="en-US" sz="2000" noProof="1">
-                <a:solidFill>
-                  <a:srgbClr val="0DA31B"/>
-                </a:solidFill>
-                <a:latin typeface="HelveticaNeue" panose="00000400000000000000" pitchFamily="2" charset="0"/>
-              </a:rPr>
-              <a:t>"index.html"</a:t>
-            </a:r>
-            <a:r>
-              <a:rPr lang="en-US" sz="2000" noProof="1">
-                <a:solidFill>
-                  <a:srgbClr val="00B050"/>
-                </a:solidFill>
-                <a:latin typeface="HelveticaNeue" panose="00000400000000000000" pitchFamily="2" charset="0"/>
-              </a:rPr>
-              <a:t> </a:t>
-            </a:r>
-            <a:r>
-              <a:rPr lang="en-US" sz="2000" noProof="1">
-                <a:latin typeface="HelveticaNeue" panose="00000400000000000000" pitchFamily="2" charset="0"/>
-              </a:rPr>
-              <a:t>-&gt;	 {</a:t>
-            </a:r>
-          </a:p>
-          <a:p>
-            <a:pPr lvl="3"/>
-            <a:r>
-              <a:rPr lang="en-US" sz="2000" noProof="1">
-                <a:latin typeface="HelveticaNeue" panose="00000400000000000000" pitchFamily="2" charset="0"/>
-              </a:rPr>
-              <a:t>                pushBuilder?.path(</a:t>
-            </a:r>
-            <a:r>
-              <a:rPr lang="en-US" sz="2000" noProof="1">
-                <a:solidFill>
-                  <a:srgbClr val="0DA31B"/>
-                </a:solidFill>
-                <a:latin typeface="HelveticaNeue" panose="00000400000000000000" pitchFamily="2" charset="0"/>
-              </a:rPr>
-              <a:t>"/style.css"</a:t>
-            </a:r>
-            <a:r>
-              <a:rPr lang="en-US" sz="2000" noProof="1">
-                <a:latin typeface="HelveticaNeue" panose="00000400000000000000" pitchFamily="2" charset="0"/>
-              </a:rPr>
-              <a:t>)?.push()</a:t>
-            </a:r>
-          </a:p>
-          <a:p>
-            <a:pPr lvl="3"/>
-            <a:r>
-              <a:rPr lang="en-US" sz="2000" noProof="1">
-                <a:latin typeface="HelveticaNeue" panose="00000400000000000000" pitchFamily="2" charset="0"/>
-              </a:rPr>
-              <a:t>                pushBuilder?.path(</a:t>
-            </a:r>
-            <a:r>
-              <a:rPr lang="en-US" sz="2000" noProof="1">
-                <a:solidFill>
-                  <a:srgbClr val="0DA31B"/>
-                </a:solidFill>
-                <a:latin typeface="HelveticaNeue" panose="00000400000000000000" pitchFamily="2" charset="0"/>
-              </a:rPr>
-              <a:t>"/logo.png"</a:t>
-            </a:r>
-            <a:r>
-              <a:rPr lang="en-US" sz="2000" noProof="1">
-                <a:latin typeface="HelveticaNeue" panose="00000400000000000000" pitchFamily="2" charset="0"/>
-              </a:rPr>
-              <a:t>)?.push()</a:t>
-            </a:r>
-          </a:p>
-          <a:p>
-            <a:r>
-              <a:rPr lang="en-US" sz="2000" noProof="1">
-                <a:latin typeface="HelveticaNeue" panose="00000400000000000000" pitchFamily="2" charset="0"/>
-              </a:rPr>
-              <a:t>            }</a:t>
-            </a:r>
-          </a:p>
-          <a:p>
-            <a:r>
-              <a:rPr lang="en-US" sz="2000" noProof="1">
-                <a:latin typeface="HelveticaNeue" panose="00000400000000000000" pitchFamily="2" charset="0"/>
-              </a:rPr>
-              <a:t>            </a:t>
-            </a:r>
-            <a:r>
-              <a:rPr lang="en-US" sz="2000" noProof="1">
-                <a:solidFill>
-                  <a:schemeClr val="accent2"/>
-                </a:solidFill>
-                <a:latin typeface="HelveticaNeue" panose="00000400000000000000" pitchFamily="2" charset="0"/>
-              </a:rPr>
-              <a:t>else</a:t>
-            </a:r>
-            <a:r>
-              <a:rPr lang="en-US" sz="2000" noProof="1">
-                <a:latin typeface="HelveticaNeue" panose="00000400000000000000" pitchFamily="2" charset="0"/>
-              </a:rPr>
-              <a:t> -&gt; 		pushBuilder?.path(</a:t>
-            </a:r>
-            <a:r>
-              <a:rPr lang="en-US" sz="2000" noProof="1">
-                <a:solidFill>
-                  <a:srgbClr val="0DA31B"/>
-                </a:solidFill>
-                <a:latin typeface="HelveticaNeue" panose="00000400000000000000" pitchFamily="2" charset="0"/>
-              </a:rPr>
-              <a:t>"/nature.png"</a:t>
-            </a:r>
-            <a:r>
-              <a:rPr lang="en-US" sz="2000" noProof="1">
-                <a:latin typeface="HelveticaNeue" panose="00000400000000000000" pitchFamily="2" charset="0"/>
-              </a:rPr>
-              <a:t>)?.push()</a:t>
-            </a:r>
-          </a:p>
-          <a:p>
-            <a:r>
-              <a:rPr lang="en-US" sz="2000" noProof="1">
-                <a:latin typeface="HelveticaNeue" panose="00000400000000000000" pitchFamily="2" charset="0"/>
-              </a:rPr>
-              <a:t>        }</a:t>
-            </a:r>
-          </a:p>
-          <a:p>
-            <a:r>
-              <a:rPr lang="en-US" sz="2000" noProof="1">
-                <a:latin typeface="HelveticaNeue" panose="00000400000000000000" pitchFamily="2" charset="0"/>
-              </a:rPr>
-              <a:t>        chain!!.doFilter(req, resp)</a:t>
-            </a:r>
-          </a:p>
-          <a:p>
-            <a:r>
-              <a:rPr lang="en-US" sz="2000" noProof="1">
-                <a:latin typeface="HelveticaNeue" panose="00000400000000000000" pitchFamily="2" charset="0"/>
-              </a:rPr>
-              <a:t>    }</a:t>
-            </a:r>
-          </a:p>
-          <a:p>
-            <a:r>
-              <a:rPr lang="en-US" sz="2000" noProof="1">
-                <a:latin typeface="HelveticaNeue" panose="00000400000000000000" pitchFamily="2" charset="0"/>
-              </a:rPr>
-              <a:t>}</a:t>
-            </a:r>
-          </a:p>
-        </p:txBody>
-      </p:sp>
-    </p:spTree>
-    <p:extLst>
-      <p:ext uri="{BB962C8B-B14F-4D97-AF65-F5344CB8AC3E}">
-        <p14:creationId xmlns:p14="http://schemas.microsoft.com/office/powerpoint/2010/main" val="1362873486"/>
-      </p:ext>
-    </p:extLst>
-  </p:cSld>
-  <p:clrMapOvr>
-    <a:masterClrMapping/>
-  </p:clrMapOvr>
-</p:sld>
-</file>
-
 <file path=ppt/slides/slide6.xml><?xml version="1.0" encoding="utf-8"?>
 <p:sld xmlns:a="http://schemas.openxmlformats.org/drawingml/2006/main" xmlns:r="http://schemas.openxmlformats.org/officeDocument/2006/relationships" xmlns:p="http://schemas.openxmlformats.org/presentationml/2006/main">
   <p:cSld>
@@ -27417,6 +28838,1392 @@
           <p:cNvPr id="2" name="TextBox 1">
             <a:extLst>
               <a:ext uri="{FF2B5EF4-FFF2-40B4-BE49-F238E27FC236}">
+                <a16:creationId xmlns:a16="http://schemas.microsoft.com/office/drawing/2014/main" id="{CC49989F-CC4E-4FE0-8E6F-68F083F832D6}"/>
+              </a:ext>
+            </a:extLst>
+          </p:cNvPr>
+          <p:cNvSpPr txBox="1"/>
+          <p:nvPr/>
+        </p:nvSpPr>
+        <p:spPr>
+          <a:xfrm>
+            <a:off x="345989" y="216849"/>
+            <a:ext cx="11471342" cy="646331"/>
+          </a:xfrm>
+          <a:prstGeom prst="rect">
+            <a:avLst/>
+          </a:prstGeom>
+          <a:noFill/>
+        </p:spPr>
+        <p:txBody>
+          <a:bodyPr wrap="square" rtlCol="0">
+            <a:spAutoFit/>
+          </a:bodyPr>
+          <a:lstStyle/>
+          <a:p>
+            <a:pPr algn="ctr"/>
+            <a:r>
+              <a:rPr lang="en-US" sz="3600" b="1" dirty="0">
+                <a:latin typeface="Open Sans Semibold" panose="020B0706030804020204" pitchFamily="34" charset="0"/>
+                <a:ea typeface="Open Sans Semibold" panose="020B0706030804020204" pitchFamily="34" charset="0"/>
+                <a:cs typeface="Open Sans Semibold" panose="020B0706030804020204" pitchFamily="34" charset="0"/>
+              </a:rPr>
+              <a:t>Push Builder from HTTP Request</a:t>
+            </a:r>
+          </a:p>
+        </p:txBody>
+      </p:sp>
+      <p:sp>
+        <p:nvSpPr>
+          <p:cNvPr id="4" name="Rectangle 2">
+            <a:extLst>
+              <a:ext uri="{FF2B5EF4-FFF2-40B4-BE49-F238E27FC236}">
+                <a16:creationId xmlns:a16="http://schemas.microsoft.com/office/drawing/2014/main" id="{C791402F-1EAA-4614-996C-6BAEEF50670B}"/>
+              </a:ext>
+            </a:extLst>
+          </p:cNvPr>
+          <p:cNvSpPr>
+            <a:spLocks noChangeArrowheads="1"/>
+          </p:cNvSpPr>
+          <p:nvPr/>
+        </p:nvSpPr>
+        <p:spPr bwMode="auto">
+          <a:xfrm>
+            <a:off x="580572" y="1001546"/>
+            <a:ext cx="10193816" cy="5420971"/>
+          </a:xfrm>
+          <a:prstGeom prst="rect">
+            <a:avLst/>
+          </a:prstGeom>
+          <a:solidFill>
+            <a:srgbClr val="FFFFFF"/>
+          </a:solidFill>
+          <a:ln>
+            <a:noFill/>
+          </a:ln>
+          <a:effectLst/>
+          <a:extLst>
+            <a:ext uri="{91240B29-F687-4F45-9708-019B960494DF}">
+              <a14:hiddenLine xmlns:a14="http://schemas.microsoft.com/office/drawing/2010/main" w="9525">
+                <a:solidFill>
+                  <a:schemeClr val="tx1"/>
+                </a:solidFill>
+                <a:miter lim="800000"/>
+                <a:headEnd/>
+                <a:tailEnd/>
+              </a14:hiddenLine>
+            </a:ext>
+            <a:ext uri="{AF507438-7753-43E0-B8FC-AC1667EBCBE1}">
+              <a14:hiddenEffects xmlns:a14="http://schemas.microsoft.com/office/drawing/2010/main">
+                <a:effectLst>
+                  <a:outerShdw dist="35921" dir="2700000" algn="ctr" rotWithShape="0">
+                    <a:schemeClr val="bg2"/>
+                  </a:outerShdw>
+                </a:effectLst>
+              </a14:hiddenEffects>
+            </a:ext>
+          </a:extLst>
+        </p:spPr>
+        <p:txBody>
+          <a:bodyPr vert="horz" wrap="none" lIns="91440" tIns="45720" rIns="91440" bIns="45720" numCol="1" anchor="ctr" anchorCtr="0" compatLnSpc="1">
+            <a:prstTxWarp prst="textNoShape">
+              <a:avLst/>
+            </a:prstTxWarp>
+            <a:spAutoFit/>
+          </a:bodyPr>
+          <a:lstStyle/>
+          <a:p>
+            <a:pPr marL="0" marR="0" lvl="0" indent="0" algn="l" defTabSz="914400" rtl="0" eaLnBrk="0" fontAlgn="base" latinLnBrk="0" hangingPunct="0">
+              <a:lnSpc>
+                <a:spcPts val="4200"/>
+              </a:lnSpc>
+              <a:spcBef>
+                <a:spcPct val="0"/>
+              </a:spcBef>
+              <a:spcAft>
+                <a:spcPct val="0"/>
+              </a:spcAft>
+              <a:buClrTx/>
+              <a:buSzTx/>
+              <a:buFontTx/>
+              <a:buNone/>
+              <a:tabLst/>
+            </a:pPr>
+            <a:r>
+              <a:rPr kumimoji="0" lang="en-US" altLang="en-US" sz="2800" b="0" u="none" strike="noStrike" cap="none" normalizeH="0" baseline="0" noProof="1">
+                <a:ln>
+                  <a:noFill/>
+                </a:ln>
+                <a:solidFill>
+                  <a:srgbClr val="000080"/>
+                </a:solidFill>
+                <a:effectLst/>
+                <a:latin typeface="HelveticaNeue" panose="00000400000000000000" pitchFamily="2" charset="0"/>
+                <a:cs typeface="Courier New" panose="02070309020205020404" pitchFamily="49" charset="0"/>
+              </a:rPr>
+              <a:t>fun </a:t>
+            </a:r>
+            <a:r>
+              <a:rPr kumimoji="0" lang="en-US" altLang="en-US" sz="2800" b="1" u="none" strike="noStrike" cap="none" normalizeH="0" baseline="0" noProof="1">
+                <a:ln>
+                  <a:noFill/>
+                </a:ln>
+                <a:solidFill>
+                  <a:srgbClr val="0100FF"/>
+                </a:solidFill>
+                <a:effectLst/>
+                <a:latin typeface="HelveticaNeue" panose="00000400000000000000" pitchFamily="2" charset="0"/>
+                <a:cs typeface="Courier New" panose="02070309020205020404" pitchFamily="49" charset="0"/>
+              </a:rPr>
+              <a:t>push1</a:t>
+            </a:r>
+            <a:r>
+              <a:rPr kumimoji="0" lang="en-US" altLang="en-US" sz="2800" b="0" u="none" strike="noStrike" cap="none" normalizeH="0" baseline="0" noProof="1">
+                <a:ln>
+                  <a:noFill/>
+                </a:ln>
+                <a:solidFill>
+                  <a:srgbClr val="000000"/>
+                </a:solidFill>
+                <a:effectLst/>
+                <a:latin typeface="HelveticaNeue" panose="00000400000000000000" pitchFamily="2" charset="0"/>
+                <a:cs typeface="Courier New" panose="02070309020205020404" pitchFamily="49" charset="0"/>
+              </a:rPr>
+              <a:t>(req: HttpServletRequest, resp: HttpServletResponse) {</a:t>
+            </a:r>
+            <a:br>
+              <a:rPr kumimoji="0" lang="en-US" altLang="en-US" sz="2800" b="0" u="none" strike="noStrike" cap="none" normalizeH="0" baseline="0" noProof="1">
+                <a:ln>
+                  <a:noFill/>
+                </a:ln>
+                <a:solidFill>
+                  <a:srgbClr val="000000"/>
+                </a:solidFill>
+                <a:effectLst/>
+                <a:latin typeface="HelveticaNeue" panose="00000400000000000000" pitchFamily="2" charset="0"/>
+                <a:cs typeface="Courier New" panose="02070309020205020404" pitchFamily="49" charset="0"/>
+              </a:rPr>
+            </a:br>
+            <a:r>
+              <a:rPr kumimoji="0" lang="en-US" altLang="en-US" sz="2800" b="0" u="none" strike="noStrike" cap="none" normalizeH="0" baseline="0" noProof="1">
+                <a:ln>
+                  <a:noFill/>
+                </a:ln>
+                <a:solidFill>
+                  <a:srgbClr val="000000"/>
+                </a:solidFill>
+                <a:effectLst/>
+                <a:latin typeface="HelveticaNeue" panose="00000400000000000000" pitchFamily="2" charset="0"/>
+                <a:cs typeface="Courier New" panose="02070309020205020404" pitchFamily="49" charset="0"/>
+              </a:rPr>
+              <a:t>    </a:t>
+            </a:r>
+            <a:r>
+              <a:rPr kumimoji="0" lang="en-US" altLang="en-US" sz="2800" b="0" u="none" strike="noStrike" cap="none" normalizeH="0" baseline="0" noProof="1">
+                <a:ln>
+                  <a:noFill/>
+                </a:ln>
+                <a:solidFill>
+                  <a:srgbClr val="000080"/>
+                </a:solidFill>
+                <a:effectLst/>
+                <a:latin typeface="HelveticaNeue" panose="00000400000000000000" pitchFamily="2" charset="0"/>
+                <a:cs typeface="Courier New" panose="02070309020205020404" pitchFamily="49" charset="0"/>
+              </a:rPr>
+              <a:t>val </a:t>
+            </a:r>
+            <a:r>
+              <a:rPr kumimoji="0" lang="en-US" altLang="en-US" sz="2800" b="0" u="none" strike="noStrike" cap="none" normalizeH="0" baseline="0" noProof="1">
+                <a:ln>
+                  <a:noFill/>
+                </a:ln>
+                <a:solidFill>
+                  <a:srgbClr val="1A0CB1"/>
+                </a:solidFill>
+                <a:effectLst/>
+                <a:latin typeface="HelveticaNeue" panose="00000400000000000000" pitchFamily="2" charset="0"/>
+                <a:cs typeface="Courier New" panose="02070309020205020404" pitchFamily="49" charset="0"/>
+              </a:rPr>
+              <a:t>pushBuilder </a:t>
+            </a:r>
+            <a:r>
+              <a:rPr kumimoji="0" lang="en-US" altLang="en-US" sz="2800" b="0" u="none" strike="noStrike" cap="none" normalizeH="0" baseline="0" noProof="1">
+                <a:ln>
+                  <a:noFill/>
+                </a:ln>
+                <a:solidFill>
+                  <a:srgbClr val="000000"/>
+                </a:solidFill>
+                <a:effectLst/>
+                <a:latin typeface="HelveticaNeue" panose="00000400000000000000" pitchFamily="2" charset="0"/>
+                <a:cs typeface="Courier New" panose="02070309020205020404" pitchFamily="49" charset="0"/>
+              </a:rPr>
+              <a:t>= req.</a:t>
+            </a:r>
+            <a:r>
+              <a:rPr kumimoji="0" lang="en-US" altLang="en-US" sz="2800" b="1" u="none" strike="noStrike" cap="none" normalizeH="0" baseline="0" noProof="1">
+                <a:ln>
+                  <a:noFill/>
+                </a:ln>
+                <a:solidFill>
+                  <a:srgbClr val="00064F"/>
+                </a:solidFill>
+                <a:effectLst/>
+                <a:latin typeface="HelveticaNeue" panose="00000400000000000000" pitchFamily="2" charset="0"/>
+                <a:cs typeface="Courier New" panose="02070309020205020404" pitchFamily="49" charset="0"/>
+              </a:rPr>
+              <a:t>newPushBuilder</a:t>
+            </a:r>
+            <a:r>
+              <a:rPr kumimoji="0" lang="en-US" altLang="en-US" sz="2800" b="0" u="none" strike="noStrike" cap="none" normalizeH="0" baseline="0" noProof="1">
+                <a:ln>
+                  <a:noFill/>
+                </a:ln>
+                <a:solidFill>
+                  <a:srgbClr val="000000"/>
+                </a:solidFill>
+                <a:effectLst/>
+                <a:latin typeface="HelveticaNeue" panose="00000400000000000000" pitchFamily="2" charset="0"/>
+                <a:cs typeface="Courier New" panose="02070309020205020404" pitchFamily="49" charset="0"/>
+              </a:rPr>
+              <a:t>()</a:t>
+            </a:r>
+            <a:br>
+              <a:rPr kumimoji="0" lang="en-US" altLang="en-US" sz="2800" b="0" u="none" strike="noStrike" cap="none" normalizeH="0" baseline="0" noProof="1">
+                <a:ln>
+                  <a:noFill/>
+                </a:ln>
+                <a:solidFill>
+                  <a:srgbClr val="000000"/>
+                </a:solidFill>
+                <a:effectLst/>
+                <a:latin typeface="HelveticaNeue" panose="00000400000000000000" pitchFamily="2" charset="0"/>
+                <a:cs typeface="Courier New" panose="02070309020205020404" pitchFamily="49" charset="0"/>
+              </a:rPr>
+            </a:br>
+            <a:r>
+              <a:rPr kumimoji="0" lang="en-US" altLang="en-US" sz="2800" b="0" u="none" strike="noStrike" cap="none" normalizeH="0" baseline="0" noProof="1">
+                <a:ln>
+                  <a:noFill/>
+                </a:ln>
+                <a:solidFill>
+                  <a:srgbClr val="000000"/>
+                </a:solidFill>
+                <a:effectLst/>
+                <a:latin typeface="HelveticaNeue" panose="00000400000000000000" pitchFamily="2" charset="0"/>
+                <a:cs typeface="Courier New" panose="02070309020205020404" pitchFamily="49" charset="0"/>
+              </a:rPr>
+              <a:t>    </a:t>
+            </a:r>
+            <a:r>
+              <a:rPr kumimoji="0" lang="en-US" altLang="en-US" sz="2800" b="0" u="none" strike="noStrike" cap="none" normalizeH="0" baseline="0" noProof="1">
+                <a:ln>
+                  <a:noFill/>
+                </a:ln>
+                <a:solidFill>
+                  <a:srgbClr val="1A0CB1"/>
+                </a:solidFill>
+                <a:effectLst/>
+                <a:latin typeface="HelveticaNeue" panose="00000400000000000000" pitchFamily="2" charset="0"/>
+                <a:cs typeface="Courier New" panose="02070309020205020404" pitchFamily="49" charset="0"/>
+              </a:rPr>
+              <a:t>pushBuilder</a:t>
+            </a:r>
+            <a:r>
+              <a:rPr kumimoji="0" lang="en-US" altLang="en-US" sz="2800" b="0" u="none" strike="noStrike" cap="none" normalizeH="0" baseline="0" noProof="1">
+                <a:ln>
+                  <a:noFill/>
+                </a:ln>
+                <a:solidFill>
+                  <a:srgbClr val="000000"/>
+                </a:solidFill>
+                <a:effectLst/>
+                <a:latin typeface="HelveticaNeue" panose="00000400000000000000" pitchFamily="2" charset="0"/>
+                <a:cs typeface="Courier New" panose="02070309020205020404" pitchFamily="49" charset="0"/>
+              </a:rPr>
+              <a:t>?.apply </a:t>
+            </a:r>
+            <a:r>
+              <a:rPr kumimoji="0" lang="en-US" altLang="en-US" sz="2800" b="1" u="none" strike="noStrike" cap="none" normalizeH="0" baseline="0" noProof="1">
+                <a:ln>
+                  <a:noFill/>
+                </a:ln>
+                <a:solidFill>
+                  <a:srgbClr val="000000"/>
+                </a:solidFill>
+                <a:effectLst/>
+                <a:latin typeface="HelveticaNeue" panose="00000400000000000000" pitchFamily="2" charset="0"/>
+                <a:cs typeface="Courier New" panose="02070309020205020404" pitchFamily="49" charset="0"/>
+              </a:rPr>
+              <a:t>{</a:t>
+            </a:r>
+            <a:br>
+              <a:rPr kumimoji="0" lang="en-US" altLang="en-US" sz="2800" b="1" u="none" strike="noStrike" cap="none" normalizeH="0" baseline="0" noProof="1">
+                <a:ln>
+                  <a:noFill/>
+                </a:ln>
+                <a:solidFill>
+                  <a:srgbClr val="000000"/>
+                </a:solidFill>
+                <a:effectLst/>
+                <a:latin typeface="HelveticaNeue" panose="00000400000000000000" pitchFamily="2" charset="0"/>
+                <a:cs typeface="Courier New" panose="02070309020205020404" pitchFamily="49" charset="0"/>
+              </a:rPr>
+            </a:br>
+            <a:r>
+              <a:rPr kumimoji="0" lang="en-US" altLang="en-US" sz="2800" b="1" u="none" strike="noStrike" cap="none" normalizeH="0" baseline="0" noProof="1">
+                <a:ln>
+                  <a:noFill/>
+                </a:ln>
+                <a:solidFill>
+                  <a:srgbClr val="000000"/>
+                </a:solidFill>
+                <a:effectLst/>
+                <a:latin typeface="HelveticaNeue" panose="00000400000000000000" pitchFamily="2" charset="0"/>
+                <a:cs typeface="Courier New" panose="02070309020205020404" pitchFamily="49" charset="0"/>
+              </a:rPr>
+              <a:t>        </a:t>
+            </a:r>
+            <a:r>
+              <a:rPr kumimoji="0" lang="en-US" altLang="en-US" sz="2800" b="0" u="none" strike="noStrike" cap="none" normalizeH="0" baseline="0" noProof="1">
+                <a:ln>
+                  <a:noFill/>
+                </a:ln>
+                <a:solidFill>
+                  <a:srgbClr val="000080"/>
+                </a:solidFill>
+                <a:effectLst/>
+                <a:latin typeface="HelveticaNeue" panose="00000400000000000000" pitchFamily="2" charset="0"/>
+                <a:cs typeface="Courier New" panose="02070309020205020404" pitchFamily="49" charset="0"/>
+              </a:rPr>
+              <a:t>for </a:t>
+            </a:r>
+            <a:r>
+              <a:rPr kumimoji="0" lang="en-US" altLang="en-US" sz="2800" b="0" u="none" strike="noStrike" cap="none" normalizeH="0" baseline="0" noProof="1">
+                <a:ln>
+                  <a:noFill/>
+                </a:ln>
+                <a:solidFill>
+                  <a:srgbClr val="000000"/>
+                </a:solidFill>
+                <a:effectLst/>
+                <a:latin typeface="HelveticaNeue" panose="00000400000000000000" pitchFamily="2" charset="0"/>
+                <a:cs typeface="Courier New" panose="02070309020205020404" pitchFamily="49" charset="0"/>
+              </a:rPr>
+              <a:t>(</a:t>
+            </a:r>
+            <a:r>
+              <a:rPr kumimoji="0" lang="en-US" altLang="en-US" sz="2800" b="0" u="none" strike="noStrike" cap="none" normalizeH="0" baseline="0" noProof="1">
+                <a:ln>
+                  <a:noFill/>
+                </a:ln>
+                <a:solidFill>
+                  <a:srgbClr val="1A0CB1"/>
+                </a:solidFill>
+                <a:effectLst/>
+                <a:latin typeface="HelveticaNeue" panose="00000400000000000000" pitchFamily="2" charset="0"/>
+                <a:cs typeface="Courier New" panose="02070309020205020404" pitchFamily="49" charset="0"/>
+              </a:rPr>
+              <a:t>i </a:t>
+            </a:r>
+            <a:r>
+              <a:rPr kumimoji="0" lang="en-US" altLang="en-US" sz="2800" b="0" u="none" strike="noStrike" cap="none" normalizeH="0" baseline="0" noProof="1">
+                <a:ln>
+                  <a:noFill/>
+                </a:ln>
+                <a:solidFill>
+                  <a:srgbClr val="000080"/>
+                </a:solidFill>
+                <a:effectLst/>
+                <a:latin typeface="HelveticaNeue" panose="00000400000000000000" pitchFamily="2" charset="0"/>
+                <a:cs typeface="Courier New" panose="02070309020205020404" pitchFamily="49" charset="0"/>
+              </a:rPr>
+              <a:t>in </a:t>
+            </a:r>
+            <a:r>
+              <a:rPr kumimoji="0" lang="en-US" altLang="en-US" sz="2800" b="0" u="none" strike="noStrike" cap="none" normalizeH="0" baseline="0" noProof="1">
+                <a:ln>
+                  <a:noFill/>
+                </a:ln>
+                <a:solidFill>
+                  <a:srgbClr val="0000FF"/>
+                </a:solidFill>
+                <a:effectLst/>
+                <a:latin typeface="HelveticaNeue" panose="00000400000000000000" pitchFamily="2" charset="0"/>
+                <a:cs typeface="Courier New" panose="02070309020205020404" pitchFamily="49" charset="0"/>
+              </a:rPr>
+              <a:t>1</a:t>
+            </a:r>
+            <a:r>
+              <a:rPr kumimoji="0" lang="en-US" altLang="en-US" sz="2800" b="0" u="none" strike="noStrike" cap="none" normalizeH="0" baseline="0" noProof="1">
+                <a:ln>
+                  <a:noFill/>
+                </a:ln>
+                <a:solidFill>
+                  <a:srgbClr val="000000"/>
+                </a:solidFill>
+                <a:effectLst/>
+                <a:latin typeface="HelveticaNeue" panose="00000400000000000000" pitchFamily="2" charset="0"/>
+                <a:cs typeface="Courier New" panose="02070309020205020404" pitchFamily="49" charset="0"/>
+              </a:rPr>
+              <a:t>..</a:t>
+            </a:r>
+            <a:r>
+              <a:rPr kumimoji="0" lang="en-US" altLang="en-US" sz="2800" b="0" u="none" strike="noStrike" cap="none" normalizeH="0" baseline="0" noProof="1">
+                <a:ln>
+                  <a:noFill/>
+                </a:ln>
+                <a:solidFill>
+                  <a:srgbClr val="0000FF"/>
+                </a:solidFill>
+                <a:effectLst/>
+                <a:latin typeface="HelveticaNeue" panose="00000400000000000000" pitchFamily="2" charset="0"/>
+                <a:cs typeface="Courier New" panose="02070309020205020404" pitchFamily="49" charset="0"/>
+              </a:rPr>
+              <a:t>250</a:t>
+            </a:r>
+            <a:r>
+              <a:rPr kumimoji="0" lang="en-US" altLang="en-US" sz="2800" b="0" u="none" strike="noStrike" cap="none" normalizeH="0" baseline="0" noProof="1">
+                <a:ln>
+                  <a:noFill/>
+                </a:ln>
+                <a:solidFill>
+                  <a:srgbClr val="000000"/>
+                </a:solidFill>
+                <a:effectLst/>
+                <a:latin typeface="HelveticaNeue" panose="00000400000000000000" pitchFamily="2" charset="0"/>
+                <a:cs typeface="Courier New" panose="02070309020205020404" pitchFamily="49" charset="0"/>
+              </a:rPr>
+              <a:t>) {</a:t>
+            </a:r>
+            <a:br>
+              <a:rPr kumimoji="0" lang="en-US" altLang="en-US" sz="2800" b="0" u="none" strike="noStrike" cap="none" normalizeH="0" baseline="0" noProof="1">
+                <a:ln>
+                  <a:noFill/>
+                </a:ln>
+                <a:solidFill>
+                  <a:srgbClr val="000000"/>
+                </a:solidFill>
+                <a:effectLst/>
+                <a:latin typeface="HelveticaNeue" panose="00000400000000000000" pitchFamily="2" charset="0"/>
+                <a:cs typeface="Courier New" panose="02070309020205020404" pitchFamily="49" charset="0"/>
+              </a:rPr>
+            </a:br>
+            <a:r>
+              <a:rPr kumimoji="0" lang="en-US" altLang="en-US" sz="2800" b="0" u="none" strike="noStrike" cap="none" normalizeH="0" baseline="0" noProof="1">
+                <a:ln>
+                  <a:noFill/>
+                </a:ln>
+                <a:solidFill>
+                  <a:srgbClr val="000000"/>
+                </a:solidFill>
+                <a:effectLst/>
+                <a:latin typeface="HelveticaNeue" panose="00000400000000000000" pitchFamily="2" charset="0"/>
+                <a:cs typeface="Courier New" panose="02070309020205020404" pitchFamily="49" charset="0"/>
+              </a:rPr>
+              <a:t>            </a:t>
+            </a:r>
+            <a:r>
+              <a:rPr kumimoji="0" lang="en-US" altLang="en-US" sz="2800" b="0" u="none" strike="noStrike" cap="none" normalizeH="0" baseline="0" noProof="1">
+                <a:ln>
+                  <a:noFill/>
+                </a:ln>
+                <a:solidFill>
+                  <a:srgbClr val="1A0CB1"/>
+                </a:solidFill>
+                <a:effectLst/>
+                <a:latin typeface="HelveticaNeue" panose="00000400000000000000" pitchFamily="2" charset="0"/>
+                <a:cs typeface="Courier New" panose="02070309020205020404" pitchFamily="49" charset="0"/>
+              </a:rPr>
+              <a:t>pushBuilder</a:t>
+            </a:r>
+            <a:br>
+              <a:rPr kumimoji="0" lang="en-US" altLang="en-US" sz="2800" b="0" u="none" strike="noStrike" cap="none" normalizeH="0" baseline="0" noProof="1">
+                <a:ln>
+                  <a:noFill/>
+                </a:ln>
+                <a:solidFill>
+                  <a:srgbClr val="1A0CB1"/>
+                </a:solidFill>
+                <a:effectLst/>
+                <a:latin typeface="HelveticaNeue" panose="00000400000000000000" pitchFamily="2" charset="0"/>
+                <a:cs typeface="Courier New" panose="02070309020205020404" pitchFamily="49" charset="0"/>
+              </a:rPr>
+            </a:br>
+            <a:r>
+              <a:rPr kumimoji="0" lang="en-US" altLang="en-US" sz="2800" b="0" u="none" strike="noStrike" cap="none" normalizeH="0" baseline="0" noProof="1">
+                <a:ln>
+                  <a:noFill/>
+                </a:ln>
+                <a:solidFill>
+                  <a:srgbClr val="1A0CB1"/>
+                </a:solidFill>
+                <a:effectLst/>
+                <a:latin typeface="HelveticaNeue" panose="00000400000000000000" pitchFamily="2" charset="0"/>
+                <a:cs typeface="Courier New" panose="02070309020205020404" pitchFamily="49" charset="0"/>
+              </a:rPr>
+              <a:t>                    </a:t>
+            </a:r>
+            <a:r>
+              <a:rPr kumimoji="0" lang="en-US" altLang="en-US" sz="2800" b="0" u="none" strike="noStrike" cap="none" normalizeH="0" baseline="0" noProof="1">
+                <a:ln>
+                  <a:noFill/>
+                </a:ln>
+                <a:solidFill>
+                  <a:srgbClr val="000000"/>
+                </a:solidFill>
+                <a:effectLst/>
+                <a:latin typeface="HelveticaNeue" panose="00000400000000000000" pitchFamily="2" charset="0"/>
+                <a:cs typeface="Courier New" panose="02070309020205020404" pitchFamily="49" charset="0"/>
+              </a:rPr>
+              <a:t>.</a:t>
+            </a:r>
+            <a:r>
+              <a:rPr kumimoji="0" lang="en-US" altLang="en-US" sz="2800" b="1" u="none" strike="noStrike" cap="none" normalizeH="0" baseline="0" noProof="1">
+                <a:ln>
+                  <a:noFill/>
+                </a:ln>
+                <a:solidFill>
+                  <a:srgbClr val="00064F"/>
+                </a:solidFill>
+                <a:effectLst/>
+                <a:latin typeface="HelveticaNeue" panose="00000400000000000000" pitchFamily="2" charset="0"/>
+                <a:cs typeface="Courier New" panose="02070309020205020404" pitchFamily="49" charset="0"/>
+              </a:rPr>
+              <a:t>path</a:t>
+            </a:r>
+            <a:r>
+              <a:rPr kumimoji="0" lang="en-US" altLang="en-US" sz="2800" b="0" u="none" strike="noStrike" cap="none" normalizeH="0" baseline="0" noProof="1">
+                <a:ln>
+                  <a:noFill/>
+                </a:ln>
+                <a:solidFill>
+                  <a:srgbClr val="000000"/>
+                </a:solidFill>
+                <a:effectLst/>
+                <a:latin typeface="HelveticaNeue" panose="00000400000000000000" pitchFamily="2" charset="0"/>
+                <a:cs typeface="Courier New" panose="02070309020205020404" pitchFamily="49" charset="0"/>
+              </a:rPr>
+              <a:t>(</a:t>
+            </a:r>
+            <a:r>
+              <a:rPr kumimoji="0" lang="en-US" altLang="en-US" sz="2800" b="1" u="none" strike="noStrike" cap="none" normalizeH="0" baseline="0" noProof="1">
+                <a:ln>
+                  <a:noFill/>
+                </a:ln>
+                <a:solidFill>
+                  <a:srgbClr val="658ABA"/>
+                </a:solidFill>
+                <a:effectLst/>
+                <a:latin typeface="HelveticaNeue" panose="00000400000000000000" pitchFamily="2" charset="0"/>
+                <a:cs typeface="Courier New" panose="02070309020205020404" pitchFamily="49" charset="0"/>
+              </a:rPr>
+              <a:t>"res/images/space/space_</a:t>
+            </a:r>
+            <a:r>
+              <a:rPr kumimoji="0" lang="en-US" altLang="en-US" sz="2800" b="1" u="none" strike="noStrike" cap="none" normalizeH="0" baseline="0" noProof="1">
+                <a:ln>
+                  <a:noFill/>
+                </a:ln>
+                <a:solidFill>
+                  <a:srgbClr val="000080"/>
+                </a:solidFill>
+                <a:effectLst/>
+                <a:latin typeface="HelveticaNeue" panose="00000400000000000000" pitchFamily="2" charset="0"/>
+                <a:cs typeface="Courier New" panose="02070309020205020404" pitchFamily="49" charset="0"/>
+              </a:rPr>
+              <a:t>$</a:t>
+            </a:r>
+            <a:r>
+              <a:rPr kumimoji="0" lang="en-US" altLang="en-US" sz="2800" b="0" u="none" strike="noStrike" cap="none" normalizeH="0" baseline="0" noProof="1">
+                <a:ln>
+                  <a:noFill/>
+                </a:ln>
+                <a:solidFill>
+                  <a:srgbClr val="1A0CB1"/>
+                </a:solidFill>
+                <a:effectLst/>
+                <a:latin typeface="HelveticaNeue" panose="00000400000000000000" pitchFamily="2" charset="0"/>
+                <a:cs typeface="Courier New" panose="02070309020205020404" pitchFamily="49" charset="0"/>
+              </a:rPr>
+              <a:t>i</a:t>
+            </a:r>
+            <a:r>
+              <a:rPr kumimoji="0" lang="en-US" altLang="en-US" sz="2800" b="1" u="none" strike="noStrike" cap="none" normalizeH="0" baseline="0" noProof="1">
+                <a:ln>
+                  <a:noFill/>
+                </a:ln>
+                <a:solidFill>
+                  <a:srgbClr val="658ABA"/>
+                </a:solidFill>
+                <a:effectLst/>
+                <a:latin typeface="HelveticaNeue" panose="00000400000000000000" pitchFamily="2" charset="0"/>
+                <a:cs typeface="Courier New" panose="02070309020205020404" pitchFamily="49" charset="0"/>
+              </a:rPr>
+              <a:t>.jpg"</a:t>
+            </a:r>
+            <a:r>
+              <a:rPr kumimoji="0" lang="en-US" altLang="en-US" sz="2800" b="0" u="none" strike="noStrike" cap="none" normalizeH="0" baseline="0" noProof="1">
+                <a:ln>
+                  <a:noFill/>
+                </a:ln>
+                <a:solidFill>
+                  <a:srgbClr val="000000"/>
+                </a:solidFill>
+                <a:effectLst/>
+                <a:latin typeface="HelveticaNeue" panose="00000400000000000000" pitchFamily="2" charset="0"/>
+                <a:cs typeface="Courier New" panose="02070309020205020404" pitchFamily="49" charset="0"/>
+              </a:rPr>
+              <a:t>)</a:t>
+            </a:r>
+            <a:br>
+              <a:rPr kumimoji="0" lang="en-US" altLang="en-US" sz="2800" b="0" u="none" strike="noStrike" cap="none" normalizeH="0" baseline="0" noProof="1">
+                <a:ln>
+                  <a:noFill/>
+                </a:ln>
+                <a:solidFill>
+                  <a:srgbClr val="000000"/>
+                </a:solidFill>
+                <a:effectLst/>
+                <a:latin typeface="HelveticaNeue" panose="00000400000000000000" pitchFamily="2" charset="0"/>
+                <a:cs typeface="Courier New" panose="02070309020205020404" pitchFamily="49" charset="0"/>
+              </a:rPr>
+            </a:br>
+            <a:r>
+              <a:rPr kumimoji="0" lang="en-US" altLang="en-US" sz="2800" b="0" u="none" strike="noStrike" cap="none" normalizeH="0" baseline="0" noProof="1">
+                <a:ln>
+                  <a:noFill/>
+                </a:ln>
+                <a:solidFill>
+                  <a:srgbClr val="000000"/>
+                </a:solidFill>
+                <a:effectLst/>
+                <a:latin typeface="HelveticaNeue" panose="00000400000000000000" pitchFamily="2" charset="0"/>
+                <a:cs typeface="Courier New" panose="02070309020205020404" pitchFamily="49" charset="0"/>
+              </a:rPr>
+              <a:t>                    .</a:t>
+            </a:r>
+            <a:r>
+              <a:rPr kumimoji="0" lang="en-US" altLang="en-US" sz="2800" b="1" u="none" strike="noStrike" cap="none" normalizeH="0" baseline="0" noProof="1">
+                <a:ln>
+                  <a:noFill/>
+                </a:ln>
+                <a:solidFill>
+                  <a:srgbClr val="00064F"/>
+                </a:solidFill>
+                <a:effectLst/>
+                <a:latin typeface="HelveticaNeue" panose="00000400000000000000" pitchFamily="2" charset="0"/>
+                <a:cs typeface="Courier New" panose="02070309020205020404" pitchFamily="49" charset="0"/>
+              </a:rPr>
+              <a:t>addHeader</a:t>
+            </a:r>
+            <a:r>
+              <a:rPr kumimoji="0" lang="en-US" altLang="en-US" sz="2800" b="0" u="none" strike="noStrike" cap="none" normalizeH="0" baseline="0" noProof="1">
+                <a:ln>
+                  <a:noFill/>
+                </a:ln>
+                <a:solidFill>
+                  <a:srgbClr val="000000"/>
+                </a:solidFill>
+                <a:effectLst/>
+                <a:latin typeface="HelveticaNeue" panose="00000400000000000000" pitchFamily="2" charset="0"/>
+                <a:cs typeface="Courier New" panose="02070309020205020404" pitchFamily="49" charset="0"/>
+              </a:rPr>
+              <a:t>(</a:t>
+            </a:r>
+            <a:r>
+              <a:rPr kumimoji="0" lang="en-US" altLang="en-US" sz="2800" b="1" u="none" strike="noStrike" cap="none" normalizeH="0" baseline="0" noProof="1">
+                <a:ln>
+                  <a:noFill/>
+                </a:ln>
+                <a:solidFill>
+                  <a:srgbClr val="658ABA"/>
+                </a:solidFill>
+                <a:effectLst/>
+                <a:latin typeface="HelveticaNeue" panose="00000400000000000000" pitchFamily="2" charset="0"/>
+                <a:cs typeface="Courier New" panose="02070309020205020404" pitchFamily="49" charset="0"/>
+              </a:rPr>
+              <a:t>"content-type"</a:t>
+            </a:r>
+            <a:r>
+              <a:rPr kumimoji="0" lang="en-US" altLang="en-US" sz="2800" b="0" u="none" strike="noStrike" cap="none" normalizeH="0" baseline="0" noProof="1">
+                <a:ln>
+                  <a:noFill/>
+                </a:ln>
+                <a:solidFill>
+                  <a:srgbClr val="000000"/>
+                </a:solidFill>
+                <a:effectLst/>
+                <a:latin typeface="HelveticaNeue" panose="00000400000000000000" pitchFamily="2" charset="0"/>
+                <a:cs typeface="Courier New" panose="02070309020205020404" pitchFamily="49" charset="0"/>
+              </a:rPr>
+              <a:t>, </a:t>
+            </a:r>
+            <a:r>
+              <a:rPr kumimoji="0" lang="en-US" altLang="en-US" sz="2800" b="1" u="none" strike="noStrike" cap="none" normalizeH="0" baseline="0" noProof="1">
+                <a:ln>
+                  <a:noFill/>
+                </a:ln>
+                <a:solidFill>
+                  <a:srgbClr val="658ABA"/>
+                </a:solidFill>
+                <a:effectLst/>
+                <a:latin typeface="HelveticaNeue" panose="00000400000000000000" pitchFamily="2" charset="0"/>
+                <a:cs typeface="Courier New" panose="02070309020205020404" pitchFamily="49" charset="0"/>
+              </a:rPr>
+              <a:t>"image/jpg"</a:t>
+            </a:r>
+            <a:r>
+              <a:rPr kumimoji="0" lang="en-US" altLang="en-US" sz="2800" b="0" u="none" strike="noStrike" cap="none" normalizeH="0" baseline="0" noProof="1">
+                <a:ln>
+                  <a:noFill/>
+                </a:ln>
+                <a:solidFill>
+                  <a:srgbClr val="000000"/>
+                </a:solidFill>
+                <a:effectLst/>
+                <a:latin typeface="HelveticaNeue" panose="00000400000000000000" pitchFamily="2" charset="0"/>
+                <a:cs typeface="Courier New" panose="02070309020205020404" pitchFamily="49" charset="0"/>
+              </a:rPr>
+              <a:t>)</a:t>
+            </a:r>
+            <a:br>
+              <a:rPr kumimoji="0" lang="en-US" altLang="en-US" sz="2800" b="0" u="none" strike="noStrike" cap="none" normalizeH="0" baseline="0" noProof="1">
+                <a:ln>
+                  <a:noFill/>
+                </a:ln>
+                <a:solidFill>
+                  <a:srgbClr val="000000"/>
+                </a:solidFill>
+                <a:effectLst/>
+                <a:latin typeface="HelveticaNeue" panose="00000400000000000000" pitchFamily="2" charset="0"/>
+                <a:cs typeface="Courier New" panose="02070309020205020404" pitchFamily="49" charset="0"/>
+              </a:rPr>
+            </a:br>
+            <a:r>
+              <a:rPr kumimoji="0" lang="en-US" altLang="en-US" sz="2800" b="0" u="none" strike="noStrike" cap="none" normalizeH="0" baseline="0" noProof="1">
+                <a:ln>
+                  <a:noFill/>
+                </a:ln>
+                <a:solidFill>
+                  <a:srgbClr val="000000"/>
+                </a:solidFill>
+                <a:effectLst/>
+                <a:latin typeface="HelveticaNeue" panose="00000400000000000000" pitchFamily="2" charset="0"/>
+                <a:cs typeface="Courier New" panose="02070309020205020404" pitchFamily="49" charset="0"/>
+              </a:rPr>
+              <a:t>                    .</a:t>
+            </a:r>
+            <a:r>
+              <a:rPr kumimoji="0" lang="en-US" altLang="en-US" sz="2800" b="1" u="none" strike="noStrike" cap="none" normalizeH="0" baseline="0" noProof="1">
+                <a:ln>
+                  <a:noFill/>
+                </a:ln>
+                <a:solidFill>
+                  <a:srgbClr val="00064F"/>
+                </a:solidFill>
+                <a:effectLst/>
+                <a:latin typeface="HelveticaNeue" panose="00000400000000000000" pitchFamily="2" charset="0"/>
+                <a:cs typeface="Courier New" panose="02070309020205020404" pitchFamily="49" charset="0"/>
+              </a:rPr>
+              <a:t>push</a:t>
+            </a:r>
+            <a:r>
+              <a:rPr kumimoji="0" lang="en-US" altLang="en-US" sz="2800" b="0" u="none" strike="noStrike" cap="none" normalizeH="0" baseline="0" noProof="1">
+                <a:ln>
+                  <a:noFill/>
+                </a:ln>
+                <a:solidFill>
+                  <a:srgbClr val="000000"/>
+                </a:solidFill>
+                <a:effectLst/>
+                <a:latin typeface="HelveticaNeue" panose="00000400000000000000" pitchFamily="2" charset="0"/>
+                <a:cs typeface="Courier New" panose="02070309020205020404" pitchFamily="49" charset="0"/>
+              </a:rPr>
+              <a:t>()</a:t>
+            </a:r>
+            <a:br>
+              <a:rPr kumimoji="0" lang="en-US" altLang="en-US" sz="2800" b="0" u="none" strike="noStrike" cap="none" normalizeH="0" baseline="0" noProof="1">
+                <a:ln>
+                  <a:noFill/>
+                </a:ln>
+                <a:solidFill>
+                  <a:srgbClr val="000000"/>
+                </a:solidFill>
+                <a:effectLst/>
+                <a:latin typeface="HelveticaNeue" panose="00000400000000000000" pitchFamily="2" charset="0"/>
+                <a:cs typeface="Courier New" panose="02070309020205020404" pitchFamily="49" charset="0"/>
+              </a:rPr>
+            </a:br>
+            <a:r>
+              <a:rPr kumimoji="0" lang="en-US" altLang="en-US" sz="2800" b="0" u="none" strike="noStrike" cap="none" normalizeH="0" baseline="0" noProof="1">
+                <a:ln>
+                  <a:noFill/>
+                </a:ln>
+                <a:solidFill>
+                  <a:srgbClr val="000000"/>
+                </a:solidFill>
+                <a:effectLst/>
+                <a:latin typeface="HelveticaNeue" panose="00000400000000000000" pitchFamily="2" charset="0"/>
+                <a:cs typeface="Courier New" panose="02070309020205020404" pitchFamily="49" charset="0"/>
+              </a:rPr>
+              <a:t>        }</a:t>
+            </a:r>
+            <a:br>
+              <a:rPr kumimoji="0" lang="en-US" altLang="en-US" sz="2800" b="0" u="none" strike="noStrike" cap="none" normalizeH="0" baseline="0" noProof="1">
+                <a:ln>
+                  <a:noFill/>
+                </a:ln>
+                <a:solidFill>
+                  <a:srgbClr val="000000"/>
+                </a:solidFill>
+                <a:effectLst/>
+                <a:latin typeface="HelveticaNeue" panose="00000400000000000000" pitchFamily="2" charset="0"/>
+                <a:cs typeface="Courier New" panose="02070309020205020404" pitchFamily="49" charset="0"/>
+              </a:rPr>
+            </a:br>
+            <a:r>
+              <a:rPr kumimoji="0" lang="en-US" altLang="en-US" sz="2800" b="0" u="none" strike="noStrike" cap="none" normalizeH="0" baseline="0" noProof="1">
+                <a:ln>
+                  <a:noFill/>
+                </a:ln>
+                <a:solidFill>
+                  <a:srgbClr val="000000"/>
+                </a:solidFill>
+                <a:effectLst/>
+                <a:latin typeface="HelveticaNeue" panose="00000400000000000000" pitchFamily="2" charset="0"/>
+                <a:cs typeface="Courier New" panose="02070309020205020404" pitchFamily="49" charset="0"/>
+              </a:rPr>
+              <a:t>    </a:t>
+            </a:r>
+            <a:r>
+              <a:rPr kumimoji="0" lang="en-US" altLang="en-US" sz="2800" b="1" u="none" strike="noStrike" cap="none" normalizeH="0" baseline="0" noProof="1">
+                <a:ln>
+                  <a:noFill/>
+                </a:ln>
+                <a:solidFill>
+                  <a:srgbClr val="000000"/>
+                </a:solidFill>
+                <a:effectLst/>
+                <a:latin typeface="HelveticaNeue" panose="00000400000000000000" pitchFamily="2" charset="0"/>
+                <a:cs typeface="Courier New" panose="02070309020205020404" pitchFamily="49" charset="0"/>
+              </a:rPr>
+              <a:t>}</a:t>
+            </a:r>
+            <a:endParaRPr kumimoji="0" lang="en-US" altLang="en-US" sz="6000" b="0" u="none" strike="noStrike" cap="none" normalizeH="0" baseline="0" noProof="1">
+              <a:ln>
+                <a:noFill/>
+              </a:ln>
+              <a:solidFill>
+                <a:schemeClr val="tx1"/>
+              </a:solidFill>
+              <a:effectLst/>
+              <a:latin typeface="HelveticaNeue" panose="00000400000000000000" pitchFamily="2" charset="0"/>
+            </a:endParaRPr>
+          </a:p>
+        </p:txBody>
+      </p:sp>
+    </p:spTree>
+    <p:extLst>
+      <p:ext uri="{BB962C8B-B14F-4D97-AF65-F5344CB8AC3E}">
+        <p14:creationId xmlns:p14="http://schemas.microsoft.com/office/powerpoint/2010/main" val="273690344"/>
+      </p:ext>
+    </p:extLst>
+  </p:cSld>
+  <p:clrMapOvr>
+    <a:masterClrMapping/>
+  </p:clrMapOvr>
+</p:sld>
+</file>
+
+<file path=ppt/slides/slide61.xml><?xml version="1.0" encoding="utf-8"?>
+<p:sld xmlns:a="http://schemas.openxmlformats.org/drawingml/2006/main" xmlns:r="http://schemas.openxmlformats.org/officeDocument/2006/relationships" xmlns:p="http://schemas.openxmlformats.org/presentationml/2006/main">
+  <p:cSld>
+    <p:spTree>
+      <p:nvGrpSpPr>
+        <p:cNvPr id="1" name=""/>
+        <p:cNvGrpSpPr/>
+        <p:nvPr/>
+      </p:nvGrpSpPr>
+      <p:grpSpPr>
+        <a:xfrm>
+          <a:off x="0" y="0"/>
+          <a:ext cx="0" cy="0"/>
+          <a:chOff x="0" y="0"/>
+          <a:chExt cx="0" cy="0"/>
+        </a:xfrm>
+      </p:grpSpPr>
+      <p:sp>
+        <p:nvSpPr>
+          <p:cNvPr id="2" name="TextBox 1">
+            <a:extLst>
+              <a:ext uri="{FF2B5EF4-FFF2-40B4-BE49-F238E27FC236}">
+                <a16:creationId xmlns:a16="http://schemas.microsoft.com/office/drawing/2014/main" id="{5CD3E77F-07E3-45F7-A3C8-76B1D24DC37E}"/>
+              </a:ext>
+            </a:extLst>
+          </p:cNvPr>
+          <p:cNvSpPr txBox="1"/>
+          <p:nvPr/>
+        </p:nvSpPr>
+        <p:spPr>
+          <a:xfrm>
+            <a:off x="2620910" y="213815"/>
+            <a:ext cx="6921500" cy="646331"/>
+          </a:xfrm>
+          <a:prstGeom prst="rect">
+            <a:avLst/>
+          </a:prstGeom>
+          <a:noFill/>
+        </p:spPr>
+        <p:txBody>
+          <a:bodyPr wrap="square" rtlCol="0">
+            <a:spAutoFit/>
+          </a:bodyPr>
+          <a:lstStyle/>
+          <a:p>
+            <a:pPr algn="ctr"/>
+            <a:r>
+              <a:rPr lang="en-US" sz="3600" b="1" dirty="0">
+                <a:latin typeface="Open Sans Semibold" panose="020B0706030804020204" pitchFamily="34" charset="0"/>
+                <a:ea typeface="Open Sans Semibold" panose="020B0706030804020204" pitchFamily="34" charset="0"/>
+                <a:cs typeface="Open Sans Semibold" panose="020B0706030804020204" pitchFamily="34" charset="0"/>
+              </a:rPr>
+              <a:t>Filter and Server Push feature</a:t>
+            </a:r>
+          </a:p>
+        </p:txBody>
+      </p:sp>
+      <p:sp>
+        <p:nvSpPr>
+          <p:cNvPr id="5" name="Rectangle 4">
+            <a:extLst>
+              <a:ext uri="{FF2B5EF4-FFF2-40B4-BE49-F238E27FC236}">
+                <a16:creationId xmlns:a16="http://schemas.microsoft.com/office/drawing/2014/main" id="{94CE6F4F-3371-412C-8A2C-A1EBBC5E1EB7}"/>
+              </a:ext>
+            </a:extLst>
+          </p:cNvPr>
+          <p:cNvSpPr/>
+          <p:nvPr/>
+        </p:nvSpPr>
+        <p:spPr>
+          <a:xfrm>
+            <a:off x="294579" y="1041212"/>
+            <a:ext cx="11574162" cy="5632311"/>
+          </a:xfrm>
+          <a:prstGeom prst="rect">
+            <a:avLst/>
+          </a:prstGeom>
+        </p:spPr>
+        <p:txBody>
+          <a:bodyPr wrap="square">
+            <a:spAutoFit/>
+          </a:bodyPr>
+          <a:lstStyle/>
+          <a:p>
+            <a:r>
+              <a:rPr lang="en-US" sz="2000" noProof="1">
+                <a:solidFill>
+                  <a:schemeClr val="accent2"/>
+                </a:solidFill>
+                <a:latin typeface="HelveticaNeue" panose="00000400000000000000" pitchFamily="2" charset="0"/>
+              </a:rPr>
+              <a:t>@WebFilter(urlPatterns = ["/*"])</a:t>
+            </a:r>
+          </a:p>
+          <a:p>
+            <a:r>
+              <a:rPr lang="en-US" sz="2000" noProof="1">
+                <a:solidFill>
+                  <a:srgbClr val="002060"/>
+                </a:solidFill>
+                <a:latin typeface="HelveticaNeue" panose="00000400000000000000" pitchFamily="2" charset="0"/>
+              </a:rPr>
+              <a:t>class PushFilter : Filter {</a:t>
+            </a:r>
+          </a:p>
+          <a:p>
+            <a:endParaRPr lang="en-US" sz="2000" noProof="1">
+              <a:latin typeface="HelveticaNeue" panose="00000400000000000000" pitchFamily="2" charset="0"/>
+            </a:endParaRPr>
+          </a:p>
+          <a:p>
+            <a:r>
+              <a:rPr lang="en-US" sz="2000" noProof="1">
+                <a:latin typeface="HelveticaNeue" panose="00000400000000000000" pitchFamily="2" charset="0"/>
+              </a:rPr>
+              <a:t>    </a:t>
+            </a:r>
+            <a:r>
+              <a:rPr lang="en-US" sz="2000" noProof="1">
+                <a:solidFill>
+                  <a:srgbClr val="0070C0"/>
+                </a:solidFill>
+                <a:latin typeface="HelveticaNeue" panose="00000400000000000000" pitchFamily="2" charset="0"/>
+              </a:rPr>
+              <a:t>override fun </a:t>
+            </a:r>
+            <a:r>
+              <a:rPr lang="en-US" sz="2000" noProof="1">
+                <a:solidFill>
+                  <a:schemeClr val="accent2"/>
+                </a:solidFill>
+                <a:latin typeface="HelveticaNeue" panose="00000400000000000000" pitchFamily="2" charset="0"/>
+              </a:rPr>
+              <a:t>doFilter</a:t>
+            </a:r>
+            <a:r>
+              <a:rPr lang="en-US" sz="2000" noProof="1">
+                <a:solidFill>
+                  <a:srgbClr val="002060"/>
+                </a:solidFill>
+                <a:latin typeface="HelveticaNeue" panose="00000400000000000000" pitchFamily="2" charset="0"/>
+              </a:rPr>
+              <a:t>(req: ServletRequest, resp: ServletResponse, chain: FilterChain) </a:t>
+            </a:r>
+            <a:r>
+              <a:rPr lang="en-US" sz="2000" noProof="1">
+                <a:solidFill>
+                  <a:srgbClr val="0070C0"/>
+                </a:solidFill>
+                <a:latin typeface="HelveticaNeue" panose="00000400000000000000" pitchFamily="2" charset="0"/>
+              </a:rPr>
+              <a:t> </a:t>
+            </a:r>
+            <a:r>
+              <a:rPr lang="en-US" sz="2000" noProof="1">
+                <a:latin typeface="HelveticaNeue" panose="00000400000000000000" pitchFamily="2" charset="0"/>
+              </a:rPr>
+              <a:t>{</a:t>
+            </a:r>
+          </a:p>
+          <a:p>
+            <a:r>
+              <a:rPr lang="en-US" sz="2000" noProof="1">
+                <a:latin typeface="HelveticaNeue" panose="00000400000000000000" pitchFamily="2" charset="0"/>
+              </a:rPr>
+              <a:t>        </a:t>
+            </a:r>
+            <a:r>
+              <a:rPr lang="en-US" sz="2000" noProof="1">
+                <a:solidFill>
+                  <a:schemeClr val="accent2"/>
+                </a:solidFill>
+                <a:latin typeface="HelveticaNeue" panose="00000400000000000000" pitchFamily="2" charset="0"/>
+              </a:rPr>
+              <a:t>val</a:t>
+            </a:r>
+            <a:r>
+              <a:rPr lang="en-US" sz="2000" noProof="1">
+                <a:latin typeface="HelveticaNeue" panose="00000400000000000000" pitchFamily="2" charset="0"/>
+              </a:rPr>
+              <a:t> httpRequest: HttpServletRequest = req </a:t>
+            </a:r>
+            <a:r>
+              <a:rPr lang="en-US" sz="2000" noProof="1">
+                <a:solidFill>
+                  <a:schemeClr val="accent2"/>
+                </a:solidFill>
+                <a:latin typeface="HelveticaNeue" panose="00000400000000000000" pitchFamily="2" charset="0"/>
+              </a:rPr>
+              <a:t>as</a:t>
+            </a:r>
+            <a:r>
+              <a:rPr lang="en-US" sz="2000" noProof="1">
+                <a:latin typeface="HelveticaNeue" panose="00000400000000000000" pitchFamily="2" charset="0"/>
+              </a:rPr>
+              <a:t> HttpServletRequest</a:t>
+            </a:r>
+          </a:p>
+          <a:p>
+            <a:r>
+              <a:rPr lang="en-US" sz="2000" noProof="1">
+                <a:latin typeface="HelveticaNeue" panose="00000400000000000000" pitchFamily="2" charset="0"/>
+              </a:rPr>
+              <a:t>       </a:t>
+            </a:r>
+            <a:r>
+              <a:rPr lang="en-US" sz="2000" noProof="1">
+                <a:solidFill>
+                  <a:schemeClr val="accent1"/>
+                </a:solidFill>
+                <a:latin typeface="HelveticaNeue" panose="00000400000000000000" pitchFamily="2" charset="0"/>
+              </a:rPr>
+              <a:t> </a:t>
+            </a:r>
+            <a:r>
+              <a:rPr lang="en-US" sz="2000" noProof="1">
+                <a:solidFill>
+                  <a:schemeClr val="accent2"/>
+                </a:solidFill>
+                <a:latin typeface="HelveticaNeue" panose="00000400000000000000" pitchFamily="2" charset="0"/>
+              </a:rPr>
+              <a:t>val</a:t>
+            </a:r>
+            <a:r>
+              <a:rPr lang="en-US" sz="2000" noProof="1">
+                <a:solidFill>
+                  <a:schemeClr val="accent1"/>
+                </a:solidFill>
+                <a:latin typeface="HelveticaNeue" panose="00000400000000000000" pitchFamily="2" charset="0"/>
+              </a:rPr>
+              <a:t> </a:t>
+            </a:r>
+            <a:r>
+              <a:rPr lang="en-US" sz="2000" noProof="1">
+                <a:latin typeface="HelveticaNeue" panose="00000400000000000000" pitchFamily="2" charset="0"/>
+              </a:rPr>
+              <a:t>requestURI = httpRequest.requestURI</a:t>
+            </a:r>
+          </a:p>
+          <a:p>
+            <a:r>
+              <a:rPr lang="en-US" sz="2000" noProof="1">
+                <a:latin typeface="HelveticaNeue" panose="00000400000000000000" pitchFamily="2" charset="0"/>
+              </a:rPr>
+              <a:t>        </a:t>
+            </a:r>
+            <a:r>
+              <a:rPr lang="en-US" sz="2000" noProof="1">
+                <a:solidFill>
+                  <a:schemeClr val="accent2"/>
+                </a:solidFill>
+                <a:latin typeface="HelveticaNeue" panose="00000400000000000000" pitchFamily="2" charset="0"/>
+              </a:rPr>
+              <a:t>val</a:t>
+            </a:r>
+            <a:r>
+              <a:rPr lang="en-US" sz="2000" noProof="1">
+                <a:latin typeface="HelveticaNeue" panose="00000400000000000000" pitchFamily="2" charset="0"/>
+              </a:rPr>
+              <a:t> pushBuilder = httpRequest?.newPushBuilder()</a:t>
+            </a:r>
+          </a:p>
+          <a:p>
+            <a:endParaRPr lang="en-US" sz="2000" noProof="1">
+              <a:latin typeface="HelveticaNeue" panose="00000400000000000000" pitchFamily="2" charset="0"/>
+            </a:endParaRPr>
+          </a:p>
+          <a:p>
+            <a:r>
+              <a:rPr lang="en-US" sz="2000" noProof="1">
+                <a:latin typeface="HelveticaNeue" panose="00000400000000000000" pitchFamily="2" charset="0"/>
+              </a:rPr>
+              <a:t>        </a:t>
+            </a:r>
+            <a:r>
+              <a:rPr lang="en-US" sz="2000" noProof="1">
+                <a:solidFill>
+                  <a:schemeClr val="accent2"/>
+                </a:solidFill>
+                <a:latin typeface="HelveticaNeue" panose="00000400000000000000" pitchFamily="2" charset="0"/>
+              </a:rPr>
+              <a:t>when</a:t>
+            </a:r>
+            <a:r>
+              <a:rPr lang="en-US" sz="2000" noProof="1">
+                <a:latin typeface="HelveticaNeue" panose="00000400000000000000" pitchFamily="2" charset="0"/>
+              </a:rPr>
+              <a:t> (requestURI) {</a:t>
+            </a:r>
+          </a:p>
+          <a:p>
+            <a:r>
+              <a:rPr lang="en-US" sz="2000" noProof="1">
+                <a:solidFill>
+                  <a:srgbClr val="00B050"/>
+                </a:solidFill>
+                <a:latin typeface="HelveticaNeue" panose="00000400000000000000" pitchFamily="2" charset="0"/>
+              </a:rPr>
+              <a:t>            </a:t>
+            </a:r>
+            <a:r>
+              <a:rPr lang="en-US" sz="2000" noProof="1">
+                <a:solidFill>
+                  <a:srgbClr val="0DA31B"/>
+                </a:solidFill>
+                <a:latin typeface="HelveticaNeue" panose="00000400000000000000" pitchFamily="2" charset="0"/>
+              </a:rPr>
+              <a:t>"index.html"</a:t>
+            </a:r>
+            <a:r>
+              <a:rPr lang="en-US" sz="2000" noProof="1">
+                <a:solidFill>
+                  <a:srgbClr val="00B050"/>
+                </a:solidFill>
+                <a:latin typeface="HelveticaNeue" panose="00000400000000000000" pitchFamily="2" charset="0"/>
+              </a:rPr>
+              <a:t> </a:t>
+            </a:r>
+            <a:r>
+              <a:rPr lang="en-US" sz="2000" noProof="1">
+                <a:latin typeface="HelveticaNeue" panose="00000400000000000000" pitchFamily="2" charset="0"/>
+              </a:rPr>
+              <a:t>-&gt;	 {</a:t>
+            </a:r>
+          </a:p>
+          <a:p>
+            <a:pPr lvl="3"/>
+            <a:r>
+              <a:rPr lang="en-US" sz="2000" noProof="1">
+                <a:latin typeface="HelveticaNeue" panose="00000400000000000000" pitchFamily="2" charset="0"/>
+              </a:rPr>
+              <a:t>                pushBuilder?.path(</a:t>
+            </a:r>
+            <a:r>
+              <a:rPr lang="en-US" sz="2000" noProof="1">
+                <a:solidFill>
+                  <a:srgbClr val="0DA31B"/>
+                </a:solidFill>
+                <a:latin typeface="HelveticaNeue" panose="00000400000000000000" pitchFamily="2" charset="0"/>
+              </a:rPr>
+              <a:t>"/style.css"</a:t>
+            </a:r>
+            <a:r>
+              <a:rPr lang="en-US" sz="2000" noProof="1">
+                <a:latin typeface="HelveticaNeue" panose="00000400000000000000" pitchFamily="2" charset="0"/>
+              </a:rPr>
+              <a:t>)?.push()</a:t>
+            </a:r>
+          </a:p>
+          <a:p>
+            <a:pPr lvl="3"/>
+            <a:r>
+              <a:rPr lang="en-US" sz="2000" noProof="1">
+                <a:latin typeface="HelveticaNeue" panose="00000400000000000000" pitchFamily="2" charset="0"/>
+              </a:rPr>
+              <a:t>                pushBuilder?.path(</a:t>
+            </a:r>
+            <a:r>
+              <a:rPr lang="en-US" sz="2000" noProof="1">
+                <a:solidFill>
+                  <a:srgbClr val="0DA31B"/>
+                </a:solidFill>
+                <a:latin typeface="HelveticaNeue" panose="00000400000000000000" pitchFamily="2" charset="0"/>
+              </a:rPr>
+              <a:t>"/logo.png"</a:t>
+            </a:r>
+            <a:r>
+              <a:rPr lang="en-US" sz="2000" noProof="1">
+                <a:latin typeface="HelveticaNeue" panose="00000400000000000000" pitchFamily="2" charset="0"/>
+              </a:rPr>
+              <a:t>)?.push()</a:t>
+            </a:r>
+          </a:p>
+          <a:p>
+            <a:r>
+              <a:rPr lang="en-US" sz="2000" noProof="1">
+                <a:latin typeface="HelveticaNeue" panose="00000400000000000000" pitchFamily="2" charset="0"/>
+              </a:rPr>
+              <a:t>            }</a:t>
+            </a:r>
+          </a:p>
+          <a:p>
+            <a:r>
+              <a:rPr lang="en-US" sz="2000" noProof="1">
+                <a:latin typeface="HelveticaNeue" panose="00000400000000000000" pitchFamily="2" charset="0"/>
+              </a:rPr>
+              <a:t>            </a:t>
+            </a:r>
+            <a:r>
+              <a:rPr lang="en-US" sz="2000" noProof="1">
+                <a:solidFill>
+                  <a:schemeClr val="accent2"/>
+                </a:solidFill>
+                <a:latin typeface="HelveticaNeue" panose="00000400000000000000" pitchFamily="2" charset="0"/>
+              </a:rPr>
+              <a:t>else</a:t>
+            </a:r>
+            <a:r>
+              <a:rPr lang="en-US" sz="2000" noProof="1">
+                <a:latin typeface="HelveticaNeue" panose="00000400000000000000" pitchFamily="2" charset="0"/>
+              </a:rPr>
+              <a:t> -&gt; 		pushBuilder?.path(</a:t>
+            </a:r>
+            <a:r>
+              <a:rPr lang="en-US" sz="2000" noProof="1">
+                <a:solidFill>
+                  <a:srgbClr val="0DA31B"/>
+                </a:solidFill>
+                <a:latin typeface="HelveticaNeue" panose="00000400000000000000" pitchFamily="2" charset="0"/>
+              </a:rPr>
+              <a:t>"/nature.png"</a:t>
+            </a:r>
+            <a:r>
+              <a:rPr lang="en-US" sz="2000" noProof="1">
+                <a:latin typeface="HelveticaNeue" panose="00000400000000000000" pitchFamily="2" charset="0"/>
+              </a:rPr>
+              <a:t>)?.push()</a:t>
+            </a:r>
+          </a:p>
+          <a:p>
+            <a:r>
+              <a:rPr lang="en-US" sz="2000" noProof="1">
+                <a:latin typeface="HelveticaNeue" panose="00000400000000000000" pitchFamily="2" charset="0"/>
+              </a:rPr>
+              <a:t>        }</a:t>
+            </a:r>
+          </a:p>
+          <a:p>
+            <a:r>
+              <a:rPr lang="en-US" sz="2000" noProof="1">
+                <a:latin typeface="HelveticaNeue" panose="00000400000000000000" pitchFamily="2" charset="0"/>
+              </a:rPr>
+              <a:t>        chain.doFilter(req, resp)</a:t>
+            </a:r>
+          </a:p>
+          <a:p>
+            <a:r>
+              <a:rPr lang="en-US" sz="2000" noProof="1">
+                <a:latin typeface="HelveticaNeue" panose="00000400000000000000" pitchFamily="2" charset="0"/>
+              </a:rPr>
+              <a:t>    }</a:t>
+            </a:r>
+          </a:p>
+          <a:p>
+            <a:r>
+              <a:rPr lang="en-US" sz="2000" noProof="1">
+                <a:latin typeface="HelveticaNeue" panose="00000400000000000000" pitchFamily="2" charset="0"/>
+              </a:rPr>
+              <a:t>}</a:t>
+            </a:r>
+          </a:p>
+        </p:txBody>
+      </p:sp>
+    </p:spTree>
+    <p:extLst>
+      <p:ext uri="{BB962C8B-B14F-4D97-AF65-F5344CB8AC3E}">
+        <p14:creationId xmlns:p14="http://schemas.microsoft.com/office/powerpoint/2010/main" val="1362873486"/>
+      </p:ext>
+    </p:extLst>
+  </p:cSld>
+  <p:clrMapOvr>
+    <a:masterClrMapping/>
+  </p:clrMapOvr>
+</p:sld>
+</file>
+
+<file path=ppt/slides/slide62.xml><?xml version="1.0" encoding="utf-8"?>
+<p:sld xmlns:a="http://schemas.openxmlformats.org/drawingml/2006/main" xmlns:r="http://schemas.openxmlformats.org/officeDocument/2006/relationships" xmlns:p="http://schemas.openxmlformats.org/presentationml/2006/main">
+  <p:cSld>
+    <p:spTree>
+      <p:nvGrpSpPr>
+        <p:cNvPr id="1" name=""/>
+        <p:cNvGrpSpPr/>
+        <p:nvPr/>
+      </p:nvGrpSpPr>
+      <p:grpSpPr>
+        <a:xfrm>
+          <a:off x="0" y="0"/>
+          <a:ext cx="0" cy="0"/>
+          <a:chOff x="0" y="0"/>
+          <a:chExt cx="0" cy="0"/>
+        </a:xfrm>
+      </p:grpSpPr>
+      <p:sp>
+        <p:nvSpPr>
+          <p:cNvPr id="2" name="TextBox 1">
+            <a:extLst>
+              <a:ext uri="{FF2B5EF4-FFF2-40B4-BE49-F238E27FC236}">
                 <a16:creationId xmlns:a16="http://schemas.microsoft.com/office/drawing/2014/main" id="{5CD3E77F-07E3-45F7-A3C8-76B1D24DC37E}"/>
               </a:ext>
             </a:extLst>
@@ -27600,7 +30407,7 @@
 </p:sld>
 </file>
 
-<file path=ppt/slides/slide61.xml><?xml version="1.0" encoding="utf-8"?>
+<file path=ppt/slides/slide63.xml><?xml version="1.0" encoding="utf-8"?>
 <p:sld xmlns:a="http://schemas.openxmlformats.org/drawingml/2006/main" xmlns:r="http://schemas.openxmlformats.org/officeDocument/2006/relationships" xmlns:p="http://schemas.openxmlformats.org/presentationml/2006/main">
   <p:cSld>
     <p:spTree>
@@ -27668,7 +30475,7 @@
 </p:sld>
 </file>
 
-<file path=ppt/slides/slide62.xml><?xml version="1.0" encoding="utf-8"?>
+<file path=ppt/slides/slide64.xml><?xml version="1.0" encoding="utf-8"?>
 <p:sld xmlns:a="http://schemas.openxmlformats.org/drawingml/2006/main" xmlns:r="http://schemas.openxmlformats.org/officeDocument/2006/relationships" xmlns:p="http://schemas.openxmlformats.org/presentationml/2006/main">
   <p:cSld>
     <p:spTree>

</xml_diff>